<commit_message>
Takahiro update sample patient figure
</commit_message>
<xml_diff>
--- a/output/fig_sofa_dic.pptx
+++ b/output/fig_sofa_dic.pptx
@@ -2,7 +2,7 @@
 <file path=ppt/presentation.xml><?xml version="1.0" encoding="utf-8"?>
 <p:presentation xmlns:a="http://schemas.openxmlformats.org/drawingml/2006/main" xmlns:r="http://schemas.openxmlformats.org/officeDocument/2006/relationships" xmlns:p="http://schemas.openxmlformats.org/presentationml/2006/main" saveSubsetFonts="1" autoCompressPictures="0">
   <p:sldMasterIdLst>
-    <p:sldMasterId id="2147483708" r:id="rId1"/>
+    <p:sldMasterId id="2147483720" r:id="rId1"/>
   </p:sldMasterIdLst>
   <p:notesMasterIdLst>
     <p:notesMasterId r:id="rId3"/>
@@ -10,7 +10,7 @@
   <p:sldIdLst>
     <p:sldId id="256" r:id="rId2"/>
   </p:sldIdLst>
-  <p:sldSz cx="10799763" cy="17279938"/>
+  <p:sldSz cx="10799763" cy="17640300"/>
   <p:notesSz cx="6858000" cy="9144000"/>
   <p:defaultTextStyle>
     <a:defPPr>
@@ -107,6 +107,11 @@
       </a:defRPr>
     </a:lvl9pPr>
   </p:defaultTextStyle>
+  <p:extLst>
+    <p:ext uri="{EFAFB233-063F-42B5-8137-9DF3F51BA10A}">
+      <p15:sldGuideLst xmlns:p15="http://schemas.microsoft.com/office/powerpoint/2012/main"/>
+    </p:ext>
+  </p:extLst>
 </p:presentation>
 </file>
 
@@ -192,7 +197,7 @@
           <a:p>
             <a:fld id="{63A1BE33-F31D-F74A-815B-F4DD24413D48}" type="datetimeFigureOut">
               <a:rPr lang="en-JP" smtClean="0"/>
-              <a:t>2025/01/29</a:t>
+              <a:t>2025/02/02</a:t>
             </a:fld>
             <a:endParaRPr lang="en-JP"/>
           </a:p>
@@ -210,8 +215,8 @@
         </p:nvSpPr>
         <p:spPr>
           <a:xfrm>
-            <a:off x="2465388" y="1143000"/>
-            <a:ext cx="1927225" cy="3086100"/>
+            <a:off x="2484438" y="1143000"/>
+            <a:ext cx="1889125" cy="3086100"/>
           </a:xfrm>
           <a:prstGeom prst="rect">
             <a:avLst/>
@@ -489,8 +494,8 @@
         </p:nvSpPr>
         <p:spPr>
           <a:xfrm>
-            <a:off x="2465388" y="1143000"/>
-            <a:ext cx="1927225" cy="3086100"/>
+            <a:off x="2484438" y="1143000"/>
+            <a:ext cx="1889125" cy="3086100"/>
           </a:xfrm>
         </p:spPr>
       </p:sp>
@@ -578,8 +583,8 @@
         </p:nvSpPr>
         <p:spPr>
           <a:xfrm>
-            <a:off x="809982" y="2827991"/>
-            <a:ext cx="9179799" cy="6015978"/>
+            <a:off x="809982" y="2886967"/>
+            <a:ext cx="9179799" cy="6141438"/>
           </a:xfrm>
         </p:spPr>
         <p:txBody>
@@ -610,8 +615,8 @@
         </p:nvSpPr>
         <p:spPr>
           <a:xfrm>
-            <a:off x="1349971" y="9075969"/>
-            <a:ext cx="8099822" cy="4171984"/>
+            <a:off x="1349971" y="9265242"/>
+            <a:ext cx="8099822" cy="4258988"/>
           </a:xfrm>
         </p:spPr>
         <p:txBody>
@@ -680,7 +685,7 @@
           <a:p>
             <a:fld id="{CEC5EF0D-89A3-B84A-9E4B-188B0CDB794D}" type="datetimeFigureOut">
               <a:rPr lang="en-JP" smtClean="0"/>
-              <a:t>2025/01/29</a:t>
+              <a:t>2025/02/02</a:t>
             </a:fld>
             <a:endParaRPr lang="en-JP"/>
           </a:p>
@@ -731,7 +736,7 @@
     </p:spTree>
     <p:extLst>
       <p:ext uri="{BB962C8B-B14F-4D97-AF65-F5344CB8AC3E}">
-        <p14:creationId xmlns:p14="http://schemas.microsoft.com/office/powerpoint/2010/main" val="2623809763"/>
+        <p14:creationId xmlns:p14="http://schemas.microsoft.com/office/powerpoint/2010/main" val="1199100480"/>
       </p:ext>
     </p:extLst>
   </p:cSld>
@@ -850,7 +855,7 @@
           <a:p>
             <a:fld id="{CEC5EF0D-89A3-B84A-9E4B-188B0CDB794D}" type="datetimeFigureOut">
               <a:rPr lang="en-JP" smtClean="0"/>
-              <a:t>2025/01/29</a:t>
+              <a:t>2025/02/02</a:t>
             </a:fld>
             <a:endParaRPr lang="en-JP"/>
           </a:p>
@@ -901,7 +906,7 @@
     </p:spTree>
     <p:extLst>
       <p:ext uri="{BB962C8B-B14F-4D97-AF65-F5344CB8AC3E}">
-        <p14:creationId xmlns:p14="http://schemas.microsoft.com/office/powerpoint/2010/main" val="2268499088"/>
+        <p14:creationId xmlns:p14="http://schemas.microsoft.com/office/powerpoint/2010/main" val="103569714"/>
       </p:ext>
     </p:extLst>
   </p:cSld>
@@ -940,8 +945,8 @@
         </p:nvSpPr>
         <p:spPr>
           <a:xfrm>
-            <a:off x="7728581" y="919997"/>
-            <a:ext cx="2328699" cy="14643949"/>
+            <a:off x="7728581" y="939183"/>
+            <a:ext cx="2328699" cy="14949339"/>
           </a:xfrm>
         </p:spPr>
         <p:txBody>
@@ -968,8 +973,8 @@
         </p:nvSpPr>
         <p:spPr>
           <a:xfrm>
-            <a:off x="742484" y="919997"/>
-            <a:ext cx="6851100" cy="14643949"/>
+            <a:off x="742484" y="939183"/>
+            <a:ext cx="6851100" cy="14949339"/>
           </a:xfrm>
         </p:spPr>
         <p:txBody>
@@ -1030,7 +1035,7 @@
           <a:p>
             <a:fld id="{CEC5EF0D-89A3-B84A-9E4B-188B0CDB794D}" type="datetimeFigureOut">
               <a:rPr lang="en-JP" smtClean="0"/>
-              <a:t>2025/01/29</a:t>
+              <a:t>2025/02/02</a:t>
             </a:fld>
             <a:endParaRPr lang="en-JP"/>
           </a:p>
@@ -1081,7 +1086,7 @@
     </p:spTree>
     <p:extLst>
       <p:ext uri="{BB962C8B-B14F-4D97-AF65-F5344CB8AC3E}">
-        <p14:creationId xmlns:p14="http://schemas.microsoft.com/office/powerpoint/2010/main" val="2730933677"/>
+        <p14:creationId xmlns:p14="http://schemas.microsoft.com/office/powerpoint/2010/main" val="1681496707"/>
       </p:ext>
     </p:extLst>
   </p:cSld>
@@ -1200,7 +1205,7 @@
           <a:p>
             <a:fld id="{CEC5EF0D-89A3-B84A-9E4B-188B0CDB794D}" type="datetimeFigureOut">
               <a:rPr lang="en-JP" smtClean="0"/>
-              <a:t>2025/01/29</a:t>
+              <a:t>2025/02/02</a:t>
             </a:fld>
             <a:endParaRPr lang="en-JP"/>
           </a:p>
@@ -1251,7 +1256,7 @@
     </p:spTree>
     <p:extLst>
       <p:ext uri="{BB962C8B-B14F-4D97-AF65-F5344CB8AC3E}">
-        <p14:creationId xmlns:p14="http://schemas.microsoft.com/office/powerpoint/2010/main" val="343447970"/>
+        <p14:creationId xmlns:p14="http://schemas.microsoft.com/office/powerpoint/2010/main" val="37870691"/>
       </p:ext>
     </p:extLst>
   </p:cSld>
@@ -1290,8 +1295,8 @@
         </p:nvSpPr>
         <p:spPr>
           <a:xfrm>
-            <a:off x="736859" y="4307990"/>
-            <a:ext cx="9314796" cy="7187973"/>
+            <a:off x="736859" y="4397830"/>
+            <a:ext cx="9314796" cy="7337874"/>
           </a:xfrm>
         </p:spPr>
         <p:txBody>
@@ -1322,8 +1327,8 @@
         </p:nvSpPr>
         <p:spPr>
           <a:xfrm>
-            <a:off x="736859" y="11563964"/>
-            <a:ext cx="9314796" cy="3779985"/>
+            <a:off x="736859" y="11805123"/>
+            <a:ext cx="9314796" cy="3858814"/>
           </a:xfrm>
         </p:spPr>
         <p:txBody>
@@ -1446,7 +1451,7 @@
           <a:p>
             <a:fld id="{CEC5EF0D-89A3-B84A-9E4B-188B0CDB794D}" type="datetimeFigureOut">
               <a:rPr lang="en-JP" smtClean="0"/>
-              <a:t>2025/01/29</a:t>
+              <a:t>2025/02/02</a:t>
             </a:fld>
             <a:endParaRPr lang="en-JP"/>
           </a:p>
@@ -1497,7 +1502,7 @@
     </p:spTree>
     <p:extLst>
       <p:ext uri="{BB962C8B-B14F-4D97-AF65-F5344CB8AC3E}">
-        <p14:creationId xmlns:p14="http://schemas.microsoft.com/office/powerpoint/2010/main" val="1989791050"/>
+        <p14:creationId xmlns:p14="http://schemas.microsoft.com/office/powerpoint/2010/main" val="3885966"/>
       </p:ext>
     </p:extLst>
   </p:cSld>
@@ -1559,8 +1564,8 @@
         </p:nvSpPr>
         <p:spPr>
           <a:xfrm>
-            <a:off x="742484" y="4599983"/>
-            <a:ext cx="4589899" cy="10963962"/>
+            <a:off x="742484" y="4695913"/>
+            <a:ext cx="4589899" cy="11192608"/>
           </a:xfrm>
         </p:spPr>
         <p:txBody>
@@ -1616,8 +1621,8 @@
         </p:nvSpPr>
         <p:spPr>
           <a:xfrm>
-            <a:off x="5467380" y="4599983"/>
-            <a:ext cx="4589899" cy="10963962"/>
+            <a:off x="5467380" y="4695913"/>
+            <a:ext cx="4589899" cy="11192608"/>
           </a:xfrm>
         </p:spPr>
         <p:txBody>
@@ -1678,7 +1683,7 @@
           <a:p>
             <a:fld id="{CEC5EF0D-89A3-B84A-9E4B-188B0CDB794D}" type="datetimeFigureOut">
               <a:rPr lang="en-JP" smtClean="0"/>
-              <a:t>2025/01/29</a:t>
+              <a:t>2025/02/02</a:t>
             </a:fld>
             <a:endParaRPr lang="en-JP"/>
           </a:p>
@@ -1729,7 +1734,7 @@
     </p:spTree>
     <p:extLst>
       <p:ext uri="{BB962C8B-B14F-4D97-AF65-F5344CB8AC3E}">
-        <p14:creationId xmlns:p14="http://schemas.microsoft.com/office/powerpoint/2010/main" val="3349364091"/>
+        <p14:creationId xmlns:p14="http://schemas.microsoft.com/office/powerpoint/2010/main" val="4062682151"/>
       </p:ext>
     </p:extLst>
   </p:cSld>
@@ -1768,8 +1773,8 @@
         </p:nvSpPr>
         <p:spPr>
           <a:xfrm>
-            <a:off x="743890" y="920001"/>
-            <a:ext cx="9314796" cy="3339989"/>
+            <a:off x="743890" y="939186"/>
+            <a:ext cx="9314796" cy="3409643"/>
           </a:xfrm>
         </p:spPr>
         <p:txBody>
@@ -1796,8 +1801,8 @@
         </p:nvSpPr>
         <p:spPr>
           <a:xfrm>
-            <a:off x="743892" y="4235986"/>
-            <a:ext cx="4568805" cy="2075991"/>
+            <a:off x="743892" y="4324325"/>
+            <a:ext cx="4568805" cy="2119285"/>
           </a:xfrm>
         </p:spPr>
         <p:txBody>
@@ -1861,8 +1866,8 @@
         </p:nvSpPr>
         <p:spPr>
           <a:xfrm>
-            <a:off x="743892" y="6311977"/>
-            <a:ext cx="4568805" cy="9283968"/>
+            <a:off x="743892" y="6443610"/>
+            <a:ext cx="4568805" cy="9477579"/>
           </a:xfrm>
         </p:spPr>
         <p:txBody>
@@ -1918,8 +1923,8 @@
         </p:nvSpPr>
         <p:spPr>
           <a:xfrm>
-            <a:off x="5467381" y="4235986"/>
-            <a:ext cx="4591306" cy="2075991"/>
+            <a:off x="5467381" y="4324325"/>
+            <a:ext cx="4591306" cy="2119285"/>
           </a:xfrm>
         </p:spPr>
         <p:txBody>
@@ -1983,8 +1988,8 @@
         </p:nvSpPr>
         <p:spPr>
           <a:xfrm>
-            <a:off x="5467381" y="6311977"/>
-            <a:ext cx="4591306" cy="9283968"/>
+            <a:off x="5467381" y="6443610"/>
+            <a:ext cx="4591306" cy="9477579"/>
           </a:xfrm>
         </p:spPr>
         <p:txBody>
@@ -2045,7 +2050,7 @@
           <a:p>
             <a:fld id="{CEC5EF0D-89A3-B84A-9E4B-188B0CDB794D}" type="datetimeFigureOut">
               <a:rPr lang="en-JP" smtClean="0"/>
-              <a:t>2025/01/29</a:t>
+              <a:t>2025/02/02</a:t>
             </a:fld>
             <a:endParaRPr lang="en-JP"/>
           </a:p>
@@ -2096,7 +2101,7 @@
     </p:spTree>
     <p:extLst>
       <p:ext uri="{BB962C8B-B14F-4D97-AF65-F5344CB8AC3E}">
-        <p14:creationId xmlns:p14="http://schemas.microsoft.com/office/powerpoint/2010/main" val="2675075178"/>
+        <p14:creationId xmlns:p14="http://schemas.microsoft.com/office/powerpoint/2010/main" val="3813124288"/>
       </p:ext>
     </p:extLst>
   </p:cSld>
@@ -2163,7 +2168,7 @@
           <a:p>
             <a:fld id="{CEC5EF0D-89A3-B84A-9E4B-188B0CDB794D}" type="datetimeFigureOut">
               <a:rPr lang="en-JP" smtClean="0"/>
-              <a:t>2025/01/29</a:t>
+              <a:t>2025/02/02</a:t>
             </a:fld>
             <a:endParaRPr lang="en-JP"/>
           </a:p>
@@ -2214,7 +2219,7 @@
     </p:spTree>
     <p:extLst>
       <p:ext uri="{BB962C8B-B14F-4D97-AF65-F5344CB8AC3E}">
-        <p14:creationId xmlns:p14="http://schemas.microsoft.com/office/powerpoint/2010/main" val="3971443964"/>
+        <p14:creationId xmlns:p14="http://schemas.microsoft.com/office/powerpoint/2010/main" val="4087619180"/>
       </p:ext>
     </p:extLst>
   </p:cSld>
@@ -2258,7 +2263,7 @@
           <a:p>
             <a:fld id="{CEC5EF0D-89A3-B84A-9E4B-188B0CDB794D}" type="datetimeFigureOut">
               <a:rPr lang="en-JP" smtClean="0"/>
-              <a:t>2025/01/29</a:t>
+              <a:t>2025/02/02</a:t>
             </a:fld>
             <a:endParaRPr lang="en-JP"/>
           </a:p>
@@ -2309,7 +2314,7 @@
     </p:spTree>
     <p:extLst>
       <p:ext uri="{BB962C8B-B14F-4D97-AF65-F5344CB8AC3E}">
-        <p14:creationId xmlns:p14="http://schemas.microsoft.com/office/powerpoint/2010/main" val="4156864222"/>
+        <p14:creationId xmlns:p14="http://schemas.microsoft.com/office/powerpoint/2010/main" val="3780952423"/>
       </p:ext>
     </p:extLst>
   </p:cSld>
@@ -2348,8 +2353,8 @@
         </p:nvSpPr>
         <p:spPr>
           <a:xfrm>
-            <a:off x="743890" y="1151996"/>
-            <a:ext cx="3483205" cy="4031986"/>
+            <a:off x="743890" y="1176020"/>
+            <a:ext cx="3483205" cy="4116070"/>
           </a:xfrm>
         </p:spPr>
         <p:txBody>
@@ -2380,8 +2385,8 @@
         </p:nvSpPr>
         <p:spPr>
           <a:xfrm>
-            <a:off x="4591306" y="2487995"/>
-            <a:ext cx="5467380" cy="12279956"/>
+            <a:off x="4591306" y="2539880"/>
+            <a:ext cx="5467380" cy="12536047"/>
           </a:xfrm>
         </p:spPr>
         <p:txBody>
@@ -2465,8 +2470,8 @@
         </p:nvSpPr>
         <p:spPr>
           <a:xfrm>
-            <a:off x="743890" y="5183981"/>
-            <a:ext cx="3483205" cy="9603967"/>
+            <a:off x="743890" y="5292090"/>
+            <a:ext cx="3483205" cy="9804251"/>
           </a:xfrm>
         </p:spPr>
         <p:txBody>
@@ -2535,7 +2540,7 @@
           <a:p>
             <a:fld id="{CEC5EF0D-89A3-B84A-9E4B-188B0CDB794D}" type="datetimeFigureOut">
               <a:rPr lang="en-JP" smtClean="0"/>
-              <a:t>2025/01/29</a:t>
+              <a:t>2025/02/02</a:t>
             </a:fld>
             <a:endParaRPr lang="en-JP"/>
           </a:p>
@@ -2586,7 +2591,7 @@
     </p:spTree>
     <p:extLst>
       <p:ext uri="{BB962C8B-B14F-4D97-AF65-F5344CB8AC3E}">
-        <p14:creationId xmlns:p14="http://schemas.microsoft.com/office/powerpoint/2010/main" val="2038117925"/>
+        <p14:creationId xmlns:p14="http://schemas.microsoft.com/office/powerpoint/2010/main" val="760925154"/>
       </p:ext>
     </p:extLst>
   </p:cSld>
@@ -2625,8 +2630,8 @@
         </p:nvSpPr>
         <p:spPr>
           <a:xfrm>
-            <a:off x="743890" y="1151996"/>
-            <a:ext cx="3483205" cy="4031986"/>
+            <a:off x="743890" y="1176020"/>
+            <a:ext cx="3483205" cy="4116070"/>
           </a:xfrm>
         </p:spPr>
         <p:txBody>
@@ -2657,8 +2662,8 @@
         </p:nvSpPr>
         <p:spPr>
           <a:xfrm>
-            <a:off x="4591306" y="2487995"/>
-            <a:ext cx="5467380" cy="12279956"/>
+            <a:off x="4591306" y="2539880"/>
+            <a:ext cx="5467380" cy="12536047"/>
           </a:xfrm>
         </p:spPr>
         <p:txBody>
@@ -2722,8 +2727,8 @@
         </p:nvSpPr>
         <p:spPr>
           <a:xfrm>
-            <a:off x="743890" y="5183981"/>
-            <a:ext cx="3483205" cy="9603967"/>
+            <a:off x="743890" y="5292090"/>
+            <a:ext cx="3483205" cy="9804251"/>
           </a:xfrm>
         </p:spPr>
         <p:txBody>
@@ -2792,7 +2797,7 @@
           <a:p>
             <a:fld id="{CEC5EF0D-89A3-B84A-9E4B-188B0CDB794D}" type="datetimeFigureOut">
               <a:rPr lang="en-JP" smtClean="0"/>
-              <a:t>2025/01/29</a:t>
+              <a:t>2025/02/02</a:t>
             </a:fld>
             <a:endParaRPr lang="en-JP"/>
           </a:p>
@@ -2843,7 +2848,7 @@
     </p:spTree>
     <p:extLst>
       <p:ext uri="{BB962C8B-B14F-4D97-AF65-F5344CB8AC3E}">
-        <p14:creationId xmlns:p14="http://schemas.microsoft.com/office/powerpoint/2010/main" val="1483767383"/>
+        <p14:creationId xmlns:p14="http://schemas.microsoft.com/office/powerpoint/2010/main" val="467415564"/>
       </p:ext>
     </p:extLst>
   </p:cSld>
@@ -2887,8 +2892,8 @@
         </p:nvSpPr>
         <p:spPr>
           <a:xfrm>
-            <a:off x="742484" y="920001"/>
-            <a:ext cx="9314796" cy="3339989"/>
+            <a:off x="742484" y="939186"/>
+            <a:ext cx="9314796" cy="3409643"/>
           </a:xfrm>
           <a:prstGeom prst="rect">
             <a:avLst/>
@@ -2920,8 +2925,8 @@
         </p:nvSpPr>
         <p:spPr>
           <a:xfrm>
-            <a:off x="742484" y="4599983"/>
-            <a:ext cx="9314796" cy="10963962"/>
+            <a:off x="742484" y="4695913"/>
+            <a:ext cx="9314796" cy="11192608"/>
           </a:xfrm>
           <a:prstGeom prst="rect">
             <a:avLst/>
@@ -2982,8 +2987,8 @@
         </p:nvSpPr>
         <p:spPr>
           <a:xfrm>
-            <a:off x="742484" y="16015946"/>
-            <a:ext cx="2429947" cy="919997"/>
+            <a:off x="742484" y="16349948"/>
+            <a:ext cx="2429947" cy="939183"/>
           </a:xfrm>
           <a:prstGeom prst="rect">
             <a:avLst/>
@@ -3005,7 +3010,7 @@
           <a:p>
             <a:fld id="{CEC5EF0D-89A3-B84A-9E4B-188B0CDB794D}" type="datetimeFigureOut">
               <a:rPr lang="en-JP" smtClean="0"/>
-              <a:t>2025/01/29</a:t>
+              <a:t>2025/02/02</a:t>
             </a:fld>
             <a:endParaRPr lang="en-JP"/>
           </a:p>
@@ -3023,8 +3028,8 @@
         </p:nvSpPr>
         <p:spPr>
           <a:xfrm>
-            <a:off x="3577422" y="16015946"/>
-            <a:ext cx="3644920" cy="919997"/>
+            <a:off x="3577422" y="16349948"/>
+            <a:ext cx="3644920" cy="939183"/>
           </a:xfrm>
           <a:prstGeom prst="rect">
             <a:avLst/>
@@ -3060,8 +3065,8 @@
         </p:nvSpPr>
         <p:spPr>
           <a:xfrm>
-            <a:off x="7627332" y="16015946"/>
-            <a:ext cx="2429947" cy="919997"/>
+            <a:off x="7627332" y="16349948"/>
+            <a:ext cx="2429947" cy="939183"/>
           </a:xfrm>
           <a:prstGeom prst="rect">
             <a:avLst/>
@@ -3092,23 +3097,23 @@
     </p:spTree>
     <p:extLst>
       <p:ext uri="{BB962C8B-B14F-4D97-AF65-F5344CB8AC3E}">
-        <p14:creationId xmlns:p14="http://schemas.microsoft.com/office/powerpoint/2010/main" val="38925349"/>
+        <p14:creationId xmlns:p14="http://schemas.microsoft.com/office/powerpoint/2010/main" val="2916680702"/>
       </p:ext>
     </p:extLst>
   </p:cSld>
   <p:clrMap bg1="lt1" tx1="dk1" bg2="lt2" tx2="dk2" accent1="accent1" accent2="accent2" accent3="accent3" accent4="accent4" accent5="accent5" accent6="accent6" hlink="hlink" folHlink="folHlink"/>
   <p:sldLayoutIdLst>
-    <p:sldLayoutId id="2147483709" r:id="rId1"/>
-    <p:sldLayoutId id="2147483710" r:id="rId2"/>
-    <p:sldLayoutId id="2147483711" r:id="rId3"/>
-    <p:sldLayoutId id="2147483712" r:id="rId4"/>
-    <p:sldLayoutId id="2147483713" r:id="rId5"/>
-    <p:sldLayoutId id="2147483714" r:id="rId6"/>
-    <p:sldLayoutId id="2147483715" r:id="rId7"/>
-    <p:sldLayoutId id="2147483716" r:id="rId8"/>
-    <p:sldLayoutId id="2147483717" r:id="rId9"/>
-    <p:sldLayoutId id="2147483718" r:id="rId10"/>
-    <p:sldLayoutId id="2147483719" r:id="rId11"/>
+    <p:sldLayoutId id="2147483721" r:id="rId1"/>
+    <p:sldLayoutId id="2147483722" r:id="rId2"/>
+    <p:sldLayoutId id="2147483723" r:id="rId3"/>
+    <p:sldLayoutId id="2147483724" r:id="rId4"/>
+    <p:sldLayoutId id="2147483725" r:id="rId5"/>
+    <p:sldLayoutId id="2147483726" r:id="rId6"/>
+    <p:sldLayoutId id="2147483727" r:id="rId7"/>
+    <p:sldLayoutId id="2147483728" r:id="rId8"/>
+    <p:sldLayoutId id="2147483729" r:id="rId9"/>
+    <p:sldLayoutId id="2147483730" r:id="rId10"/>
+    <p:sldLayoutId id="2147483731" r:id="rId11"/>
   </p:sldLayoutIdLst>
   <p:txStyles>
     <p:titleStyle>
@@ -3426,13 +3431,13 @@
         </p:nvPicPr>
         <p:blipFill>
           <a:blip r:embed="rId3"/>
-          <a:srcRect r="1564"/>
+          <a:srcRect r="20792"/>
           <a:stretch/>
         </p:blipFill>
         <p:spPr>
           <a:xfrm>
-            <a:off x="34016" y="12479186"/>
-            <a:ext cx="10731731" cy="4672375"/>
+            <a:off x="30225" y="12964168"/>
+            <a:ext cx="8635422" cy="4672375"/>
           </a:xfrm>
           <a:prstGeom prst="rect">
             <a:avLst/>
@@ -3460,7 +3465,7 @@
         </p:blipFill>
         <p:spPr>
           <a:xfrm>
-            <a:off x="28983" y="6816704"/>
+            <a:off x="25191" y="7301685"/>
             <a:ext cx="10412610" cy="5395792"/>
           </a:xfrm>
           <a:prstGeom prst="rect">
@@ -3490,7 +3495,7 @@
         </p:blipFill>
         <p:spPr>
           <a:xfrm>
-            <a:off x="28983" y="173195"/>
+            <a:off x="25191" y="23177"/>
             <a:ext cx="10412610" cy="5950063"/>
           </a:xfrm>
           <a:prstGeom prst="rect">
@@ -3498,58 +3503,6 @@
           </a:prstGeom>
         </p:spPr>
       </p:pic>
-      <p:sp>
-        <p:nvSpPr>
-          <p:cNvPr id="8" name="Rectangle 7">
-            <a:extLst>
-              <a:ext uri="{FF2B5EF4-FFF2-40B4-BE49-F238E27FC236}">
-                <a16:creationId xmlns:a16="http://schemas.microsoft.com/office/drawing/2014/main" id="{3285E819-D172-75B0-87CB-A111949968D8}"/>
-              </a:ext>
-            </a:extLst>
-          </p:cNvPr>
-          <p:cNvSpPr/>
-          <p:nvPr/>
-        </p:nvSpPr>
-        <p:spPr>
-          <a:xfrm>
-            <a:off x="1098151" y="10977986"/>
-            <a:ext cx="5462522" cy="203200"/>
-          </a:xfrm>
-          <a:prstGeom prst="rect">
-            <a:avLst/>
-          </a:prstGeom>
-          <a:solidFill>
-            <a:srgbClr val="FF725C"/>
-          </a:solidFill>
-          <a:ln>
-            <a:noFill/>
-          </a:ln>
-        </p:spPr>
-        <p:style>
-          <a:lnRef idx="2">
-            <a:schemeClr val="accent1">
-              <a:shade val="15000"/>
-            </a:schemeClr>
-          </a:lnRef>
-          <a:fillRef idx="1">
-            <a:schemeClr val="accent1"/>
-          </a:fillRef>
-          <a:effectRef idx="0">
-            <a:schemeClr val="accent1"/>
-          </a:effectRef>
-          <a:fontRef idx="minor">
-            <a:schemeClr val="lt1"/>
-          </a:fontRef>
-        </p:style>
-        <p:txBody>
-          <a:bodyPr rtlCol="0" anchor="ctr"/>
-          <a:lstStyle/>
-          <a:p>
-            <a:pPr algn="ctr"/>
-            <a:endParaRPr lang="en-JP"/>
-          </a:p>
-        </p:txBody>
-      </p:sp>
       <p:sp>
         <p:nvSpPr>
           <p:cNvPr id="9" name="Rectangle 8">
@@ -3564,8 +3517,8 @@
         </p:nvSpPr>
         <p:spPr>
           <a:xfrm>
-            <a:off x="1308609" y="10426444"/>
-            <a:ext cx="4219676" cy="193412"/>
+            <a:off x="1173008" y="10911425"/>
+            <a:ext cx="4269600" cy="193412"/>
           </a:xfrm>
           <a:prstGeom prst="rect">
             <a:avLst/>
@@ -3616,8 +3569,8 @@
         </p:nvSpPr>
         <p:spPr>
           <a:xfrm>
-            <a:off x="1842151" y="10702215"/>
-            <a:ext cx="1670522" cy="198306"/>
+            <a:off x="1900209" y="11187196"/>
+            <a:ext cx="723599" cy="201600"/>
           </a:xfrm>
           <a:prstGeom prst="rect">
             <a:avLst/>
@@ -3668,7 +3621,7 @@
         </p:nvSpPr>
         <p:spPr>
           <a:xfrm>
-            <a:off x="5725119" y="10348890"/>
+            <a:off x="6106560" y="10832947"/>
             <a:ext cx="2387192" cy="338554"/>
           </a:xfrm>
           <a:prstGeom prst="rect">
@@ -3709,7 +3662,7 @@
         </p:nvSpPr>
         <p:spPr>
           <a:xfrm>
-            <a:off x="3801973" y="10629644"/>
+            <a:off x="4284318" y="11114625"/>
             <a:ext cx="1380506" cy="338554"/>
           </a:xfrm>
           <a:prstGeom prst="rect">
@@ -3750,7 +3703,7 @@
         </p:nvSpPr>
         <p:spPr>
           <a:xfrm>
-            <a:off x="6827327" y="10900521"/>
+            <a:off x="6665998" y="11385502"/>
             <a:ext cx="1540806" cy="338554"/>
           </a:xfrm>
           <a:prstGeom prst="rect">
@@ -3791,7 +3744,7 @@
         </p:nvSpPr>
         <p:spPr>
           <a:xfrm>
-            <a:off x="3142210" y="6428325"/>
+            <a:off x="3242593" y="6220431"/>
             <a:ext cx="2408032" cy="338554"/>
           </a:xfrm>
           <a:prstGeom prst="rect">
@@ -3842,7 +3795,7 @@
         </p:nvSpPr>
         <p:spPr>
           <a:xfrm>
-            <a:off x="7036986" y="7247027"/>
+            <a:off x="7151920" y="7732008"/>
             <a:ext cx="1290738" cy="338554"/>
           </a:xfrm>
           <a:prstGeom prst="rect">
@@ -3876,12 +3829,1204 @@
           </a:p>
         </p:txBody>
       </p:sp>
+      <p:sp>
+        <p:nvSpPr>
+          <p:cNvPr id="34" name="Triangle 33">
+            <a:extLst>
+              <a:ext uri="{FF2B5EF4-FFF2-40B4-BE49-F238E27FC236}">
+                <a16:creationId xmlns:a16="http://schemas.microsoft.com/office/drawing/2014/main" id="{20E505F0-859C-5786-ABBD-F8490F30706E}"/>
+              </a:ext>
+            </a:extLst>
+          </p:cNvPr>
+          <p:cNvSpPr/>
+          <p:nvPr/>
+        </p:nvSpPr>
+        <p:spPr>
+          <a:xfrm flipV="1">
+            <a:off x="1426914" y="6333218"/>
+            <a:ext cx="144000" cy="144000"/>
+          </a:xfrm>
+          <a:prstGeom prst="triangle">
+            <a:avLst/>
+          </a:prstGeom>
+          <a:solidFill>
+            <a:srgbClr val="EFB118"/>
+          </a:solidFill>
+          <a:ln>
+            <a:noFill/>
+          </a:ln>
+        </p:spPr>
+        <p:style>
+          <a:lnRef idx="2">
+            <a:schemeClr val="accent1">
+              <a:shade val="15000"/>
+            </a:schemeClr>
+          </a:lnRef>
+          <a:fillRef idx="1">
+            <a:schemeClr val="accent1"/>
+          </a:fillRef>
+          <a:effectRef idx="0">
+            <a:schemeClr val="accent1"/>
+          </a:effectRef>
+          <a:fontRef idx="minor">
+            <a:schemeClr val="lt1"/>
+          </a:fontRef>
+        </p:style>
+        <p:txBody>
+          <a:bodyPr rtlCol="0" anchor="ctr"/>
+          <a:lstStyle/>
+          <a:p>
+            <a:pPr algn="ctr"/>
+            <a:endParaRPr lang="en-JP"/>
+          </a:p>
+        </p:txBody>
+      </p:sp>
+      <p:sp>
+        <p:nvSpPr>
+          <p:cNvPr id="35" name="Triangle 34">
+            <a:extLst>
+              <a:ext uri="{FF2B5EF4-FFF2-40B4-BE49-F238E27FC236}">
+                <a16:creationId xmlns:a16="http://schemas.microsoft.com/office/drawing/2014/main" id="{9CF8A67A-9BF2-EF08-78B2-9BA2CDC337D4}"/>
+              </a:ext>
+            </a:extLst>
+          </p:cNvPr>
+          <p:cNvSpPr/>
+          <p:nvPr/>
+        </p:nvSpPr>
+        <p:spPr>
+          <a:xfrm flipV="1">
+            <a:off x="1037836" y="6774670"/>
+            <a:ext cx="144000" cy="144000"/>
+          </a:xfrm>
+          <a:prstGeom prst="triangle">
+            <a:avLst/>
+          </a:prstGeom>
+          <a:solidFill>
+            <a:srgbClr val="3CA951"/>
+          </a:solidFill>
+          <a:ln>
+            <a:noFill/>
+          </a:ln>
+        </p:spPr>
+        <p:style>
+          <a:lnRef idx="2">
+            <a:schemeClr val="accent1">
+              <a:shade val="15000"/>
+            </a:schemeClr>
+          </a:lnRef>
+          <a:fillRef idx="1">
+            <a:schemeClr val="accent1"/>
+          </a:fillRef>
+          <a:effectRef idx="0">
+            <a:schemeClr val="accent1"/>
+          </a:effectRef>
+          <a:fontRef idx="minor">
+            <a:schemeClr val="lt1"/>
+          </a:fontRef>
+        </p:style>
+        <p:txBody>
+          <a:bodyPr rtlCol="0" anchor="ctr"/>
+          <a:lstStyle/>
+          <a:p>
+            <a:pPr algn="ctr"/>
+            <a:endParaRPr lang="en-JP"/>
+          </a:p>
+        </p:txBody>
+      </p:sp>
+      <p:sp>
+        <p:nvSpPr>
+          <p:cNvPr id="36" name="Triangle 35">
+            <a:extLst>
+              <a:ext uri="{FF2B5EF4-FFF2-40B4-BE49-F238E27FC236}">
+                <a16:creationId xmlns:a16="http://schemas.microsoft.com/office/drawing/2014/main" id="{C723CE76-D8E1-6C02-2667-0EB55691E158}"/>
+              </a:ext>
+            </a:extLst>
+          </p:cNvPr>
+          <p:cNvSpPr/>
+          <p:nvPr/>
+        </p:nvSpPr>
+        <p:spPr>
+          <a:xfrm flipV="1">
+            <a:off x="1284098" y="6774670"/>
+            <a:ext cx="144000" cy="144000"/>
+          </a:xfrm>
+          <a:prstGeom prst="triangle">
+            <a:avLst/>
+          </a:prstGeom>
+          <a:solidFill>
+            <a:srgbClr val="3CA951"/>
+          </a:solidFill>
+          <a:ln>
+            <a:noFill/>
+          </a:ln>
+        </p:spPr>
+        <p:style>
+          <a:lnRef idx="2">
+            <a:schemeClr val="accent1">
+              <a:shade val="15000"/>
+            </a:schemeClr>
+          </a:lnRef>
+          <a:fillRef idx="1">
+            <a:schemeClr val="accent1"/>
+          </a:fillRef>
+          <a:effectRef idx="0">
+            <a:schemeClr val="accent1"/>
+          </a:effectRef>
+          <a:fontRef idx="minor">
+            <a:schemeClr val="lt1"/>
+          </a:fontRef>
+        </p:style>
+        <p:txBody>
+          <a:bodyPr rtlCol="0" anchor="ctr"/>
+          <a:lstStyle/>
+          <a:p>
+            <a:pPr algn="ctr"/>
+            <a:endParaRPr lang="en-JP"/>
+          </a:p>
+        </p:txBody>
+      </p:sp>
+      <p:sp>
+        <p:nvSpPr>
+          <p:cNvPr id="37" name="Triangle 36">
+            <a:extLst>
+              <a:ext uri="{FF2B5EF4-FFF2-40B4-BE49-F238E27FC236}">
+                <a16:creationId xmlns:a16="http://schemas.microsoft.com/office/drawing/2014/main" id="{DCB83797-2DE8-BBA1-D974-65E4A46D2F3B}"/>
+              </a:ext>
+            </a:extLst>
+          </p:cNvPr>
+          <p:cNvSpPr/>
+          <p:nvPr/>
+        </p:nvSpPr>
+        <p:spPr>
+          <a:xfrm flipV="1">
+            <a:off x="1530360" y="6774670"/>
+            <a:ext cx="144000" cy="144000"/>
+          </a:xfrm>
+          <a:prstGeom prst="triangle">
+            <a:avLst/>
+          </a:prstGeom>
+          <a:solidFill>
+            <a:srgbClr val="3CA951"/>
+          </a:solidFill>
+          <a:ln>
+            <a:noFill/>
+          </a:ln>
+        </p:spPr>
+        <p:style>
+          <a:lnRef idx="2">
+            <a:schemeClr val="accent1">
+              <a:shade val="15000"/>
+            </a:schemeClr>
+          </a:lnRef>
+          <a:fillRef idx="1">
+            <a:schemeClr val="accent1"/>
+          </a:fillRef>
+          <a:effectRef idx="0">
+            <a:schemeClr val="accent1"/>
+          </a:effectRef>
+          <a:fontRef idx="minor">
+            <a:schemeClr val="lt1"/>
+          </a:fontRef>
+        </p:style>
+        <p:txBody>
+          <a:bodyPr rtlCol="0" anchor="ctr"/>
+          <a:lstStyle/>
+          <a:p>
+            <a:pPr algn="ctr"/>
+            <a:endParaRPr lang="en-JP"/>
+          </a:p>
+        </p:txBody>
+      </p:sp>
+      <p:sp>
+        <p:nvSpPr>
+          <p:cNvPr id="38" name="Triangle 37">
+            <a:extLst>
+              <a:ext uri="{FF2B5EF4-FFF2-40B4-BE49-F238E27FC236}">
+                <a16:creationId xmlns:a16="http://schemas.microsoft.com/office/drawing/2014/main" id="{F8C5FE80-A646-860B-7C2D-1BFF0C68C075}"/>
+              </a:ext>
+            </a:extLst>
+          </p:cNvPr>
+          <p:cNvSpPr/>
+          <p:nvPr/>
+        </p:nvSpPr>
+        <p:spPr>
+          <a:xfrm flipV="1">
+            <a:off x="1776622" y="6774670"/>
+            <a:ext cx="144000" cy="144000"/>
+          </a:xfrm>
+          <a:prstGeom prst="triangle">
+            <a:avLst/>
+          </a:prstGeom>
+          <a:solidFill>
+            <a:srgbClr val="3CA951"/>
+          </a:solidFill>
+          <a:ln>
+            <a:noFill/>
+          </a:ln>
+        </p:spPr>
+        <p:style>
+          <a:lnRef idx="2">
+            <a:schemeClr val="accent1">
+              <a:shade val="15000"/>
+            </a:schemeClr>
+          </a:lnRef>
+          <a:fillRef idx="1">
+            <a:schemeClr val="accent1"/>
+          </a:fillRef>
+          <a:effectRef idx="0">
+            <a:schemeClr val="accent1"/>
+          </a:effectRef>
+          <a:fontRef idx="minor">
+            <a:schemeClr val="lt1"/>
+          </a:fontRef>
+        </p:style>
+        <p:txBody>
+          <a:bodyPr rtlCol="0" anchor="ctr"/>
+          <a:lstStyle/>
+          <a:p>
+            <a:pPr algn="ctr"/>
+            <a:endParaRPr lang="en-JP"/>
+          </a:p>
+        </p:txBody>
+      </p:sp>
+      <p:sp>
+        <p:nvSpPr>
+          <p:cNvPr id="39" name="Triangle 38">
+            <a:extLst>
+              <a:ext uri="{FF2B5EF4-FFF2-40B4-BE49-F238E27FC236}">
+                <a16:creationId xmlns:a16="http://schemas.microsoft.com/office/drawing/2014/main" id="{6AFB3D22-B1A0-F927-0B4C-5426C038DE16}"/>
+              </a:ext>
+            </a:extLst>
+          </p:cNvPr>
+          <p:cNvSpPr/>
+          <p:nvPr/>
+        </p:nvSpPr>
+        <p:spPr>
+          <a:xfrm flipV="1">
+            <a:off x="2022884" y="6774670"/>
+            <a:ext cx="144000" cy="144000"/>
+          </a:xfrm>
+          <a:prstGeom prst="triangle">
+            <a:avLst/>
+          </a:prstGeom>
+          <a:solidFill>
+            <a:srgbClr val="3CA951"/>
+          </a:solidFill>
+          <a:ln>
+            <a:noFill/>
+          </a:ln>
+        </p:spPr>
+        <p:style>
+          <a:lnRef idx="2">
+            <a:schemeClr val="accent1">
+              <a:shade val="15000"/>
+            </a:schemeClr>
+          </a:lnRef>
+          <a:fillRef idx="1">
+            <a:schemeClr val="accent1"/>
+          </a:fillRef>
+          <a:effectRef idx="0">
+            <a:schemeClr val="accent1"/>
+          </a:effectRef>
+          <a:fontRef idx="minor">
+            <a:schemeClr val="lt1"/>
+          </a:fontRef>
+        </p:style>
+        <p:txBody>
+          <a:bodyPr rtlCol="0" anchor="ctr"/>
+          <a:lstStyle/>
+          <a:p>
+            <a:pPr algn="ctr"/>
+            <a:endParaRPr lang="en-JP"/>
+          </a:p>
+        </p:txBody>
+      </p:sp>
+      <p:sp>
+        <p:nvSpPr>
+          <p:cNvPr id="40" name="Triangle 39">
+            <a:extLst>
+              <a:ext uri="{FF2B5EF4-FFF2-40B4-BE49-F238E27FC236}">
+                <a16:creationId xmlns:a16="http://schemas.microsoft.com/office/drawing/2014/main" id="{3731233D-6583-FC91-7E5C-58D24AFA5BA3}"/>
+              </a:ext>
+            </a:extLst>
+          </p:cNvPr>
+          <p:cNvSpPr/>
+          <p:nvPr/>
+        </p:nvSpPr>
+        <p:spPr>
+          <a:xfrm flipV="1">
+            <a:off x="2269146" y="6774670"/>
+            <a:ext cx="144000" cy="144000"/>
+          </a:xfrm>
+          <a:prstGeom prst="triangle">
+            <a:avLst/>
+          </a:prstGeom>
+          <a:solidFill>
+            <a:srgbClr val="3CA951"/>
+          </a:solidFill>
+          <a:ln>
+            <a:noFill/>
+          </a:ln>
+        </p:spPr>
+        <p:style>
+          <a:lnRef idx="2">
+            <a:schemeClr val="accent1">
+              <a:shade val="15000"/>
+            </a:schemeClr>
+          </a:lnRef>
+          <a:fillRef idx="1">
+            <a:schemeClr val="accent1"/>
+          </a:fillRef>
+          <a:effectRef idx="0">
+            <a:schemeClr val="accent1"/>
+          </a:effectRef>
+          <a:fontRef idx="minor">
+            <a:schemeClr val="lt1"/>
+          </a:fontRef>
+        </p:style>
+        <p:txBody>
+          <a:bodyPr rtlCol="0" anchor="ctr"/>
+          <a:lstStyle/>
+          <a:p>
+            <a:pPr algn="ctr"/>
+            <a:endParaRPr lang="en-JP"/>
+          </a:p>
+        </p:txBody>
+      </p:sp>
+      <p:sp>
+        <p:nvSpPr>
+          <p:cNvPr id="41" name="Triangle 40">
+            <a:extLst>
+              <a:ext uri="{FF2B5EF4-FFF2-40B4-BE49-F238E27FC236}">
+                <a16:creationId xmlns:a16="http://schemas.microsoft.com/office/drawing/2014/main" id="{5D58A8DD-8E5E-60DC-09A3-5154D7504577}"/>
+              </a:ext>
+            </a:extLst>
+          </p:cNvPr>
+          <p:cNvSpPr/>
+          <p:nvPr/>
+        </p:nvSpPr>
+        <p:spPr>
+          <a:xfrm flipV="1">
+            <a:off x="2515408" y="6774670"/>
+            <a:ext cx="144000" cy="144000"/>
+          </a:xfrm>
+          <a:prstGeom prst="triangle">
+            <a:avLst/>
+          </a:prstGeom>
+          <a:solidFill>
+            <a:srgbClr val="3CA951"/>
+          </a:solidFill>
+          <a:ln>
+            <a:noFill/>
+          </a:ln>
+        </p:spPr>
+        <p:style>
+          <a:lnRef idx="2">
+            <a:schemeClr val="accent1">
+              <a:shade val="15000"/>
+            </a:schemeClr>
+          </a:lnRef>
+          <a:fillRef idx="1">
+            <a:schemeClr val="accent1"/>
+          </a:fillRef>
+          <a:effectRef idx="0">
+            <a:schemeClr val="accent1"/>
+          </a:effectRef>
+          <a:fontRef idx="minor">
+            <a:schemeClr val="lt1"/>
+          </a:fontRef>
+        </p:style>
+        <p:txBody>
+          <a:bodyPr rtlCol="0" anchor="ctr"/>
+          <a:lstStyle/>
+          <a:p>
+            <a:pPr algn="ctr"/>
+            <a:endParaRPr lang="en-JP"/>
+          </a:p>
+        </p:txBody>
+      </p:sp>
+      <p:sp>
+        <p:nvSpPr>
+          <p:cNvPr id="42" name="Triangle 41">
+            <a:extLst>
+              <a:ext uri="{FF2B5EF4-FFF2-40B4-BE49-F238E27FC236}">
+                <a16:creationId xmlns:a16="http://schemas.microsoft.com/office/drawing/2014/main" id="{F6B4E599-8D69-7233-0C46-148D04376231}"/>
+              </a:ext>
+            </a:extLst>
+          </p:cNvPr>
+          <p:cNvSpPr/>
+          <p:nvPr/>
+        </p:nvSpPr>
+        <p:spPr>
+          <a:xfrm flipV="1">
+            <a:off x="2761670" y="6774670"/>
+            <a:ext cx="144000" cy="144000"/>
+          </a:xfrm>
+          <a:prstGeom prst="triangle">
+            <a:avLst/>
+          </a:prstGeom>
+          <a:solidFill>
+            <a:srgbClr val="3CA951"/>
+          </a:solidFill>
+          <a:ln>
+            <a:noFill/>
+          </a:ln>
+        </p:spPr>
+        <p:style>
+          <a:lnRef idx="2">
+            <a:schemeClr val="accent1">
+              <a:shade val="15000"/>
+            </a:schemeClr>
+          </a:lnRef>
+          <a:fillRef idx="1">
+            <a:schemeClr val="accent1"/>
+          </a:fillRef>
+          <a:effectRef idx="0">
+            <a:schemeClr val="accent1"/>
+          </a:effectRef>
+          <a:fontRef idx="minor">
+            <a:schemeClr val="lt1"/>
+          </a:fontRef>
+        </p:style>
+        <p:txBody>
+          <a:bodyPr rtlCol="0" anchor="ctr"/>
+          <a:lstStyle/>
+          <a:p>
+            <a:pPr algn="ctr"/>
+            <a:endParaRPr lang="en-JP"/>
+          </a:p>
+        </p:txBody>
+      </p:sp>
+      <p:sp>
+        <p:nvSpPr>
+          <p:cNvPr id="43" name="Triangle 42">
+            <a:extLst>
+              <a:ext uri="{FF2B5EF4-FFF2-40B4-BE49-F238E27FC236}">
+                <a16:creationId xmlns:a16="http://schemas.microsoft.com/office/drawing/2014/main" id="{3EDA01B9-6D39-855F-579E-7D5B211E1DD5}"/>
+              </a:ext>
+            </a:extLst>
+          </p:cNvPr>
+          <p:cNvSpPr/>
+          <p:nvPr/>
+        </p:nvSpPr>
+        <p:spPr>
+          <a:xfrm flipV="1">
+            <a:off x="3007932" y="6774670"/>
+            <a:ext cx="144000" cy="144000"/>
+          </a:xfrm>
+          <a:prstGeom prst="triangle">
+            <a:avLst/>
+          </a:prstGeom>
+          <a:solidFill>
+            <a:srgbClr val="3CA951"/>
+          </a:solidFill>
+          <a:ln>
+            <a:noFill/>
+          </a:ln>
+        </p:spPr>
+        <p:style>
+          <a:lnRef idx="2">
+            <a:schemeClr val="accent1">
+              <a:shade val="15000"/>
+            </a:schemeClr>
+          </a:lnRef>
+          <a:fillRef idx="1">
+            <a:schemeClr val="accent1"/>
+          </a:fillRef>
+          <a:effectRef idx="0">
+            <a:schemeClr val="accent1"/>
+          </a:effectRef>
+          <a:fontRef idx="minor">
+            <a:schemeClr val="lt1"/>
+          </a:fontRef>
+        </p:style>
+        <p:txBody>
+          <a:bodyPr rtlCol="0" anchor="ctr"/>
+          <a:lstStyle/>
+          <a:p>
+            <a:pPr algn="ctr"/>
+            <a:endParaRPr lang="en-JP"/>
+          </a:p>
+        </p:txBody>
+      </p:sp>
+      <p:sp>
+        <p:nvSpPr>
+          <p:cNvPr id="44" name="Triangle 43">
+            <a:extLst>
+              <a:ext uri="{FF2B5EF4-FFF2-40B4-BE49-F238E27FC236}">
+                <a16:creationId xmlns:a16="http://schemas.microsoft.com/office/drawing/2014/main" id="{B8943919-352A-C540-91E0-9E16A02491AD}"/>
+              </a:ext>
+            </a:extLst>
+          </p:cNvPr>
+          <p:cNvSpPr/>
+          <p:nvPr/>
+        </p:nvSpPr>
+        <p:spPr>
+          <a:xfrm flipV="1">
+            <a:off x="3254194" y="6774670"/>
+            <a:ext cx="144000" cy="144000"/>
+          </a:xfrm>
+          <a:prstGeom prst="triangle">
+            <a:avLst/>
+          </a:prstGeom>
+          <a:solidFill>
+            <a:srgbClr val="3CA951"/>
+          </a:solidFill>
+          <a:ln>
+            <a:noFill/>
+          </a:ln>
+        </p:spPr>
+        <p:style>
+          <a:lnRef idx="2">
+            <a:schemeClr val="accent1">
+              <a:shade val="15000"/>
+            </a:schemeClr>
+          </a:lnRef>
+          <a:fillRef idx="1">
+            <a:schemeClr val="accent1"/>
+          </a:fillRef>
+          <a:effectRef idx="0">
+            <a:schemeClr val="accent1"/>
+          </a:effectRef>
+          <a:fontRef idx="minor">
+            <a:schemeClr val="lt1"/>
+          </a:fontRef>
+        </p:style>
+        <p:txBody>
+          <a:bodyPr rtlCol="0" anchor="ctr"/>
+          <a:lstStyle/>
+          <a:p>
+            <a:pPr algn="ctr"/>
+            <a:endParaRPr lang="en-JP"/>
+          </a:p>
+        </p:txBody>
+      </p:sp>
+      <p:sp>
+        <p:nvSpPr>
+          <p:cNvPr id="45" name="Triangle 44">
+            <a:extLst>
+              <a:ext uri="{FF2B5EF4-FFF2-40B4-BE49-F238E27FC236}">
+                <a16:creationId xmlns:a16="http://schemas.microsoft.com/office/drawing/2014/main" id="{9485C4C8-C9D4-1A34-A437-AB83E0D2718C}"/>
+              </a:ext>
+            </a:extLst>
+          </p:cNvPr>
+          <p:cNvSpPr/>
+          <p:nvPr/>
+        </p:nvSpPr>
+        <p:spPr>
+          <a:xfrm flipV="1">
+            <a:off x="3500456" y="6774670"/>
+            <a:ext cx="144000" cy="144000"/>
+          </a:xfrm>
+          <a:prstGeom prst="triangle">
+            <a:avLst/>
+          </a:prstGeom>
+          <a:solidFill>
+            <a:srgbClr val="3CA951"/>
+          </a:solidFill>
+          <a:ln>
+            <a:noFill/>
+          </a:ln>
+        </p:spPr>
+        <p:style>
+          <a:lnRef idx="2">
+            <a:schemeClr val="accent1">
+              <a:shade val="15000"/>
+            </a:schemeClr>
+          </a:lnRef>
+          <a:fillRef idx="1">
+            <a:schemeClr val="accent1"/>
+          </a:fillRef>
+          <a:effectRef idx="0">
+            <a:schemeClr val="accent1"/>
+          </a:effectRef>
+          <a:fontRef idx="minor">
+            <a:schemeClr val="lt1"/>
+          </a:fontRef>
+        </p:style>
+        <p:txBody>
+          <a:bodyPr rtlCol="0" anchor="ctr"/>
+          <a:lstStyle/>
+          <a:p>
+            <a:pPr algn="ctr"/>
+            <a:endParaRPr lang="en-JP"/>
+          </a:p>
+        </p:txBody>
+      </p:sp>
+      <p:sp>
+        <p:nvSpPr>
+          <p:cNvPr id="46" name="Triangle 45">
+            <a:extLst>
+              <a:ext uri="{FF2B5EF4-FFF2-40B4-BE49-F238E27FC236}">
+                <a16:creationId xmlns:a16="http://schemas.microsoft.com/office/drawing/2014/main" id="{D9390F7C-3482-2BDA-D970-BF0153AAB4A1}"/>
+              </a:ext>
+            </a:extLst>
+          </p:cNvPr>
+          <p:cNvSpPr/>
+          <p:nvPr/>
+        </p:nvSpPr>
+        <p:spPr>
+          <a:xfrm flipV="1">
+            <a:off x="4485504" y="6774670"/>
+            <a:ext cx="144000" cy="144000"/>
+          </a:xfrm>
+          <a:prstGeom prst="triangle">
+            <a:avLst/>
+          </a:prstGeom>
+          <a:solidFill>
+            <a:srgbClr val="3CA951"/>
+          </a:solidFill>
+          <a:ln>
+            <a:noFill/>
+          </a:ln>
+        </p:spPr>
+        <p:style>
+          <a:lnRef idx="2">
+            <a:schemeClr val="accent1">
+              <a:shade val="15000"/>
+            </a:schemeClr>
+          </a:lnRef>
+          <a:fillRef idx="1">
+            <a:schemeClr val="accent1"/>
+          </a:fillRef>
+          <a:effectRef idx="0">
+            <a:schemeClr val="accent1"/>
+          </a:effectRef>
+          <a:fontRef idx="minor">
+            <a:schemeClr val="lt1"/>
+          </a:fontRef>
+        </p:style>
+        <p:txBody>
+          <a:bodyPr rtlCol="0" anchor="ctr"/>
+          <a:lstStyle/>
+          <a:p>
+            <a:pPr algn="ctr"/>
+            <a:endParaRPr lang="en-JP"/>
+          </a:p>
+        </p:txBody>
+      </p:sp>
+      <p:sp>
+        <p:nvSpPr>
+          <p:cNvPr id="47" name="Triangle 46">
+            <a:extLst>
+              <a:ext uri="{FF2B5EF4-FFF2-40B4-BE49-F238E27FC236}">
+                <a16:creationId xmlns:a16="http://schemas.microsoft.com/office/drawing/2014/main" id="{663C1069-6EA6-C6DB-30C8-AE46AF27D10F}"/>
+              </a:ext>
+            </a:extLst>
+          </p:cNvPr>
+          <p:cNvSpPr/>
+          <p:nvPr/>
+        </p:nvSpPr>
+        <p:spPr>
+          <a:xfrm flipV="1">
+            <a:off x="4731766" y="6774670"/>
+            <a:ext cx="144000" cy="144000"/>
+          </a:xfrm>
+          <a:prstGeom prst="triangle">
+            <a:avLst/>
+          </a:prstGeom>
+          <a:solidFill>
+            <a:srgbClr val="3CA951"/>
+          </a:solidFill>
+          <a:ln>
+            <a:noFill/>
+          </a:ln>
+        </p:spPr>
+        <p:style>
+          <a:lnRef idx="2">
+            <a:schemeClr val="accent1">
+              <a:shade val="15000"/>
+            </a:schemeClr>
+          </a:lnRef>
+          <a:fillRef idx="1">
+            <a:schemeClr val="accent1"/>
+          </a:fillRef>
+          <a:effectRef idx="0">
+            <a:schemeClr val="accent1"/>
+          </a:effectRef>
+          <a:fontRef idx="minor">
+            <a:schemeClr val="lt1"/>
+          </a:fontRef>
+        </p:style>
+        <p:txBody>
+          <a:bodyPr rtlCol="0" anchor="ctr"/>
+          <a:lstStyle/>
+          <a:p>
+            <a:pPr algn="ctr"/>
+            <a:endParaRPr lang="en-JP"/>
+          </a:p>
+        </p:txBody>
+      </p:sp>
+      <p:sp>
+        <p:nvSpPr>
+          <p:cNvPr id="48" name="Triangle 47">
+            <a:extLst>
+              <a:ext uri="{FF2B5EF4-FFF2-40B4-BE49-F238E27FC236}">
+                <a16:creationId xmlns:a16="http://schemas.microsoft.com/office/drawing/2014/main" id="{7FC48785-7338-888A-E73D-D80E7CD7C2D9}"/>
+              </a:ext>
+            </a:extLst>
+          </p:cNvPr>
+          <p:cNvSpPr/>
+          <p:nvPr/>
+        </p:nvSpPr>
+        <p:spPr>
+          <a:xfrm flipV="1">
+            <a:off x="5224290" y="6774670"/>
+            <a:ext cx="144000" cy="144000"/>
+          </a:xfrm>
+          <a:prstGeom prst="triangle">
+            <a:avLst/>
+          </a:prstGeom>
+          <a:solidFill>
+            <a:srgbClr val="3CA951"/>
+          </a:solidFill>
+          <a:ln>
+            <a:noFill/>
+          </a:ln>
+        </p:spPr>
+        <p:style>
+          <a:lnRef idx="2">
+            <a:schemeClr val="accent1">
+              <a:shade val="15000"/>
+            </a:schemeClr>
+          </a:lnRef>
+          <a:fillRef idx="1">
+            <a:schemeClr val="accent1"/>
+          </a:fillRef>
+          <a:effectRef idx="0">
+            <a:schemeClr val="accent1"/>
+          </a:effectRef>
+          <a:fontRef idx="minor">
+            <a:schemeClr val="lt1"/>
+          </a:fontRef>
+        </p:style>
+        <p:txBody>
+          <a:bodyPr rtlCol="0" anchor="ctr"/>
+          <a:lstStyle/>
+          <a:p>
+            <a:pPr algn="ctr"/>
+            <a:endParaRPr lang="en-JP"/>
+          </a:p>
+        </p:txBody>
+      </p:sp>
+      <p:sp>
+        <p:nvSpPr>
+          <p:cNvPr id="49" name="Triangle 48">
+            <a:extLst>
+              <a:ext uri="{FF2B5EF4-FFF2-40B4-BE49-F238E27FC236}">
+                <a16:creationId xmlns:a16="http://schemas.microsoft.com/office/drawing/2014/main" id="{AB054C72-E3B6-2ADA-2337-AB5ABF483C7A}"/>
+              </a:ext>
+            </a:extLst>
+          </p:cNvPr>
+          <p:cNvSpPr/>
+          <p:nvPr/>
+        </p:nvSpPr>
+        <p:spPr>
+          <a:xfrm flipV="1">
+            <a:off x="5470557" y="6774670"/>
+            <a:ext cx="144000" cy="144000"/>
+          </a:xfrm>
+          <a:prstGeom prst="triangle">
+            <a:avLst/>
+          </a:prstGeom>
+          <a:solidFill>
+            <a:srgbClr val="3CA951"/>
+          </a:solidFill>
+          <a:ln>
+            <a:noFill/>
+          </a:ln>
+        </p:spPr>
+        <p:style>
+          <a:lnRef idx="2">
+            <a:schemeClr val="accent1">
+              <a:shade val="15000"/>
+            </a:schemeClr>
+          </a:lnRef>
+          <a:fillRef idx="1">
+            <a:schemeClr val="accent1"/>
+          </a:fillRef>
+          <a:effectRef idx="0">
+            <a:schemeClr val="accent1"/>
+          </a:effectRef>
+          <a:fontRef idx="minor">
+            <a:schemeClr val="lt1"/>
+          </a:fontRef>
+        </p:style>
+        <p:txBody>
+          <a:bodyPr rtlCol="0" anchor="ctr"/>
+          <a:lstStyle/>
+          <a:p>
+            <a:pPr algn="ctr"/>
+            <a:endParaRPr lang="en-JP"/>
+          </a:p>
+        </p:txBody>
+      </p:sp>
+      <p:sp>
+        <p:nvSpPr>
+          <p:cNvPr id="50" name="Triangle 49">
+            <a:extLst>
+              <a:ext uri="{FF2B5EF4-FFF2-40B4-BE49-F238E27FC236}">
+                <a16:creationId xmlns:a16="http://schemas.microsoft.com/office/drawing/2014/main" id="{C01600BC-D5F6-CB51-F372-7BCF15F8921D}"/>
+              </a:ext>
+            </a:extLst>
+          </p:cNvPr>
+          <p:cNvSpPr/>
+          <p:nvPr/>
+        </p:nvSpPr>
+        <p:spPr>
+          <a:xfrm flipV="1">
+            <a:off x="4978028" y="6774670"/>
+            <a:ext cx="144000" cy="144000"/>
+          </a:xfrm>
+          <a:prstGeom prst="triangle">
+            <a:avLst/>
+          </a:prstGeom>
+          <a:solidFill>
+            <a:srgbClr val="3CA951"/>
+          </a:solidFill>
+          <a:ln>
+            <a:noFill/>
+          </a:ln>
+        </p:spPr>
+        <p:style>
+          <a:lnRef idx="2">
+            <a:schemeClr val="accent1">
+              <a:shade val="15000"/>
+            </a:schemeClr>
+          </a:lnRef>
+          <a:fillRef idx="1">
+            <a:schemeClr val="accent1"/>
+          </a:fillRef>
+          <a:effectRef idx="0">
+            <a:schemeClr val="accent1"/>
+          </a:effectRef>
+          <a:fontRef idx="minor">
+            <a:schemeClr val="lt1"/>
+          </a:fontRef>
+        </p:style>
+        <p:txBody>
+          <a:bodyPr rtlCol="0" anchor="ctr"/>
+          <a:lstStyle/>
+          <a:p>
+            <a:pPr algn="ctr"/>
+            <a:endParaRPr lang="en-JP"/>
+          </a:p>
+        </p:txBody>
+      </p:sp>
+      <p:sp>
+        <p:nvSpPr>
+          <p:cNvPr id="51" name="Triangle 50">
+            <a:extLst>
+              <a:ext uri="{FF2B5EF4-FFF2-40B4-BE49-F238E27FC236}">
+                <a16:creationId xmlns:a16="http://schemas.microsoft.com/office/drawing/2014/main" id="{BA5C258F-D1A6-FEBF-A34D-75E1BDDD1992}"/>
+              </a:ext>
+            </a:extLst>
+          </p:cNvPr>
+          <p:cNvSpPr/>
+          <p:nvPr/>
+        </p:nvSpPr>
+        <p:spPr>
+          <a:xfrm flipV="1">
+            <a:off x="4239242" y="6774670"/>
+            <a:ext cx="144000" cy="144000"/>
+          </a:xfrm>
+          <a:prstGeom prst="triangle">
+            <a:avLst/>
+          </a:prstGeom>
+          <a:solidFill>
+            <a:srgbClr val="3CA951"/>
+          </a:solidFill>
+          <a:ln>
+            <a:noFill/>
+          </a:ln>
+        </p:spPr>
+        <p:style>
+          <a:lnRef idx="2">
+            <a:schemeClr val="accent1">
+              <a:shade val="15000"/>
+            </a:schemeClr>
+          </a:lnRef>
+          <a:fillRef idx="1">
+            <a:schemeClr val="accent1"/>
+          </a:fillRef>
+          <a:effectRef idx="0">
+            <a:schemeClr val="accent1"/>
+          </a:effectRef>
+          <a:fontRef idx="minor">
+            <a:schemeClr val="lt1"/>
+          </a:fontRef>
+        </p:style>
+        <p:txBody>
+          <a:bodyPr rtlCol="0" anchor="ctr"/>
+          <a:lstStyle/>
+          <a:p>
+            <a:pPr algn="ctr"/>
+            <a:endParaRPr lang="en-JP"/>
+          </a:p>
+        </p:txBody>
+      </p:sp>
+      <p:sp>
+        <p:nvSpPr>
+          <p:cNvPr id="52" name="Triangle 51">
+            <a:extLst>
+              <a:ext uri="{FF2B5EF4-FFF2-40B4-BE49-F238E27FC236}">
+                <a16:creationId xmlns:a16="http://schemas.microsoft.com/office/drawing/2014/main" id="{5F6D8D88-FE06-4363-0156-C6FFC4735D56}"/>
+              </a:ext>
+            </a:extLst>
+          </p:cNvPr>
+          <p:cNvSpPr/>
+          <p:nvPr/>
+        </p:nvSpPr>
+        <p:spPr>
+          <a:xfrm flipV="1">
+            <a:off x="3992980" y="6774670"/>
+            <a:ext cx="144000" cy="144000"/>
+          </a:xfrm>
+          <a:prstGeom prst="triangle">
+            <a:avLst/>
+          </a:prstGeom>
+          <a:solidFill>
+            <a:srgbClr val="3CA951"/>
+          </a:solidFill>
+          <a:ln>
+            <a:noFill/>
+          </a:ln>
+        </p:spPr>
+        <p:style>
+          <a:lnRef idx="2">
+            <a:schemeClr val="accent1">
+              <a:shade val="15000"/>
+            </a:schemeClr>
+          </a:lnRef>
+          <a:fillRef idx="1">
+            <a:schemeClr val="accent1"/>
+          </a:fillRef>
+          <a:effectRef idx="0">
+            <a:schemeClr val="accent1"/>
+          </a:effectRef>
+          <a:fontRef idx="minor">
+            <a:schemeClr val="lt1"/>
+          </a:fontRef>
+        </p:style>
+        <p:txBody>
+          <a:bodyPr rtlCol="0" anchor="ctr"/>
+          <a:lstStyle/>
+          <a:p>
+            <a:pPr algn="ctr"/>
+            <a:endParaRPr lang="en-JP"/>
+          </a:p>
+        </p:txBody>
+      </p:sp>
+      <p:sp>
+        <p:nvSpPr>
+          <p:cNvPr id="53" name="Triangle 52">
+            <a:extLst>
+              <a:ext uri="{FF2B5EF4-FFF2-40B4-BE49-F238E27FC236}">
+                <a16:creationId xmlns:a16="http://schemas.microsoft.com/office/drawing/2014/main" id="{0A9DEA9A-1892-5B4A-20CC-68D92835AE8B}"/>
+              </a:ext>
+            </a:extLst>
+          </p:cNvPr>
+          <p:cNvSpPr/>
+          <p:nvPr/>
+        </p:nvSpPr>
+        <p:spPr>
+          <a:xfrm flipV="1">
+            <a:off x="3746718" y="6774670"/>
+            <a:ext cx="144000" cy="144000"/>
+          </a:xfrm>
+          <a:prstGeom prst="triangle">
+            <a:avLst/>
+          </a:prstGeom>
+          <a:solidFill>
+            <a:srgbClr val="3CA951"/>
+          </a:solidFill>
+          <a:ln>
+            <a:noFill/>
+          </a:ln>
+        </p:spPr>
+        <p:style>
+          <a:lnRef idx="2">
+            <a:schemeClr val="accent1">
+              <a:shade val="15000"/>
+            </a:schemeClr>
+          </a:lnRef>
+          <a:fillRef idx="1">
+            <a:schemeClr val="accent1"/>
+          </a:fillRef>
+          <a:effectRef idx="0">
+            <a:schemeClr val="accent1"/>
+          </a:effectRef>
+          <a:fontRef idx="minor">
+            <a:schemeClr val="lt1"/>
+          </a:fontRef>
+        </p:style>
+        <p:txBody>
+          <a:bodyPr rtlCol="0" anchor="ctr"/>
+          <a:lstStyle/>
+          <a:p>
+            <a:pPr algn="ctr"/>
+            <a:endParaRPr lang="en-JP"/>
+          </a:p>
+        </p:txBody>
+      </p:sp>
+      <p:sp>
+        <p:nvSpPr>
+          <p:cNvPr id="54" name="Triangle 53">
+            <a:extLst>
+              <a:ext uri="{FF2B5EF4-FFF2-40B4-BE49-F238E27FC236}">
+                <a16:creationId xmlns:a16="http://schemas.microsoft.com/office/drawing/2014/main" id="{C6194FB4-DBA1-39CC-67A8-703696615C1D}"/>
+              </a:ext>
+            </a:extLst>
+          </p:cNvPr>
+          <p:cNvSpPr/>
+          <p:nvPr/>
+        </p:nvSpPr>
+        <p:spPr>
+          <a:xfrm flipV="1">
+            <a:off x="2395392" y="6333218"/>
+            <a:ext cx="144000" cy="144000"/>
+          </a:xfrm>
+          <a:prstGeom prst="triangle">
+            <a:avLst/>
+          </a:prstGeom>
+          <a:solidFill>
+            <a:srgbClr val="EFB118"/>
+          </a:solidFill>
+          <a:ln>
+            <a:noFill/>
+          </a:ln>
+        </p:spPr>
+        <p:style>
+          <a:lnRef idx="2">
+            <a:schemeClr val="accent1">
+              <a:shade val="15000"/>
+            </a:schemeClr>
+          </a:lnRef>
+          <a:fillRef idx="1">
+            <a:schemeClr val="accent1"/>
+          </a:fillRef>
+          <a:effectRef idx="0">
+            <a:schemeClr val="accent1"/>
+          </a:effectRef>
+          <a:fontRef idx="minor">
+            <a:schemeClr val="lt1"/>
+          </a:fontRef>
+        </p:style>
+        <p:txBody>
+          <a:bodyPr rtlCol="0" anchor="ctr"/>
+          <a:lstStyle/>
+          <a:p>
+            <a:pPr algn="ctr"/>
+            <a:endParaRPr lang="en-JP"/>
+          </a:p>
+        </p:txBody>
+      </p:sp>
+      <p:sp>
+        <p:nvSpPr>
+          <p:cNvPr id="55" name="TextBox 54">
+            <a:extLst>
+              <a:ext uri="{FF2B5EF4-FFF2-40B4-BE49-F238E27FC236}">
+                <a16:creationId xmlns:a16="http://schemas.microsoft.com/office/drawing/2014/main" id="{E7147EFB-7F86-A6BE-9FC9-009FB64EDC22}"/>
+              </a:ext>
+            </a:extLst>
+          </p:cNvPr>
+          <p:cNvSpPr txBox="1"/>
+          <p:nvPr/>
+        </p:nvSpPr>
+        <p:spPr>
+          <a:xfrm>
+            <a:off x="6299037" y="6666685"/>
+            <a:ext cx="2456122" cy="338554"/>
+          </a:xfrm>
+          <a:prstGeom prst="rect">
+            <a:avLst/>
+          </a:prstGeom>
+          <a:noFill/>
+        </p:spPr>
+        <p:txBody>
+          <a:bodyPr wrap="none" rtlCol="0">
+            <a:spAutoFit/>
+          </a:bodyPr>
+          <a:lstStyle/>
+          <a:p>
+            <a:r>
+              <a:rPr lang="en-US" sz="1600" b="1" dirty="0">
+                <a:solidFill>
+                  <a:srgbClr val="3CA951"/>
+                </a:solidFill>
+                <a:latin typeface="Arial" panose="020B0604020202020204" pitchFamily="34" charset="0"/>
+                <a:cs typeface="Arial" panose="020B0604020202020204" pitchFamily="34" charset="0"/>
+              </a:rPr>
+              <a:t>tazobactam/piperacillin</a:t>
+            </a:r>
+            <a:endParaRPr lang="en-JP" sz="1600" b="1" dirty="0">
+              <a:solidFill>
+                <a:srgbClr val="3CA951"/>
+              </a:solidFill>
+              <a:latin typeface="Arial" panose="020B0604020202020204" pitchFamily="34" charset="0"/>
+              <a:cs typeface="Arial" panose="020B0604020202020204" pitchFamily="34" charset="0"/>
+            </a:endParaRPr>
+          </a:p>
+        </p:txBody>
+      </p:sp>
+      <p:sp>
+        <p:nvSpPr>
+          <p:cNvPr id="63" name="Triangle 62">
+            <a:extLst>
+              <a:ext uri="{FF2B5EF4-FFF2-40B4-BE49-F238E27FC236}">
+                <a16:creationId xmlns:a16="http://schemas.microsoft.com/office/drawing/2014/main" id="{75A0CF53-4911-C47C-9604-C1EA5D8C0094}"/>
+              </a:ext>
+            </a:extLst>
+          </p:cNvPr>
+          <p:cNvSpPr/>
+          <p:nvPr/>
+        </p:nvSpPr>
+        <p:spPr>
+          <a:xfrm flipV="1">
+            <a:off x="6372000" y="7857039"/>
+            <a:ext cx="144000" cy="144000"/>
+          </a:xfrm>
+          <a:prstGeom prst="triangle">
+            <a:avLst/>
+          </a:prstGeom>
+          <a:solidFill>
+            <a:srgbClr val="A463F2"/>
+          </a:solidFill>
+          <a:ln>
+            <a:noFill/>
+          </a:ln>
+        </p:spPr>
+        <p:style>
+          <a:lnRef idx="2">
+            <a:schemeClr val="accent1">
+              <a:shade val="15000"/>
+            </a:schemeClr>
+          </a:lnRef>
+          <a:fillRef idx="1">
+            <a:schemeClr val="accent1"/>
+          </a:fillRef>
+          <a:effectRef idx="0">
+            <a:schemeClr val="accent1"/>
+          </a:effectRef>
+          <a:fontRef idx="minor">
+            <a:schemeClr val="lt1"/>
+          </a:fontRef>
+        </p:style>
+        <p:txBody>
+          <a:bodyPr rtlCol="0" anchor="ctr"/>
+          <a:lstStyle/>
+          <a:p>
+            <a:pPr algn="ctr"/>
+            <a:endParaRPr lang="en-JP"/>
+          </a:p>
+        </p:txBody>
+      </p:sp>
       <p:pic>
         <p:nvPicPr>
-          <p:cNvPr id="22" name="Picture 21" descr="A yellow line drawing of a medical bag&#10;&#10;AI-generated content may be incorrect.">
+          <p:cNvPr id="3" name="Picture 2" descr="A blue line drawing of a medical device&#10;&#10;AI-generated content may be incorrect.">
             <a:extLst>
               <a:ext uri="{FF2B5EF4-FFF2-40B4-BE49-F238E27FC236}">
-                <a16:creationId xmlns:a16="http://schemas.microsoft.com/office/drawing/2014/main" id="{3AA80E5F-8D7F-2F6B-15F0-B14FBEB283D6}"/>
+                <a16:creationId xmlns:a16="http://schemas.microsoft.com/office/drawing/2014/main" id="{CDDA5CAE-270D-DB59-565D-D5B26ADC3EA3}"/>
               </a:ext>
             </a:extLst>
           </p:cNvPr>
@@ -3898,8 +5043,8 @@
         </p:blipFill>
         <p:spPr>
           <a:xfrm>
-            <a:off x="2739594" y="6406914"/>
-            <a:ext cx="368787" cy="368787"/>
+            <a:off x="5542557" y="10711540"/>
+            <a:ext cx="581368" cy="581368"/>
           </a:xfrm>
           <a:prstGeom prst="rect">
             <a:avLst/>
@@ -3908,10 +5053,10 @@
       </p:pic>
       <p:pic>
         <p:nvPicPr>
-          <p:cNvPr id="32" name="Picture 31" descr="A green line art of a medical bag&#10;&#10;AI-generated content may be incorrect.">
+          <p:cNvPr id="5" name="Picture 4" descr="A green line drawing of a dropper&#10;&#10;AI-generated content may be incorrect.">
             <a:extLst>
               <a:ext uri="{FF2B5EF4-FFF2-40B4-BE49-F238E27FC236}">
-                <a16:creationId xmlns:a16="http://schemas.microsoft.com/office/drawing/2014/main" id="{53859F79-053A-A08C-17C8-5B36B83CAD5F}"/>
+                <a16:creationId xmlns:a16="http://schemas.microsoft.com/office/drawing/2014/main" id="{0E15D3C9-7E03-5DAE-0E82-F2E76A725C79}"/>
               </a:ext>
             </a:extLst>
           </p:cNvPr>
@@ -3928,1160 +5073,20 @@
         </p:blipFill>
         <p:spPr>
           <a:xfrm>
-            <a:off x="5794765" y="6816704"/>
-            <a:ext cx="338554" cy="338554"/>
+            <a:off x="5641146" y="6509311"/>
+            <a:ext cx="674719" cy="674719"/>
           </a:xfrm>
           <a:prstGeom prst="rect">
             <a:avLst/>
           </a:prstGeom>
         </p:spPr>
       </p:pic>
-      <p:sp>
-        <p:nvSpPr>
-          <p:cNvPr id="34" name="Triangle 33">
+      <p:pic>
+        <p:nvPicPr>
+          <p:cNvPr id="7" name="Picture 6" descr="A yellow line drawing of a dropper&#10;&#10;AI-generated content may be incorrect.">
             <a:extLst>
               <a:ext uri="{FF2B5EF4-FFF2-40B4-BE49-F238E27FC236}">
-                <a16:creationId xmlns:a16="http://schemas.microsoft.com/office/drawing/2014/main" id="{20E505F0-859C-5786-ABBD-F8490F30706E}"/>
-              </a:ext>
-            </a:extLst>
-          </p:cNvPr>
-          <p:cNvSpPr/>
-          <p:nvPr/>
-        </p:nvSpPr>
-        <p:spPr>
-          <a:xfrm flipV="1">
-            <a:off x="1442281" y="6564262"/>
-            <a:ext cx="88490" cy="76284"/>
-          </a:xfrm>
-          <a:prstGeom prst="triangle">
-            <a:avLst/>
-          </a:prstGeom>
-          <a:solidFill>
-            <a:srgbClr val="EFB118"/>
-          </a:solidFill>
-          <a:ln>
-            <a:noFill/>
-          </a:ln>
-        </p:spPr>
-        <p:style>
-          <a:lnRef idx="2">
-            <a:schemeClr val="accent1">
-              <a:shade val="15000"/>
-            </a:schemeClr>
-          </a:lnRef>
-          <a:fillRef idx="1">
-            <a:schemeClr val="accent1"/>
-          </a:fillRef>
-          <a:effectRef idx="0">
-            <a:schemeClr val="accent1"/>
-          </a:effectRef>
-          <a:fontRef idx="minor">
-            <a:schemeClr val="lt1"/>
-          </a:fontRef>
-        </p:style>
-        <p:txBody>
-          <a:bodyPr rtlCol="0" anchor="ctr"/>
-          <a:lstStyle/>
-          <a:p>
-            <a:pPr algn="ctr"/>
-            <a:endParaRPr lang="en-JP"/>
-          </a:p>
-        </p:txBody>
-      </p:sp>
-      <p:sp>
-        <p:nvSpPr>
-          <p:cNvPr id="35" name="Triangle 34">
-            <a:extLst>
-              <a:ext uri="{FF2B5EF4-FFF2-40B4-BE49-F238E27FC236}">
-                <a16:creationId xmlns:a16="http://schemas.microsoft.com/office/drawing/2014/main" id="{9CF8A67A-9BF2-EF08-78B2-9BA2CDC337D4}"/>
-              </a:ext>
-            </a:extLst>
-          </p:cNvPr>
-          <p:cNvSpPr/>
-          <p:nvPr/>
-        </p:nvSpPr>
-        <p:spPr>
-          <a:xfrm flipV="1">
-            <a:off x="1053203" y="6947839"/>
-            <a:ext cx="88490" cy="76284"/>
-          </a:xfrm>
-          <a:prstGeom prst="triangle">
-            <a:avLst/>
-          </a:prstGeom>
-          <a:solidFill>
-            <a:srgbClr val="3CA951"/>
-          </a:solidFill>
-          <a:ln>
-            <a:noFill/>
-          </a:ln>
-        </p:spPr>
-        <p:style>
-          <a:lnRef idx="2">
-            <a:schemeClr val="accent1">
-              <a:shade val="15000"/>
-            </a:schemeClr>
-          </a:lnRef>
-          <a:fillRef idx="1">
-            <a:schemeClr val="accent1"/>
-          </a:fillRef>
-          <a:effectRef idx="0">
-            <a:schemeClr val="accent1"/>
-          </a:effectRef>
-          <a:fontRef idx="minor">
-            <a:schemeClr val="lt1"/>
-          </a:fontRef>
-        </p:style>
-        <p:txBody>
-          <a:bodyPr rtlCol="0" anchor="ctr"/>
-          <a:lstStyle/>
-          <a:p>
-            <a:pPr algn="ctr"/>
-            <a:endParaRPr lang="en-JP"/>
-          </a:p>
-        </p:txBody>
-      </p:sp>
-      <p:sp>
-        <p:nvSpPr>
-          <p:cNvPr id="36" name="Triangle 35">
-            <a:extLst>
-              <a:ext uri="{FF2B5EF4-FFF2-40B4-BE49-F238E27FC236}">
-                <a16:creationId xmlns:a16="http://schemas.microsoft.com/office/drawing/2014/main" id="{C723CE76-D8E1-6C02-2667-0EB55691E158}"/>
-              </a:ext>
-            </a:extLst>
-          </p:cNvPr>
-          <p:cNvSpPr/>
-          <p:nvPr/>
-        </p:nvSpPr>
-        <p:spPr>
-          <a:xfrm flipV="1">
-            <a:off x="1299465" y="6947839"/>
-            <a:ext cx="88490" cy="76284"/>
-          </a:xfrm>
-          <a:prstGeom prst="triangle">
-            <a:avLst/>
-          </a:prstGeom>
-          <a:solidFill>
-            <a:srgbClr val="3CA951"/>
-          </a:solidFill>
-          <a:ln>
-            <a:noFill/>
-          </a:ln>
-        </p:spPr>
-        <p:style>
-          <a:lnRef idx="2">
-            <a:schemeClr val="accent1">
-              <a:shade val="15000"/>
-            </a:schemeClr>
-          </a:lnRef>
-          <a:fillRef idx="1">
-            <a:schemeClr val="accent1"/>
-          </a:fillRef>
-          <a:effectRef idx="0">
-            <a:schemeClr val="accent1"/>
-          </a:effectRef>
-          <a:fontRef idx="minor">
-            <a:schemeClr val="lt1"/>
-          </a:fontRef>
-        </p:style>
-        <p:txBody>
-          <a:bodyPr rtlCol="0" anchor="ctr"/>
-          <a:lstStyle/>
-          <a:p>
-            <a:pPr algn="ctr"/>
-            <a:endParaRPr lang="en-JP"/>
-          </a:p>
-        </p:txBody>
-      </p:sp>
-      <p:sp>
-        <p:nvSpPr>
-          <p:cNvPr id="37" name="Triangle 36">
-            <a:extLst>
-              <a:ext uri="{FF2B5EF4-FFF2-40B4-BE49-F238E27FC236}">
-                <a16:creationId xmlns:a16="http://schemas.microsoft.com/office/drawing/2014/main" id="{DCB83797-2DE8-BBA1-D974-65E4A46D2F3B}"/>
-              </a:ext>
-            </a:extLst>
-          </p:cNvPr>
-          <p:cNvSpPr/>
-          <p:nvPr/>
-        </p:nvSpPr>
-        <p:spPr>
-          <a:xfrm flipV="1">
-            <a:off x="1545727" y="6947839"/>
-            <a:ext cx="88490" cy="76284"/>
-          </a:xfrm>
-          <a:prstGeom prst="triangle">
-            <a:avLst/>
-          </a:prstGeom>
-          <a:solidFill>
-            <a:srgbClr val="3CA951"/>
-          </a:solidFill>
-          <a:ln>
-            <a:noFill/>
-          </a:ln>
-        </p:spPr>
-        <p:style>
-          <a:lnRef idx="2">
-            <a:schemeClr val="accent1">
-              <a:shade val="15000"/>
-            </a:schemeClr>
-          </a:lnRef>
-          <a:fillRef idx="1">
-            <a:schemeClr val="accent1"/>
-          </a:fillRef>
-          <a:effectRef idx="0">
-            <a:schemeClr val="accent1"/>
-          </a:effectRef>
-          <a:fontRef idx="minor">
-            <a:schemeClr val="lt1"/>
-          </a:fontRef>
-        </p:style>
-        <p:txBody>
-          <a:bodyPr rtlCol="0" anchor="ctr"/>
-          <a:lstStyle/>
-          <a:p>
-            <a:pPr algn="ctr"/>
-            <a:endParaRPr lang="en-JP"/>
-          </a:p>
-        </p:txBody>
-      </p:sp>
-      <p:sp>
-        <p:nvSpPr>
-          <p:cNvPr id="38" name="Triangle 37">
-            <a:extLst>
-              <a:ext uri="{FF2B5EF4-FFF2-40B4-BE49-F238E27FC236}">
-                <a16:creationId xmlns:a16="http://schemas.microsoft.com/office/drawing/2014/main" id="{F8C5FE80-A646-860B-7C2D-1BFF0C68C075}"/>
-              </a:ext>
-            </a:extLst>
-          </p:cNvPr>
-          <p:cNvSpPr/>
-          <p:nvPr/>
-        </p:nvSpPr>
-        <p:spPr>
-          <a:xfrm flipV="1">
-            <a:off x="1791989" y="6947839"/>
-            <a:ext cx="88490" cy="76284"/>
-          </a:xfrm>
-          <a:prstGeom prst="triangle">
-            <a:avLst/>
-          </a:prstGeom>
-          <a:solidFill>
-            <a:srgbClr val="3CA951"/>
-          </a:solidFill>
-          <a:ln>
-            <a:noFill/>
-          </a:ln>
-        </p:spPr>
-        <p:style>
-          <a:lnRef idx="2">
-            <a:schemeClr val="accent1">
-              <a:shade val="15000"/>
-            </a:schemeClr>
-          </a:lnRef>
-          <a:fillRef idx="1">
-            <a:schemeClr val="accent1"/>
-          </a:fillRef>
-          <a:effectRef idx="0">
-            <a:schemeClr val="accent1"/>
-          </a:effectRef>
-          <a:fontRef idx="minor">
-            <a:schemeClr val="lt1"/>
-          </a:fontRef>
-        </p:style>
-        <p:txBody>
-          <a:bodyPr rtlCol="0" anchor="ctr"/>
-          <a:lstStyle/>
-          <a:p>
-            <a:pPr algn="ctr"/>
-            <a:endParaRPr lang="en-JP"/>
-          </a:p>
-        </p:txBody>
-      </p:sp>
-      <p:sp>
-        <p:nvSpPr>
-          <p:cNvPr id="39" name="Triangle 38">
-            <a:extLst>
-              <a:ext uri="{FF2B5EF4-FFF2-40B4-BE49-F238E27FC236}">
-                <a16:creationId xmlns:a16="http://schemas.microsoft.com/office/drawing/2014/main" id="{6AFB3D22-B1A0-F927-0B4C-5426C038DE16}"/>
-              </a:ext>
-            </a:extLst>
-          </p:cNvPr>
-          <p:cNvSpPr/>
-          <p:nvPr/>
-        </p:nvSpPr>
-        <p:spPr>
-          <a:xfrm flipV="1">
-            <a:off x="2038251" y="6947839"/>
-            <a:ext cx="88490" cy="76284"/>
-          </a:xfrm>
-          <a:prstGeom prst="triangle">
-            <a:avLst/>
-          </a:prstGeom>
-          <a:solidFill>
-            <a:srgbClr val="3CA951"/>
-          </a:solidFill>
-          <a:ln>
-            <a:noFill/>
-          </a:ln>
-        </p:spPr>
-        <p:style>
-          <a:lnRef idx="2">
-            <a:schemeClr val="accent1">
-              <a:shade val="15000"/>
-            </a:schemeClr>
-          </a:lnRef>
-          <a:fillRef idx="1">
-            <a:schemeClr val="accent1"/>
-          </a:fillRef>
-          <a:effectRef idx="0">
-            <a:schemeClr val="accent1"/>
-          </a:effectRef>
-          <a:fontRef idx="minor">
-            <a:schemeClr val="lt1"/>
-          </a:fontRef>
-        </p:style>
-        <p:txBody>
-          <a:bodyPr rtlCol="0" anchor="ctr"/>
-          <a:lstStyle/>
-          <a:p>
-            <a:pPr algn="ctr"/>
-            <a:endParaRPr lang="en-JP"/>
-          </a:p>
-        </p:txBody>
-      </p:sp>
-      <p:sp>
-        <p:nvSpPr>
-          <p:cNvPr id="40" name="Triangle 39">
-            <a:extLst>
-              <a:ext uri="{FF2B5EF4-FFF2-40B4-BE49-F238E27FC236}">
-                <a16:creationId xmlns:a16="http://schemas.microsoft.com/office/drawing/2014/main" id="{3731233D-6583-FC91-7E5C-58D24AFA5BA3}"/>
-              </a:ext>
-            </a:extLst>
-          </p:cNvPr>
-          <p:cNvSpPr/>
-          <p:nvPr/>
-        </p:nvSpPr>
-        <p:spPr>
-          <a:xfrm flipV="1">
-            <a:off x="2284513" y="6947839"/>
-            <a:ext cx="88490" cy="76284"/>
-          </a:xfrm>
-          <a:prstGeom prst="triangle">
-            <a:avLst/>
-          </a:prstGeom>
-          <a:solidFill>
-            <a:srgbClr val="3CA951"/>
-          </a:solidFill>
-          <a:ln>
-            <a:noFill/>
-          </a:ln>
-        </p:spPr>
-        <p:style>
-          <a:lnRef idx="2">
-            <a:schemeClr val="accent1">
-              <a:shade val="15000"/>
-            </a:schemeClr>
-          </a:lnRef>
-          <a:fillRef idx="1">
-            <a:schemeClr val="accent1"/>
-          </a:fillRef>
-          <a:effectRef idx="0">
-            <a:schemeClr val="accent1"/>
-          </a:effectRef>
-          <a:fontRef idx="minor">
-            <a:schemeClr val="lt1"/>
-          </a:fontRef>
-        </p:style>
-        <p:txBody>
-          <a:bodyPr rtlCol="0" anchor="ctr"/>
-          <a:lstStyle/>
-          <a:p>
-            <a:pPr algn="ctr"/>
-            <a:endParaRPr lang="en-JP"/>
-          </a:p>
-        </p:txBody>
-      </p:sp>
-      <p:sp>
-        <p:nvSpPr>
-          <p:cNvPr id="41" name="Triangle 40">
-            <a:extLst>
-              <a:ext uri="{FF2B5EF4-FFF2-40B4-BE49-F238E27FC236}">
-                <a16:creationId xmlns:a16="http://schemas.microsoft.com/office/drawing/2014/main" id="{5D58A8DD-8E5E-60DC-09A3-5154D7504577}"/>
-              </a:ext>
-            </a:extLst>
-          </p:cNvPr>
-          <p:cNvSpPr/>
-          <p:nvPr/>
-        </p:nvSpPr>
-        <p:spPr>
-          <a:xfrm flipV="1">
-            <a:off x="2530775" y="6947839"/>
-            <a:ext cx="88490" cy="76284"/>
-          </a:xfrm>
-          <a:prstGeom prst="triangle">
-            <a:avLst/>
-          </a:prstGeom>
-          <a:solidFill>
-            <a:srgbClr val="3CA951"/>
-          </a:solidFill>
-          <a:ln>
-            <a:noFill/>
-          </a:ln>
-        </p:spPr>
-        <p:style>
-          <a:lnRef idx="2">
-            <a:schemeClr val="accent1">
-              <a:shade val="15000"/>
-            </a:schemeClr>
-          </a:lnRef>
-          <a:fillRef idx="1">
-            <a:schemeClr val="accent1"/>
-          </a:fillRef>
-          <a:effectRef idx="0">
-            <a:schemeClr val="accent1"/>
-          </a:effectRef>
-          <a:fontRef idx="minor">
-            <a:schemeClr val="lt1"/>
-          </a:fontRef>
-        </p:style>
-        <p:txBody>
-          <a:bodyPr rtlCol="0" anchor="ctr"/>
-          <a:lstStyle/>
-          <a:p>
-            <a:pPr algn="ctr"/>
-            <a:endParaRPr lang="en-JP"/>
-          </a:p>
-        </p:txBody>
-      </p:sp>
-      <p:sp>
-        <p:nvSpPr>
-          <p:cNvPr id="42" name="Triangle 41">
-            <a:extLst>
-              <a:ext uri="{FF2B5EF4-FFF2-40B4-BE49-F238E27FC236}">
-                <a16:creationId xmlns:a16="http://schemas.microsoft.com/office/drawing/2014/main" id="{F6B4E599-8D69-7233-0C46-148D04376231}"/>
-              </a:ext>
-            </a:extLst>
-          </p:cNvPr>
-          <p:cNvSpPr/>
-          <p:nvPr/>
-        </p:nvSpPr>
-        <p:spPr>
-          <a:xfrm flipV="1">
-            <a:off x="2777037" y="6947839"/>
-            <a:ext cx="88490" cy="76284"/>
-          </a:xfrm>
-          <a:prstGeom prst="triangle">
-            <a:avLst/>
-          </a:prstGeom>
-          <a:solidFill>
-            <a:srgbClr val="3CA951"/>
-          </a:solidFill>
-          <a:ln>
-            <a:noFill/>
-          </a:ln>
-        </p:spPr>
-        <p:style>
-          <a:lnRef idx="2">
-            <a:schemeClr val="accent1">
-              <a:shade val="15000"/>
-            </a:schemeClr>
-          </a:lnRef>
-          <a:fillRef idx="1">
-            <a:schemeClr val="accent1"/>
-          </a:fillRef>
-          <a:effectRef idx="0">
-            <a:schemeClr val="accent1"/>
-          </a:effectRef>
-          <a:fontRef idx="minor">
-            <a:schemeClr val="lt1"/>
-          </a:fontRef>
-        </p:style>
-        <p:txBody>
-          <a:bodyPr rtlCol="0" anchor="ctr"/>
-          <a:lstStyle/>
-          <a:p>
-            <a:pPr algn="ctr"/>
-            <a:endParaRPr lang="en-JP"/>
-          </a:p>
-        </p:txBody>
-      </p:sp>
-      <p:sp>
-        <p:nvSpPr>
-          <p:cNvPr id="43" name="Triangle 42">
-            <a:extLst>
-              <a:ext uri="{FF2B5EF4-FFF2-40B4-BE49-F238E27FC236}">
-                <a16:creationId xmlns:a16="http://schemas.microsoft.com/office/drawing/2014/main" id="{3EDA01B9-6D39-855F-579E-7D5B211E1DD5}"/>
-              </a:ext>
-            </a:extLst>
-          </p:cNvPr>
-          <p:cNvSpPr/>
-          <p:nvPr/>
-        </p:nvSpPr>
-        <p:spPr>
-          <a:xfrm flipV="1">
-            <a:off x="3023299" y="6947839"/>
-            <a:ext cx="88490" cy="76284"/>
-          </a:xfrm>
-          <a:prstGeom prst="triangle">
-            <a:avLst/>
-          </a:prstGeom>
-          <a:solidFill>
-            <a:srgbClr val="3CA951"/>
-          </a:solidFill>
-          <a:ln>
-            <a:noFill/>
-          </a:ln>
-        </p:spPr>
-        <p:style>
-          <a:lnRef idx="2">
-            <a:schemeClr val="accent1">
-              <a:shade val="15000"/>
-            </a:schemeClr>
-          </a:lnRef>
-          <a:fillRef idx="1">
-            <a:schemeClr val="accent1"/>
-          </a:fillRef>
-          <a:effectRef idx="0">
-            <a:schemeClr val="accent1"/>
-          </a:effectRef>
-          <a:fontRef idx="minor">
-            <a:schemeClr val="lt1"/>
-          </a:fontRef>
-        </p:style>
-        <p:txBody>
-          <a:bodyPr rtlCol="0" anchor="ctr"/>
-          <a:lstStyle/>
-          <a:p>
-            <a:pPr algn="ctr"/>
-            <a:endParaRPr lang="en-JP"/>
-          </a:p>
-        </p:txBody>
-      </p:sp>
-      <p:sp>
-        <p:nvSpPr>
-          <p:cNvPr id="44" name="Triangle 43">
-            <a:extLst>
-              <a:ext uri="{FF2B5EF4-FFF2-40B4-BE49-F238E27FC236}">
-                <a16:creationId xmlns:a16="http://schemas.microsoft.com/office/drawing/2014/main" id="{B8943919-352A-C540-91E0-9E16A02491AD}"/>
-              </a:ext>
-            </a:extLst>
-          </p:cNvPr>
-          <p:cNvSpPr/>
-          <p:nvPr/>
-        </p:nvSpPr>
-        <p:spPr>
-          <a:xfrm flipV="1">
-            <a:off x="3269561" y="6947839"/>
-            <a:ext cx="88490" cy="76284"/>
-          </a:xfrm>
-          <a:prstGeom prst="triangle">
-            <a:avLst/>
-          </a:prstGeom>
-          <a:solidFill>
-            <a:srgbClr val="3CA951"/>
-          </a:solidFill>
-          <a:ln>
-            <a:noFill/>
-          </a:ln>
-        </p:spPr>
-        <p:style>
-          <a:lnRef idx="2">
-            <a:schemeClr val="accent1">
-              <a:shade val="15000"/>
-            </a:schemeClr>
-          </a:lnRef>
-          <a:fillRef idx="1">
-            <a:schemeClr val="accent1"/>
-          </a:fillRef>
-          <a:effectRef idx="0">
-            <a:schemeClr val="accent1"/>
-          </a:effectRef>
-          <a:fontRef idx="minor">
-            <a:schemeClr val="lt1"/>
-          </a:fontRef>
-        </p:style>
-        <p:txBody>
-          <a:bodyPr rtlCol="0" anchor="ctr"/>
-          <a:lstStyle/>
-          <a:p>
-            <a:pPr algn="ctr"/>
-            <a:endParaRPr lang="en-JP"/>
-          </a:p>
-        </p:txBody>
-      </p:sp>
-      <p:sp>
-        <p:nvSpPr>
-          <p:cNvPr id="45" name="Triangle 44">
-            <a:extLst>
-              <a:ext uri="{FF2B5EF4-FFF2-40B4-BE49-F238E27FC236}">
-                <a16:creationId xmlns:a16="http://schemas.microsoft.com/office/drawing/2014/main" id="{9485C4C8-C9D4-1A34-A437-AB83E0D2718C}"/>
-              </a:ext>
-            </a:extLst>
-          </p:cNvPr>
-          <p:cNvSpPr/>
-          <p:nvPr/>
-        </p:nvSpPr>
-        <p:spPr>
-          <a:xfrm flipV="1">
-            <a:off x="3515823" y="6947839"/>
-            <a:ext cx="88490" cy="76284"/>
-          </a:xfrm>
-          <a:prstGeom prst="triangle">
-            <a:avLst/>
-          </a:prstGeom>
-          <a:solidFill>
-            <a:srgbClr val="3CA951"/>
-          </a:solidFill>
-          <a:ln>
-            <a:noFill/>
-          </a:ln>
-        </p:spPr>
-        <p:style>
-          <a:lnRef idx="2">
-            <a:schemeClr val="accent1">
-              <a:shade val="15000"/>
-            </a:schemeClr>
-          </a:lnRef>
-          <a:fillRef idx="1">
-            <a:schemeClr val="accent1"/>
-          </a:fillRef>
-          <a:effectRef idx="0">
-            <a:schemeClr val="accent1"/>
-          </a:effectRef>
-          <a:fontRef idx="minor">
-            <a:schemeClr val="lt1"/>
-          </a:fontRef>
-        </p:style>
-        <p:txBody>
-          <a:bodyPr rtlCol="0" anchor="ctr"/>
-          <a:lstStyle/>
-          <a:p>
-            <a:pPr algn="ctr"/>
-            <a:endParaRPr lang="en-JP"/>
-          </a:p>
-        </p:txBody>
-      </p:sp>
-      <p:sp>
-        <p:nvSpPr>
-          <p:cNvPr id="46" name="Triangle 45">
-            <a:extLst>
-              <a:ext uri="{FF2B5EF4-FFF2-40B4-BE49-F238E27FC236}">
-                <a16:creationId xmlns:a16="http://schemas.microsoft.com/office/drawing/2014/main" id="{D9390F7C-3482-2BDA-D970-BF0153AAB4A1}"/>
-              </a:ext>
-            </a:extLst>
-          </p:cNvPr>
-          <p:cNvSpPr/>
-          <p:nvPr/>
-        </p:nvSpPr>
-        <p:spPr>
-          <a:xfrm flipV="1">
-            <a:off x="4500871" y="6947839"/>
-            <a:ext cx="88490" cy="76284"/>
-          </a:xfrm>
-          <a:prstGeom prst="triangle">
-            <a:avLst/>
-          </a:prstGeom>
-          <a:solidFill>
-            <a:srgbClr val="3CA951"/>
-          </a:solidFill>
-          <a:ln>
-            <a:noFill/>
-          </a:ln>
-        </p:spPr>
-        <p:style>
-          <a:lnRef idx="2">
-            <a:schemeClr val="accent1">
-              <a:shade val="15000"/>
-            </a:schemeClr>
-          </a:lnRef>
-          <a:fillRef idx="1">
-            <a:schemeClr val="accent1"/>
-          </a:fillRef>
-          <a:effectRef idx="0">
-            <a:schemeClr val="accent1"/>
-          </a:effectRef>
-          <a:fontRef idx="minor">
-            <a:schemeClr val="lt1"/>
-          </a:fontRef>
-        </p:style>
-        <p:txBody>
-          <a:bodyPr rtlCol="0" anchor="ctr"/>
-          <a:lstStyle/>
-          <a:p>
-            <a:pPr algn="ctr"/>
-            <a:endParaRPr lang="en-JP"/>
-          </a:p>
-        </p:txBody>
-      </p:sp>
-      <p:sp>
-        <p:nvSpPr>
-          <p:cNvPr id="47" name="Triangle 46">
-            <a:extLst>
-              <a:ext uri="{FF2B5EF4-FFF2-40B4-BE49-F238E27FC236}">
-                <a16:creationId xmlns:a16="http://schemas.microsoft.com/office/drawing/2014/main" id="{663C1069-6EA6-C6DB-30C8-AE46AF27D10F}"/>
-              </a:ext>
-            </a:extLst>
-          </p:cNvPr>
-          <p:cNvSpPr/>
-          <p:nvPr/>
-        </p:nvSpPr>
-        <p:spPr>
-          <a:xfrm flipV="1">
-            <a:off x="4747133" y="6947839"/>
-            <a:ext cx="88490" cy="76284"/>
-          </a:xfrm>
-          <a:prstGeom prst="triangle">
-            <a:avLst/>
-          </a:prstGeom>
-          <a:solidFill>
-            <a:srgbClr val="3CA951"/>
-          </a:solidFill>
-          <a:ln>
-            <a:noFill/>
-          </a:ln>
-        </p:spPr>
-        <p:style>
-          <a:lnRef idx="2">
-            <a:schemeClr val="accent1">
-              <a:shade val="15000"/>
-            </a:schemeClr>
-          </a:lnRef>
-          <a:fillRef idx="1">
-            <a:schemeClr val="accent1"/>
-          </a:fillRef>
-          <a:effectRef idx="0">
-            <a:schemeClr val="accent1"/>
-          </a:effectRef>
-          <a:fontRef idx="minor">
-            <a:schemeClr val="lt1"/>
-          </a:fontRef>
-        </p:style>
-        <p:txBody>
-          <a:bodyPr rtlCol="0" anchor="ctr"/>
-          <a:lstStyle/>
-          <a:p>
-            <a:pPr algn="ctr"/>
-            <a:endParaRPr lang="en-JP"/>
-          </a:p>
-        </p:txBody>
-      </p:sp>
-      <p:sp>
-        <p:nvSpPr>
-          <p:cNvPr id="48" name="Triangle 47">
-            <a:extLst>
-              <a:ext uri="{FF2B5EF4-FFF2-40B4-BE49-F238E27FC236}">
-                <a16:creationId xmlns:a16="http://schemas.microsoft.com/office/drawing/2014/main" id="{7FC48785-7338-888A-E73D-D80E7CD7C2D9}"/>
-              </a:ext>
-            </a:extLst>
-          </p:cNvPr>
-          <p:cNvSpPr/>
-          <p:nvPr/>
-        </p:nvSpPr>
-        <p:spPr>
-          <a:xfrm flipV="1">
-            <a:off x="5239657" y="6947839"/>
-            <a:ext cx="88490" cy="76284"/>
-          </a:xfrm>
-          <a:prstGeom prst="triangle">
-            <a:avLst/>
-          </a:prstGeom>
-          <a:solidFill>
-            <a:srgbClr val="3CA951"/>
-          </a:solidFill>
-          <a:ln>
-            <a:noFill/>
-          </a:ln>
-        </p:spPr>
-        <p:style>
-          <a:lnRef idx="2">
-            <a:schemeClr val="accent1">
-              <a:shade val="15000"/>
-            </a:schemeClr>
-          </a:lnRef>
-          <a:fillRef idx="1">
-            <a:schemeClr val="accent1"/>
-          </a:fillRef>
-          <a:effectRef idx="0">
-            <a:schemeClr val="accent1"/>
-          </a:effectRef>
-          <a:fontRef idx="minor">
-            <a:schemeClr val="lt1"/>
-          </a:fontRef>
-        </p:style>
-        <p:txBody>
-          <a:bodyPr rtlCol="0" anchor="ctr"/>
-          <a:lstStyle/>
-          <a:p>
-            <a:pPr algn="ctr"/>
-            <a:endParaRPr lang="en-JP"/>
-          </a:p>
-        </p:txBody>
-      </p:sp>
-      <p:sp>
-        <p:nvSpPr>
-          <p:cNvPr id="49" name="Triangle 48">
-            <a:extLst>
-              <a:ext uri="{FF2B5EF4-FFF2-40B4-BE49-F238E27FC236}">
-                <a16:creationId xmlns:a16="http://schemas.microsoft.com/office/drawing/2014/main" id="{AB054C72-E3B6-2ADA-2337-AB5ABF483C7A}"/>
-              </a:ext>
-            </a:extLst>
-          </p:cNvPr>
-          <p:cNvSpPr/>
-          <p:nvPr/>
-        </p:nvSpPr>
-        <p:spPr>
-          <a:xfrm flipV="1">
-            <a:off x="5485924" y="6947839"/>
-            <a:ext cx="88490" cy="76284"/>
-          </a:xfrm>
-          <a:prstGeom prst="triangle">
-            <a:avLst/>
-          </a:prstGeom>
-          <a:solidFill>
-            <a:srgbClr val="3CA951"/>
-          </a:solidFill>
-          <a:ln>
-            <a:noFill/>
-          </a:ln>
-        </p:spPr>
-        <p:style>
-          <a:lnRef idx="2">
-            <a:schemeClr val="accent1">
-              <a:shade val="15000"/>
-            </a:schemeClr>
-          </a:lnRef>
-          <a:fillRef idx="1">
-            <a:schemeClr val="accent1"/>
-          </a:fillRef>
-          <a:effectRef idx="0">
-            <a:schemeClr val="accent1"/>
-          </a:effectRef>
-          <a:fontRef idx="minor">
-            <a:schemeClr val="lt1"/>
-          </a:fontRef>
-        </p:style>
-        <p:txBody>
-          <a:bodyPr rtlCol="0" anchor="ctr"/>
-          <a:lstStyle/>
-          <a:p>
-            <a:pPr algn="ctr"/>
-            <a:endParaRPr lang="en-JP"/>
-          </a:p>
-        </p:txBody>
-      </p:sp>
-      <p:sp>
-        <p:nvSpPr>
-          <p:cNvPr id="50" name="Triangle 49">
-            <a:extLst>
-              <a:ext uri="{FF2B5EF4-FFF2-40B4-BE49-F238E27FC236}">
-                <a16:creationId xmlns:a16="http://schemas.microsoft.com/office/drawing/2014/main" id="{C01600BC-D5F6-CB51-F372-7BCF15F8921D}"/>
-              </a:ext>
-            </a:extLst>
-          </p:cNvPr>
-          <p:cNvSpPr/>
-          <p:nvPr/>
-        </p:nvSpPr>
-        <p:spPr>
-          <a:xfrm flipV="1">
-            <a:off x="4993395" y="6947839"/>
-            <a:ext cx="88490" cy="76284"/>
-          </a:xfrm>
-          <a:prstGeom prst="triangle">
-            <a:avLst/>
-          </a:prstGeom>
-          <a:solidFill>
-            <a:srgbClr val="3CA951"/>
-          </a:solidFill>
-          <a:ln>
-            <a:noFill/>
-          </a:ln>
-        </p:spPr>
-        <p:style>
-          <a:lnRef idx="2">
-            <a:schemeClr val="accent1">
-              <a:shade val="15000"/>
-            </a:schemeClr>
-          </a:lnRef>
-          <a:fillRef idx="1">
-            <a:schemeClr val="accent1"/>
-          </a:fillRef>
-          <a:effectRef idx="0">
-            <a:schemeClr val="accent1"/>
-          </a:effectRef>
-          <a:fontRef idx="minor">
-            <a:schemeClr val="lt1"/>
-          </a:fontRef>
-        </p:style>
-        <p:txBody>
-          <a:bodyPr rtlCol="0" anchor="ctr"/>
-          <a:lstStyle/>
-          <a:p>
-            <a:pPr algn="ctr"/>
-            <a:endParaRPr lang="en-JP"/>
-          </a:p>
-        </p:txBody>
-      </p:sp>
-      <p:sp>
-        <p:nvSpPr>
-          <p:cNvPr id="51" name="Triangle 50">
-            <a:extLst>
-              <a:ext uri="{FF2B5EF4-FFF2-40B4-BE49-F238E27FC236}">
-                <a16:creationId xmlns:a16="http://schemas.microsoft.com/office/drawing/2014/main" id="{BA5C258F-D1A6-FEBF-A34D-75E1BDDD1992}"/>
-              </a:ext>
-            </a:extLst>
-          </p:cNvPr>
-          <p:cNvSpPr/>
-          <p:nvPr/>
-        </p:nvSpPr>
-        <p:spPr>
-          <a:xfrm flipV="1">
-            <a:off x="4254609" y="6947839"/>
-            <a:ext cx="88490" cy="76284"/>
-          </a:xfrm>
-          <a:prstGeom prst="triangle">
-            <a:avLst/>
-          </a:prstGeom>
-          <a:solidFill>
-            <a:srgbClr val="3CA951"/>
-          </a:solidFill>
-          <a:ln>
-            <a:noFill/>
-          </a:ln>
-        </p:spPr>
-        <p:style>
-          <a:lnRef idx="2">
-            <a:schemeClr val="accent1">
-              <a:shade val="15000"/>
-            </a:schemeClr>
-          </a:lnRef>
-          <a:fillRef idx="1">
-            <a:schemeClr val="accent1"/>
-          </a:fillRef>
-          <a:effectRef idx="0">
-            <a:schemeClr val="accent1"/>
-          </a:effectRef>
-          <a:fontRef idx="minor">
-            <a:schemeClr val="lt1"/>
-          </a:fontRef>
-        </p:style>
-        <p:txBody>
-          <a:bodyPr rtlCol="0" anchor="ctr"/>
-          <a:lstStyle/>
-          <a:p>
-            <a:pPr algn="ctr"/>
-            <a:endParaRPr lang="en-JP"/>
-          </a:p>
-        </p:txBody>
-      </p:sp>
-      <p:sp>
-        <p:nvSpPr>
-          <p:cNvPr id="52" name="Triangle 51">
-            <a:extLst>
-              <a:ext uri="{FF2B5EF4-FFF2-40B4-BE49-F238E27FC236}">
-                <a16:creationId xmlns:a16="http://schemas.microsoft.com/office/drawing/2014/main" id="{5F6D8D88-FE06-4363-0156-C6FFC4735D56}"/>
-              </a:ext>
-            </a:extLst>
-          </p:cNvPr>
-          <p:cNvSpPr/>
-          <p:nvPr/>
-        </p:nvSpPr>
-        <p:spPr>
-          <a:xfrm flipV="1">
-            <a:off x="4008347" y="6947839"/>
-            <a:ext cx="88490" cy="76284"/>
-          </a:xfrm>
-          <a:prstGeom prst="triangle">
-            <a:avLst/>
-          </a:prstGeom>
-          <a:solidFill>
-            <a:srgbClr val="3CA951"/>
-          </a:solidFill>
-          <a:ln>
-            <a:noFill/>
-          </a:ln>
-        </p:spPr>
-        <p:style>
-          <a:lnRef idx="2">
-            <a:schemeClr val="accent1">
-              <a:shade val="15000"/>
-            </a:schemeClr>
-          </a:lnRef>
-          <a:fillRef idx="1">
-            <a:schemeClr val="accent1"/>
-          </a:fillRef>
-          <a:effectRef idx="0">
-            <a:schemeClr val="accent1"/>
-          </a:effectRef>
-          <a:fontRef idx="minor">
-            <a:schemeClr val="lt1"/>
-          </a:fontRef>
-        </p:style>
-        <p:txBody>
-          <a:bodyPr rtlCol="0" anchor="ctr"/>
-          <a:lstStyle/>
-          <a:p>
-            <a:pPr algn="ctr"/>
-            <a:endParaRPr lang="en-JP"/>
-          </a:p>
-        </p:txBody>
-      </p:sp>
-      <p:sp>
-        <p:nvSpPr>
-          <p:cNvPr id="53" name="Triangle 52">
-            <a:extLst>
-              <a:ext uri="{FF2B5EF4-FFF2-40B4-BE49-F238E27FC236}">
-                <a16:creationId xmlns:a16="http://schemas.microsoft.com/office/drawing/2014/main" id="{0A9DEA9A-1892-5B4A-20CC-68D92835AE8B}"/>
-              </a:ext>
-            </a:extLst>
-          </p:cNvPr>
-          <p:cNvSpPr/>
-          <p:nvPr/>
-        </p:nvSpPr>
-        <p:spPr>
-          <a:xfrm flipV="1">
-            <a:off x="3762085" y="6947839"/>
-            <a:ext cx="88490" cy="76284"/>
-          </a:xfrm>
-          <a:prstGeom prst="triangle">
-            <a:avLst/>
-          </a:prstGeom>
-          <a:solidFill>
-            <a:srgbClr val="3CA951"/>
-          </a:solidFill>
-          <a:ln>
-            <a:noFill/>
-          </a:ln>
-        </p:spPr>
-        <p:style>
-          <a:lnRef idx="2">
-            <a:schemeClr val="accent1">
-              <a:shade val="15000"/>
-            </a:schemeClr>
-          </a:lnRef>
-          <a:fillRef idx="1">
-            <a:schemeClr val="accent1"/>
-          </a:fillRef>
-          <a:effectRef idx="0">
-            <a:schemeClr val="accent1"/>
-          </a:effectRef>
-          <a:fontRef idx="minor">
-            <a:schemeClr val="lt1"/>
-          </a:fontRef>
-        </p:style>
-        <p:txBody>
-          <a:bodyPr rtlCol="0" anchor="ctr"/>
-          <a:lstStyle/>
-          <a:p>
-            <a:pPr algn="ctr"/>
-            <a:endParaRPr lang="en-JP"/>
-          </a:p>
-        </p:txBody>
-      </p:sp>
-      <p:sp>
-        <p:nvSpPr>
-          <p:cNvPr id="54" name="Triangle 53">
-            <a:extLst>
-              <a:ext uri="{FF2B5EF4-FFF2-40B4-BE49-F238E27FC236}">
-                <a16:creationId xmlns:a16="http://schemas.microsoft.com/office/drawing/2014/main" id="{C6194FB4-DBA1-39CC-67A8-703696615C1D}"/>
-              </a:ext>
-            </a:extLst>
-          </p:cNvPr>
-          <p:cNvSpPr/>
-          <p:nvPr/>
-        </p:nvSpPr>
-        <p:spPr>
-          <a:xfrm flipV="1">
-            <a:off x="2410759" y="6564262"/>
-            <a:ext cx="88490" cy="76284"/>
-          </a:xfrm>
-          <a:prstGeom prst="triangle">
-            <a:avLst/>
-          </a:prstGeom>
-          <a:solidFill>
-            <a:srgbClr val="EFB118"/>
-          </a:solidFill>
-          <a:ln>
-            <a:noFill/>
-          </a:ln>
-        </p:spPr>
-        <p:style>
-          <a:lnRef idx="2">
-            <a:schemeClr val="accent1">
-              <a:shade val="15000"/>
-            </a:schemeClr>
-          </a:lnRef>
-          <a:fillRef idx="1">
-            <a:schemeClr val="accent1"/>
-          </a:fillRef>
-          <a:effectRef idx="0">
-            <a:schemeClr val="accent1"/>
-          </a:effectRef>
-          <a:fontRef idx="minor">
-            <a:schemeClr val="lt1"/>
-          </a:fontRef>
-        </p:style>
-        <p:txBody>
-          <a:bodyPr rtlCol="0" anchor="ctr"/>
-          <a:lstStyle/>
-          <a:p>
-            <a:pPr algn="ctr"/>
-            <a:endParaRPr lang="en-JP"/>
-          </a:p>
-        </p:txBody>
-      </p:sp>
-      <p:sp>
-        <p:nvSpPr>
-          <p:cNvPr id="55" name="TextBox 54">
-            <a:extLst>
-              <a:ext uri="{FF2B5EF4-FFF2-40B4-BE49-F238E27FC236}">
-                <a16:creationId xmlns:a16="http://schemas.microsoft.com/office/drawing/2014/main" id="{E7147EFB-7F86-A6BE-9FC9-009FB64EDC22}"/>
-              </a:ext>
-            </a:extLst>
-          </p:cNvPr>
-          <p:cNvSpPr txBox="1"/>
-          <p:nvPr/>
-        </p:nvSpPr>
-        <p:spPr>
-          <a:xfrm>
-            <a:off x="6198654" y="6816704"/>
-            <a:ext cx="2456122" cy="338554"/>
-          </a:xfrm>
-          <a:prstGeom prst="rect">
-            <a:avLst/>
-          </a:prstGeom>
-          <a:noFill/>
-        </p:spPr>
-        <p:txBody>
-          <a:bodyPr wrap="none" rtlCol="0">
-            <a:spAutoFit/>
-          </a:bodyPr>
-          <a:lstStyle/>
-          <a:p>
-            <a:r>
-              <a:rPr lang="en-US" sz="1600" b="1" dirty="0">
-                <a:solidFill>
-                  <a:srgbClr val="3CA951"/>
-                </a:solidFill>
-                <a:latin typeface="Arial" panose="020B0604020202020204" pitchFamily="34" charset="0"/>
-                <a:cs typeface="Arial" panose="020B0604020202020204" pitchFamily="34" charset="0"/>
-              </a:rPr>
-              <a:t>tazobactam/piperacillin</a:t>
-            </a:r>
-            <a:endParaRPr lang="en-JP" sz="1600" b="1" dirty="0">
-              <a:solidFill>
-                <a:srgbClr val="3CA951"/>
-              </a:solidFill>
-              <a:latin typeface="Arial" panose="020B0604020202020204" pitchFamily="34" charset="0"/>
-              <a:cs typeface="Arial" panose="020B0604020202020204" pitchFamily="34" charset="0"/>
-            </a:endParaRPr>
-          </a:p>
-        </p:txBody>
-      </p:sp>
-      <p:pic>
-        <p:nvPicPr>
-          <p:cNvPr id="57" name="Picture 56" descr="A purple syringe with a needle&#10;&#10;AI-generated content may be incorrect.">
-            <a:extLst>
-              <a:ext uri="{FF2B5EF4-FFF2-40B4-BE49-F238E27FC236}">
-                <a16:creationId xmlns:a16="http://schemas.microsoft.com/office/drawing/2014/main" id="{112EA416-58AF-EB4D-5927-95667F129A49}"/>
+                <a16:creationId xmlns:a16="http://schemas.microsoft.com/office/drawing/2014/main" id="{FD511FFB-DBFB-D3D3-88F0-87C5CD8F85BB}"/>
               </a:ext>
             </a:extLst>
           </p:cNvPr>
@@ -5098,20 +5103,139 @@
         </p:blipFill>
         <p:spPr>
           <a:xfrm>
-            <a:off x="6525423" y="7247027"/>
-            <a:ext cx="338554" cy="338554"/>
+            <a:off x="2593881" y="6061219"/>
+            <a:ext cx="674719" cy="674719"/>
           </a:xfrm>
           <a:prstGeom prst="rect">
             <a:avLst/>
           </a:prstGeom>
         </p:spPr>
       </p:pic>
-      <p:sp>
-        <p:nvSpPr>
-          <p:cNvPr id="63" name="Triangle 62">
+      <p:pic>
+        <p:nvPicPr>
+          <p:cNvPr id="15" name="Picture 14" descr="A grey syringe with a needle&#10;&#10;AI-generated content may be incorrect.">
             <a:extLst>
               <a:ext uri="{FF2B5EF4-FFF2-40B4-BE49-F238E27FC236}">
-                <a16:creationId xmlns:a16="http://schemas.microsoft.com/office/drawing/2014/main" id="{75A0CF53-4911-C47C-9604-C1EA5D8C0094}"/>
+                <a16:creationId xmlns:a16="http://schemas.microsoft.com/office/drawing/2014/main" id="{547599B3-F789-752E-FBC0-E61D324DDE44}"/>
+              </a:ext>
+            </a:extLst>
+          </p:cNvPr>
+          <p:cNvPicPr>
+            <a:picLocks noChangeAspect="1"/>
+          </p:cNvPicPr>
+          <p:nvPr/>
+        </p:nvPicPr>
+        <p:blipFill>
+          <a:blip r:embed="rId9"/>
+          <a:stretch>
+            <a:fillRect/>
+          </a:stretch>
+        </p:blipFill>
+        <p:spPr>
+          <a:xfrm rot="13618514">
+            <a:off x="3647303" y="11003737"/>
+            <a:ext cx="530133" cy="530133"/>
+          </a:xfrm>
+          <a:prstGeom prst="rect">
+            <a:avLst/>
+          </a:prstGeom>
+        </p:spPr>
+      </p:pic>
+      <p:pic>
+        <p:nvPicPr>
+          <p:cNvPr id="18" name="Picture 17" descr="A purple syringe with a needle&#10;&#10;AI-generated content may be incorrect.">
+            <a:extLst>
+              <a:ext uri="{FF2B5EF4-FFF2-40B4-BE49-F238E27FC236}">
+                <a16:creationId xmlns:a16="http://schemas.microsoft.com/office/drawing/2014/main" id="{E05BB3A9-CE44-189E-DAD5-0CEBA1E3059B}"/>
+              </a:ext>
+            </a:extLst>
+          </p:cNvPr>
+          <p:cNvPicPr>
+            <a:picLocks noChangeAspect="1"/>
+          </p:cNvPicPr>
+          <p:nvPr/>
+        </p:nvPicPr>
+        <p:blipFill>
+          <a:blip r:embed="rId10"/>
+          <a:stretch>
+            <a:fillRect/>
+          </a:stretch>
+        </p:blipFill>
+        <p:spPr>
+          <a:xfrm rot="10800000">
+            <a:off x="6547788" y="7637979"/>
+            <a:ext cx="579419" cy="579419"/>
+          </a:xfrm>
+          <a:prstGeom prst="rect">
+            <a:avLst/>
+          </a:prstGeom>
+        </p:spPr>
+      </p:pic>
+      <p:pic>
+        <p:nvPicPr>
+          <p:cNvPr id="21" name="Picture 20" descr="A red syringe with a needle&#10;&#10;AI-generated content may be incorrect.">
+            <a:extLst>
+              <a:ext uri="{FF2B5EF4-FFF2-40B4-BE49-F238E27FC236}">
+                <a16:creationId xmlns:a16="http://schemas.microsoft.com/office/drawing/2014/main" id="{541B622A-B6C7-0C68-2359-629290A7486C}"/>
+              </a:ext>
+            </a:extLst>
+          </p:cNvPr>
+          <p:cNvPicPr>
+            <a:picLocks noChangeAspect="1"/>
+          </p:cNvPicPr>
+          <p:nvPr/>
+        </p:nvPicPr>
+        <p:blipFill>
+          <a:blip r:embed="rId11"/>
+          <a:stretch>
+            <a:fillRect/>
+          </a:stretch>
+        </p:blipFill>
+        <p:spPr>
+          <a:xfrm rot="13575374">
+            <a:off x="6074720" y="11290179"/>
+            <a:ext cx="529200" cy="529200"/>
+          </a:xfrm>
+          <a:prstGeom prst="rect">
+            <a:avLst/>
+          </a:prstGeom>
+        </p:spPr>
+      </p:pic>
+      <p:pic>
+        <p:nvPicPr>
+          <p:cNvPr id="24" name="Picture 23" descr="A graph of a line&#10;&#10;AI-generated content may be incorrect.">
+            <a:extLst>
+              <a:ext uri="{FF2B5EF4-FFF2-40B4-BE49-F238E27FC236}">
+                <a16:creationId xmlns:a16="http://schemas.microsoft.com/office/drawing/2014/main" id="{69AB76E4-7765-4A4E-0121-2D2129275C13}"/>
+              </a:ext>
+            </a:extLst>
+          </p:cNvPr>
+          <p:cNvPicPr>
+            <a:picLocks noChangeAspect="1"/>
+          </p:cNvPicPr>
+          <p:nvPr/>
+        </p:nvPicPr>
+        <p:blipFill>
+          <a:blip r:embed="rId3"/>
+          <a:srcRect l="82057" r="1564"/>
+          <a:stretch/>
+        </p:blipFill>
+        <p:spPr>
+          <a:xfrm>
+            <a:off x="8768535" y="12964168"/>
+            <a:ext cx="1785722" cy="4672375"/>
+          </a:xfrm>
+          <a:prstGeom prst="rect">
+            <a:avLst/>
+          </a:prstGeom>
+        </p:spPr>
+      </p:pic>
+      <p:sp>
+        <p:nvSpPr>
+          <p:cNvPr id="2" name="Rectangle 1">
+            <a:extLst>
+              <a:ext uri="{FF2B5EF4-FFF2-40B4-BE49-F238E27FC236}">
+                <a16:creationId xmlns:a16="http://schemas.microsoft.com/office/drawing/2014/main" id="{EC9EC6FF-7C1B-83D0-F7E3-D5645938C71C}"/>
               </a:ext>
             </a:extLst>
           </p:cNvPr>
@@ -5119,15 +5243,1327 @@
           <p:nvPr/>
         </p:nvSpPr>
         <p:spPr>
+          <a:xfrm>
+            <a:off x="1093808" y="11562181"/>
+            <a:ext cx="39600" cy="100800"/>
+          </a:xfrm>
+          <a:prstGeom prst="rect">
+            <a:avLst/>
+          </a:prstGeom>
+          <a:solidFill>
+            <a:srgbClr val="FF725C"/>
+          </a:solidFill>
+          <a:ln>
+            <a:noFill/>
+          </a:ln>
+        </p:spPr>
+        <p:style>
+          <a:lnRef idx="2">
+            <a:schemeClr val="accent1">
+              <a:shade val="15000"/>
+            </a:schemeClr>
+          </a:lnRef>
+          <a:fillRef idx="1">
+            <a:schemeClr val="accent1"/>
+          </a:fillRef>
+          <a:effectRef idx="0">
+            <a:schemeClr val="accent1"/>
+          </a:effectRef>
+          <a:fontRef idx="minor">
+            <a:schemeClr val="lt1"/>
+          </a:fontRef>
+        </p:style>
+        <p:txBody>
+          <a:bodyPr rtlCol="0" anchor="ctr"/>
+          <a:lstStyle/>
+          <a:p>
+            <a:pPr algn="ctr"/>
+            <a:endParaRPr lang="en-JP"/>
+          </a:p>
+        </p:txBody>
+      </p:sp>
+      <p:sp>
+        <p:nvSpPr>
+          <p:cNvPr id="4" name="Rectangle 3">
+            <a:extLst>
+              <a:ext uri="{FF2B5EF4-FFF2-40B4-BE49-F238E27FC236}">
+                <a16:creationId xmlns:a16="http://schemas.microsoft.com/office/drawing/2014/main" id="{EAEFE62F-A783-119B-A90E-974667962CDE}"/>
+              </a:ext>
+            </a:extLst>
+          </p:cNvPr>
+          <p:cNvSpPr/>
+          <p:nvPr/>
+        </p:nvSpPr>
+        <p:spPr>
+          <a:xfrm>
+            <a:off x="1133408" y="11511781"/>
+            <a:ext cx="241200" cy="151200"/>
+          </a:xfrm>
+          <a:prstGeom prst="rect">
+            <a:avLst/>
+          </a:prstGeom>
+          <a:solidFill>
+            <a:srgbClr val="FF725C"/>
+          </a:solidFill>
+          <a:ln>
+            <a:noFill/>
+          </a:ln>
+        </p:spPr>
+        <p:style>
+          <a:lnRef idx="2">
+            <a:schemeClr val="accent1">
+              <a:shade val="15000"/>
+            </a:schemeClr>
+          </a:lnRef>
+          <a:fillRef idx="1">
+            <a:schemeClr val="accent1"/>
+          </a:fillRef>
+          <a:effectRef idx="0">
+            <a:schemeClr val="accent1"/>
+          </a:effectRef>
+          <a:fontRef idx="minor">
+            <a:schemeClr val="lt1"/>
+          </a:fontRef>
+        </p:style>
+        <p:txBody>
+          <a:bodyPr rtlCol="0" anchor="ctr"/>
+          <a:lstStyle/>
+          <a:p>
+            <a:pPr algn="ctr"/>
+            <a:endParaRPr lang="en-JP"/>
+          </a:p>
+        </p:txBody>
+      </p:sp>
+      <p:sp>
+        <p:nvSpPr>
+          <p:cNvPr id="6" name="Rectangle 5">
+            <a:extLst>
+              <a:ext uri="{FF2B5EF4-FFF2-40B4-BE49-F238E27FC236}">
+                <a16:creationId xmlns:a16="http://schemas.microsoft.com/office/drawing/2014/main" id="{584F4902-EA56-AF8B-63DE-A91A6355FD1E}"/>
+              </a:ext>
+            </a:extLst>
+          </p:cNvPr>
+          <p:cNvSpPr/>
+          <p:nvPr/>
+        </p:nvSpPr>
+        <p:spPr>
+          <a:xfrm>
+            <a:off x="1374608" y="11486581"/>
+            <a:ext cx="241200" cy="176400"/>
+          </a:xfrm>
+          <a:prstGeom prst="rect">
+            <a:avLst/>
+          </a:prstGeom>
+          <a:solidFill>
+            <a:srgbClr val="FF725C"/>
+          </a:solidFill>
+          <a:ln>
+            <a:noFill/>
+          </a:ln>
+        </p:spPr>
+        <p:style>
+          <a:lnRef idx="2">
+            <a:schemeClr val="accent1">
+              <a:shade val="15000"/>
+            </a:schemeClr>
+          </a:lnRef>
+          <a:fillRef idx="1">
+            <a:schemeClr val="accent1"/>
+          </a:fillRef>
+          <a:effectRef idx="0">
+            <a:schemeClr val="accent1"/>
+          </a:effectRef>
+          <a:fontRef idx="minor">
+            <a:schemeClr val="lt1"/>
+          </a:fontRef>
+        </p:style>
+        <p:txBody>
+          <a:bodyPr rtlCol="0" anchor="ctr"/>
+          <a:lstStyle/>
+          <a:p>
+            <a:pPr algn="ctr"/>
+            <a:endParaRPr lang="en-JP"/>
+          </a:p>
+        </p:txBody>
+      </p:sp>
+      <p:sp>
+        <p:nvSpPr>
+          <p:cNvPr id="14" name="Rectangle 13">
+            <a:extLst>
+              <a:ext uri="{FF2B5EF4-FFF2-40B4-BE49-F238E27FC236}">
+                <a16:creationId xmlns:a16="http://schemas.microsoft.com/office/drawing/2014/main" id="{C6461AF3-180D-D36D-DF38-7F3DF3D14AB1}"/>
+              </a:ext>
+            </a:extLst>
+          </p:cNvPr>
+          <p:cNvSpPr/>
+          <p:nvPr/>
+        </p:nvSpPr>
+        <p:spPr>
+          <a:xfrm>
+            <a:off x="1615808" y="11461381"/>
+            <a:ext cx="442800" cy="201600"/>
+          </a:xfrm>
+          <a:prstGeom prst="rect">
+            <a:avLst/>
+          </a:prstGeom>
+          <a:solidFill>
+            <a:srgbClr val="FF725C"/>
+          </a:solidFill>
+          <a:ln>
+            <a:noFill/>
+          </a:ln>
+        </p:spPr>
+        <p:style>
+          <a:lnRef idx="2">
+            <a:schemeClr val="accent1">
+              <a:shade val="15000"/>
+            </a:schemeClr>
+          </a:lnRef>
+          <a:fillRef idx="1">
+            <a:schemeClr val="accent1"/>
+          </a:fillRef>
+          <a:effectRef idx="0">
+            <a:schemeClr val="accent1"/>
+          </a:effectRef>
+          <a:fontRef idx="minor">
+            <a:schemeClr val="lt1"/>
+          </a:fontRef>
+        </p:style>
+        <p:txBody>
+          <a:bodyPr rtlCol="0" anchor="ctr"/>
+          <a:lstStyle/>
+          <a:p>
+            <a:pPr algn="ctr"/>
+            <a:endParaRPr lang="en-JP"/>
+          </a:p>
+        </p:txBody>
+      </p:sp>
+      <p:sp>
+        <p:nvSpPr>
+          <p:cNvPr id="16" name="Rectangle 15">
+            <a:extLst>
+              <a:ext uri="{FF2B5EF4-FFF2-40B4-BE49-F238E27FC236}">
+                <a16:creationId xmlns:a16="http://schemas.microsoft.com/office/drawing/2014/main" id="{49DA043F-6086-C6CE-F0C9-5C17ED073BA3}"/>
+              </a:ext>
+            </a:extLst>
+          </p:cNvPr>
+          <p:cNvSpPr/>
+          <p:nvPr/>
+        </p:nvSpPr>
+        <p:spPr>
+          <a:xfrm>
+            <a:off x="2058608" y="11486581"/>
+            <a:ext cx="482400" cy="176400"/>
+          </a:xfrm>
+          <a:prstGeom prst="rect">
+            <a:avLst/>
+          </a:prstGeom>
+          <a:solidFill>
+            <a:srgbClr val="FF725C"/>
+          </a:solidFill>
+          <a:ln>
+            <a:noFill/>
+          </a:ln>
+        </p:spPr>
+        <p:style>
+          <a:lnRef idx="2">
+            <a:schemeClr val="accent1">
+              <a:shade val="15000"/>
+            </a:schemeClr>
+          </a:lnRef>
+          <a:fillRef idx="1">
+            <a:schemeClr val="accent1"/>
+          </a:fillRef>
+          <a:effectRef idx="0">
+            <a:schemeClr val="accent1"/>
+          </a:effectRef>
+          <a:fontRef idx="minor">
+            <a:schemeClr val="lt1"/>
+          </a:fontRef>
+        </p:style>
+        <p:txBody>
+          <a:bodyPr rtlCol="0" anchor="ctr"/>
+          <a:lstStyle/>
+          <a:p>
+            <a:pPr algn="ctr"/>
+            <a:endParaRPr lang="en-JP"/>
+          </a:p>
+        </p:txBody>
+      </p:sp>
+      <p:sp>
+        <p:nvSpPr>
+          <p:cNvPr id="19" name="Rectangle 18">
+            <a:extLst>
+              <a:ext uri="{FF2B5EF4-FFF2-40B4-BE49-F238E27FC236}">
+                <a16:creationId xmlns:a16="http://schemas.microsoft.com/office/drawing/2014/main" id="{3D048CAE-D567-A542-258F-A5EB8407FCD2}"/>
+              </a:ext>
+            </a:extLst>
+          </p:cNvPr>
+          <p:cNvSpPr/>
+          <p:nvPr/>
+        </p:nvSpPr>
+        <p:spPr>
+          <a:xfrm>
+            <a:off x="2541008" y="11526181"/>
+            <a:ext cx="201600" cy="136800"/>
+          </a:xfrm>
+          <a:prstGeom prst="rect">
+            <a:avLst/>
+          </a:prstGeom>
+          <a:solidFill>
+            <a:srgbClr val="FF725C"/>
+          </a:solidFill>
+          <a:ln>
+            <a:noFill/>
+          </a:ln>
+        </p:spPr>
+        <p:style>
+          <a:lnRef idx="2">
+            <a:schemeClr val="accent1">
+              <a:shade val="15000"/>
+            </a:schemeClr>
+          </a:lnRef>
+          <a:fillRef idx="1">
+            <a:schemeClr val="accent1"/>
+          </a:fillRef>
+          <a:effectRef idx="0">
+            <a:schemeClr val="accent1"/>
+          </a:effectRef>
+          <a:fontRef idx="minor">
+            <a:schemeClr val="lt1"/>
+          </a:fontRef>
+        </p:style>
+        <p:txBody>
+          <a:bodyPr rtlCol="0" anchor="ctr"/>
+          <a:lstStyle/>
+          <a:p>
+            <a:pPr algn="ctr"/>
+            <a:endParaRPr lang="en-JP"/>
+          </a:p>
+        </p:txBody>
+      </p:sp>
+      <p:sp>
+        <p:nvSpPr>
+          <p:cNvPr id="22" name="Rectangle 21">
+            <a:extLst>
+              <a:ext uri="{FF2B5EF4-FFF2-40B4-BE49-F238E27FC236}">
+                <a16:creationId xmlns:a16="http://schemas.microsoft.com/office/drawing/2014/main" id="{C7A097DE-6421-0743-FE1F-C13560935972}"/>
+              </a:ext>
+            </a:extLst>
+          </p:cNvPr>
+          <p:cNvSpPr/>
+          <p:nvPr/>
+        </p:nvSpPr>
+        <p:spPr>
+          <a:xfrm>
+            <a:off x="2742608" y="11562181"/>
+            <a:ext cx="925200" cy="100800"/>
+          </a:xfrm>
+          <a:prstGeom prst="rect">
+            <a:avLst/>
+          </a:prstGeom>
+          <a:solidFill>
+            <a:srgbClr val="FF725C"/>
+          </a:solidFill>
+          <a:ln>
+            <a:noFill/>
+          </a:ln>
+        </p:spPr>
+        <p:style>
+          <a:lnRef idx="2">
+            <a:schemeClr val="accent1">
+              <a:shade val="15000"/>
+            </a:schemeClr>
+          </a:lnRef>
+          <a:fillRef idx="1">
+            <a:schemeClr val="accent1"/>
+          </a:fillRef>
+          <a:effectRef idx="0">
+            <a:schemeClr val="accent1"/>
+          </a:effectRef>
+          <a:fontRef idx="minor">
+            <a:schemeClr val="lt1"/>
+          </a:fontRef>
+        </p:style>
+        <p:txBody>
+          <a:bodyPr rtlCol="0" anchor="ctr"/>
+          <a:lstStyle/>
+          <a:p>
+            <a:pPr algn="ctr"/>
+            <a:endParaRPr lang="en-JP"/>
+          </a:p>
+        </p:txBody>
+      </p:sp>
+      <p:sp>
+        <p:nvSpPr>
+          <p:cNvPr id="23" name="Rectangle 22">
+            <a:extLst>
+              <a:ext uri="{FF2B5EF4-FFF2-40B4-BE49-F238E27FC236}">
+                <a16:creationId xmlns:a16="http://schemas.microsoft.com/office/drawing/2014/main" id="{A55A0396-A1A9-B97B-FAA0-4AF6FB9EE1E3}"/>
+              </a:ext>
+            </a:extLst>
+          </p:cNvPr>
+          <p:cNvSpPr/>
+          <p:nvPr/>
+        </p:nvSpPr>
+        <p:spPr>
+          <a:xfrm>
+            <a:off x="3667808" y="11587381"/>
+            <a:ext cx="802800" cy="75600"/>
+          </a:xfrm>
+          <a:prstGeom prst="rect">
+            <a:avLst/>
+          </a:prstGeom>
+          <a:solidFill>
+            <a:srgbClr val="FF725C"/>
+          </a:solidFill>
+          <a:ln>
+            <a:noFill/>
+          </a:ln>
+        </p:spPr>
+        <p:style>
+          <a:lnRef idx="2">
+            <a:schemeClr val="accent1">
+              <a:shade val="15000"/>
+            </a:schemeClr>
+          </a:lnRef>
+          <a:fillRef idx="1">
+            <a:schemeClr val="accent1"/>
+          </a:fillRef>
+          <a:effectRef idx="0">
+            <a:schemeClr val="accent1"/>
+          </a:effectRef>
+          <a:fontRef idx="minor">
+            <a:schemeClr val="lt1"/>
+          </a:fontRef>
+        </p:style>
+        <p:txBody>
+          <a:bodyPr rtlCol="0" anchor="ctr"/>
+          <a:lstStyle/>
+          <a:p>
+            <a:pPr algn="ctr"/>
+            <a:endParaRPr lang="en-JP" dirty="0"/>
+          </a:p>
+        </p:txBody>
+      </p:sp>
+      <p:sp>
+        <p:nvSpPr>
+          <p:cNvPr id="25" name="Rectangle 24">
+            <a:extLst>
+              <a:ext uri="{FF2B5EF4-FFF2-40B4-BE49-F238E27FC236}">
+                <a16:creationId xmlns:a16="http://schemas.microsoft.com/office/drawing/2014/main" id="{FA11E65E-D468-1DC6-8FAD-C6ACB2B35F0C}"/>
+              </a:ext>
+            </a:extLst>
+          </p:cNvPr>
+          <p:cNvSpPr/>
+          <p:nvPr/>
+        </p:nvSpPr>
+        <p:spPr>
+          <a:xfrm>
+            <a:off x="4470608" y="11612581"/>
+            <a:ext cx="482400" cy="50400"/>
+          </a:xfrm>
+          <a:prstGeom prst="rect">
+            <a:avLst/>
+          </a:prstGeom>
+          <a:solidFill>
+            <a:srgbClr val="FF725C"/>
+          </a:solidFill>
+          <a:ln>
+            <a:noFill/>
+          </a:ln>
+        </p:spPr>
+        <p:style>
+          <a:lnRef idx="2">
+            <a:schemeClr val="accent1">
+              <a:shade val="15000"/>
+            </a:schemeClr>
+          </a:lnRef>
+          <a:fillRef idx="1">
+            <a:schemeClr val="accent1"/>
+          </a:fillRef>
+          <a:effectRef idx="0">
+            <a:schemeClr val="accent1"/>
+          </a:effectRef>
+          <a:fontRef idx="minor">
+            <a:schemeClr val="lt1"/>
+          </a:fontRef>
+        </p:style>
+        <p:txBody>
+          <a:bodyPr rtlCol="0" anchor="ctr"/>
+          <a:lstStyle/>
+          <a:p>
+            <a:pPr algn="ctr"/>
+            <a:endParaRPr lang="en-JP"/>
+          </a:p>
+        </p:txBody>
+      </p:sp>
+      <p:sp>
+        <p:nvSpPr>
+          <p:cNvPr id="26" name="Rectangle 25">
+            <a:extLst>
+              <a:ext uri="{FF2B5EF4-FFF2-40B4-BE49-F238E27FC236}">
+                <a16:creationId xmlns:a16="http://schemas.microsoft.com/office/drawing/2014/main" id="{8693A6F0-070B-05E4-2B47-EA95B47CFB13}"/>
+              </a:ext>
+            </a:extLst>
+          </p:cNvPr>
+          <p:cNvSpPr/>
+          <p:nvPr/>
+        </p:nvSpPr>
+        <p:spPr>
+          <a:xfrm>
+            <a:off x="4953008" y="11637781"/>
+            <a:ext cx="482400" cy="25200"/>
+          </a:xfrm>
+          <a:prstGeom prst="rect">
+            <a:avLst/>
+          </a:prstGeom>
+          <a:solidFill>
+            <a:srgbClr val="FF725C"/>
+          </a:solidFill>
+          <a:ln>
+            <a:noFill/>
+          </a:ln>
+        </p:spPr>
+        <p:style>
+          <a:lnRef idx="2">
+            <a:schemeClr val="accent1">
+              <a:shade val="15000"/>
+            </a:schemeClr>
+          </a:lnRef>
+          <a:fillRef idx="1">
+            <a:schemeClr val="accent1"/>
+          </a:fillRef>
+          <a:effectRef idx="0">
+            <a:schemeClr val="accent1"/>
+          </a:effectRef>
+          <a:fontRef idx="minor">
+            <a:schemeClr val="lt1"/>
+          </a:fontRef>
+        </p:style>
+        <p:txBody>
+          <a:bodyPr rtlCol="0" anchor="ctr"/>
+          <a:lstStyle/>
+          <a:p>
+            <a:pPr algn="ctr"/>
+            <a:endParaRPr lang="en-JP"/>
+          </a:p>
+        </p:txBody>
+      </p:sp>
+      <p:sp>
+        <p:nvSpPr>
+          <p:cNvPr id="27" name="Rectangle 26">
+            <a:extLst>
+              <a:ext uri="{FF2B5EF4-FFF2-40B4-BE49-F238E27FC236}">
+                <a16:creationId xmlns:a16="http://schemas.microsoft.com/office/drawing/2014/main" id="{B91CE555-A0C1-0258-0A87-0264F5ED4327}"/>
+              </a:ext>
+            </a:extLst>
+          </p:cNvPr>
+          <p:cNvSpPr/>
+          <p:nvPr/>
+        </p:nvSpPr>
+        <p:spPr>
+          <a:xfrm>
+            <a:off x="5435408" y="11648581"/>
+            <a:ext cx="324000" cy="14400"/>
+          </a:xfrm>
+          <a:prstGeom prst="rect">
+            <a:avLst/>
+          </a:prstGeom>
+          <a:solidFill>
+            <a:srgbClr val="FF725C"/>
+          </a:solidFill>
+          <a:ln>
+            <a:noFill/>
+          </a:ln>
+        </p:spPr>
+        <p:style>
+          <a:lnRef idx="2">
+            <a:schemeClr val="accent1">
+              <a:shade val="15000"/>
+            </a:schemeClr>
+          </a:lnRef>
+          <a:fillRef idx="1">
+            <a:schemeClr val="accent1"/>
+          </a:fillRef>
+          <a:effectRef idx="0">
+            <a:schemeClr val="accent1"/>
+          </a:effectRef>
+          <a:fontRef idx="minor">
+            <a:schemeClr val="lt1"/>
+          </a:fontRef>
+        </p:style>
+        <p:txBody>
+          <a:bodyPr rtlCol="0" anchor="ctr"/>
+          <a:lstStyle/>
+          <a:p>
+            <a:pPr algn="ctr"/>
+            <a:endParaRPr lang="en-JP"/>
+          </a:p>
+        </p:txBody>
+      </p:sp>
+      <p:cxnSp>
+        <p:nvCxnSpPr>
+          <p:cNvPr id="29" name="Straight Connector 28">
+            <a:extLst>
+              <a:ext uri="{FF2B5EF4-FFF2-40B4-BE49-F238E27FC236}">
+                <a16:creationId xmlns:a16="http://schemas.microsoft.com/office/drawing/2014/main" id="{6724142C-F2BA-5C2D-9713-20187E233495}"/>
+              </a:ext>
+            </a:extLst>
+          </p:cNvPr>
+          <p:cNvCxnSpPr>
+            <a:cxnSpLocks/>
+          </p:cNvCxnSpPr>
+          <p:nvPr/>
+        </p:nvCxnSpPr>
+        <p:spPr>
+          <a:xfrm>
+            <a:off x="1074954" y="11852448"/>
+            <a:ext cx="6048000" cy="0"/>
+          </a:xfrm>
+          <a:prstGeom prst="line">
+            <a:avLst/>
+          </a:prstGeom>
+        </p:spPr>
+        <p:style>
+          <a:lnRef idx="2">
+            <a:schemeClr val="accent1"/>
+          </a:lnRef>
+          <a:fillRef idx="0">
+            <a:schemeClr val="accent1"/>
+          </a:fillRef>
+          <a:effectRef idx="1">
+            <a:schemeClr val="accent1"/>
+          </a:effectRef>
+          <a:fontRef idx="minor">
+            <a:schemeClr val="tx1"/>
+          </a:fontRef>
+        </p:style>
+      </p:cxnSp>
+      <p:sp>
+        <p:nvSpPr>
+          <p:cNvPr id="32" name="Rectangle 31">
+            <a:extLst>
+              <a:ext uri="{FF2B5EF4-FFF2-40B4-BE49-F238E27FC236}">
+                <a16:creationId xmlns:a16="http://schemas.microsoft.com/office/drawing/2014/main" id="{9A44C34B-9672-49F0-9A6F-3097BC15C529}"/>
+              </a:ext>
+            </a:extLst>
+          </p:cNvPr>
+          <p:cNvSpPr/>
+          <p:nvPr/>
+        </p:nvSpPr>
+        <p:spPr>
+          <a:xfrm>
+            <a:off x="2623808" y="11238181"/>
+            <a:ext cx="442800" cy="151200"/>
+          </a:xfrm>
+          <a:prstGeom prst="rect">
+            <a:avLst/>
+          </a:prstGeom>
+          <a:solidFill>
+            <a:srgbClr val="9498A0"/>
+          </a:solidFill>
+          <a:ln>
+            <a:noFill/>
+          </a:ln>
+        </p:spPr>
+        <p:style>
+          <a:lnRef idx="2">
+            <a:schemeClr val="accent1">
+              <a:shade val="15000"/>
+            </a:schemeClr>
+          </a:lnRef>
+          <a:fillRef idx="1">
+            <a:schemeClr val="accent1"/>
+          </a:fillRef>
+          <a:effectRef idx="0">
+            <a:schemeClr val="accent1"/>
+          </a:effectRef>
+          <a:fontRef idx="minor">
+            <a:schemeClr val="lt1"/>
+          </a:fontRef>
+        </p:style>
+        <p:txBody>
+          <a:bodyPr rtlCol="0" anchor="ctr"/>
+          <a:lstStyle/>
+          <a:p>
+            <a:pPr algn="ctr"/>
+            <a:endParaRPr lang="en-JP"/>
+          </a:p>
+        </p:txBody>
+      </p:sp>
+      <p:sp>
+        <p:nvSpPr>
+          <p:cNvPr id="33" name="Rectangle 32">
+            <a:extLst>
+              <a:ext uri="{FF2B5EF4-FFF2-40B4-BE49-F238E27FC236}">
+                <a16:creationId xmlns:a16="http://schemas.microsoft.com/office/drawing/2014/main" id="{5AC79188-42C6-9D27-26AC-F8A07519F1A8}"/>
+              </a:ext>
+            </a:extLst>
+          </p:cNvPr>
+          <p:cNvSpPr/>
+          <p:nvPr/>
+        </p:nvSpPr>
+        <p:spPr>
+          <a:xfrm>
+            <a:off x="3066608" y="11288581"/>
+            <a:ext cx="162000" cy="100800"/>
+          </a:xfrm>
+          <a:prstGeom prst="rect">
+            <a:avLst/>
+          </a:prstGeom>
+          <a:solidFill>
+            <a:srgbClr val="9498A0"/>
+          </a:solidFill>
+          <a:ln>
+            <a:noFill/>
+          </a:ln>
+        </p:spPr>
+        <p:style>
+          <a:lnRef idx="2">
+            <a:schemeClr val="accent1">
+              <a:shade val="15000"/>
+            </a:schemeClr>
+          </a:lnRef>
+          <a:fillRef idx="1">
+            <a:schemeClr val="accent1"/>
+          </a:fillRef>
+          <a:effectRef idx="0">
+            <a:schemeClr val="accent1"/>
+          </a:effectRef>
+          <a:fontRef idx="minor">
+            <a:schemeClr val="lt1"/>
+          </a:fontRef>
+        </p:style>
+        <p:txBody>
+          <a:bodyPr rtlCol="0" anchor="ctr"/>
+          <a:lstStyle/>
+          <a:p>
+            <a:pPr algn="ctr"/>
+            <a:endParaRPr lang="en-JP"/>
+          </a:p>
+        </p:txBody>
+      </p:sp>
+      <p:sp>
+        <p:nvSpPr>
+          <p:cNvPr id="56" name="Rectangle 55">
+            <a:extLst>
+              <a:ext uri="{FF2B5EF4-FFF2-40B4-BE49-F238E27FC236}">
+                <a16:creationId xmlns:a16="http://schemas.microsoft.com/office/drawing/2014/main" id="{45B58A3D-9CCA-9E7C-FF74-4E6CC5F898A3}"/>
+              </a:ext>
+            </a:extLst>
+          </p:cNvPr>
+          <p:cNvSpPr/>
+          <p:nvPr/>
+        </p:nvSpPr>
+        <p:spPr>
+          <a:xfrm>
+            <a:off x="3228608" y="11338981"/>
+            <a:ext cx="280800" cy="50400"/>
+          </a:xfrm>
+          <a:prstGeom prst="rect">
+            <a:avLst/>
+          </a:prstGeom>
+          <a:solidFill>
+            <a:srgbClr val="9498A0"/>
+          </a:solidFill>
+          <a:ln>
+            <a:noFill/>
+          </a:ln>
+        </p:spPr>
+        <p:style>
+          <a:lnRef idx="2">
+            <a:schemeClr val="accent1">
+              <a:shade val="15000"/>
+            </a:schemeClr>
+          </a:lnRef>
+          <a:fillRef idx="1">
+            <a:schemeClr val="accent1"/>
+          </a:fillRef>
+          <a:effectRef idx="0">
+            <a:schemeClr val="accent1"/>
+          </a:effectRef>
+          <a:fontRef idx="minor">
+            <a:schemeClr val="lt1"/>
+          </a:fontRef>
+        </p:style>
+        <p:txBody>
+          <a:bodyPr rtlCol="0" anchor="ctr"/>
+          <a:lstStyle/>
+          <a:p>
+            <a:pPr algn="ctr"/>
+            <a:endParaRPr lang="en-JP"/>
+          </a:p>
+        </p:txBody>
+      </p:sp>
+      <p:sp>
+        <p:nvSpPr>
+          <p:cNvPr id="8" name="Triangle 7">
+            <a:extLst>
+              <a:ext uri="{FF2B5EF4-FFF2-40B4-BE49-F238E27FC236}">
+                <a16:creationId xmlns:a16="http://schemas.microsoft.com/office/drawing/2014/main" id="{4B7B52F7-A766-BBFF-92CD-0FA022BDE6C7}"/>
+              </a:ext>
+            </a:extLst>
+          </p:cNvPr>
+          <p:cNvSpPr/>
+          <p:nvPr/>
+        </p:nvSpPr>
+        <p:spPr>
           <a:xfrm flipV="1">
-            <a:off x="6326584" y="7395208"/>
-            <a:ext cx="88490" cy="76284"/>
+            <a:off x="5766608" y="7286462"/>
+            <a:ext cx="144000" cy="144000"/>
           </a:xfrm>
           <a:prstGeom prst="triangle">
             <a:avLst/>
           </a:prstGeom>
           <a:solidFill>
-            <a:srgbClr val="A463F2"/>
+            <a:srgbClr val="9C6B4E"/>
+          </a:solidFill>
+          <a:ln>
+            <a:noFill/>
+          </a:ln>
+        </p:spPr>
+        <p:style>
+          <a:lnRef idx="2">
+            <a:schemeClr val="accent1">
+              <a:shade val="15000"/>
+            </a:schemeClr>
+          </a:lnRef>
+          <a:fillRef idx="1">
+            <a:schemeClr val="accent1"/>
+          </a:fillRef>
+          <a:effectRef idx="0">
+            <a:schemeClr val="accent1"/>
+          </a:effectRef>
+          <a:fontRef idx="minor">
+            <a:schemeClr val="lt1"/>
+          </a:fontRef>
+        </p:style>
+        <p:txBody>
+          <a:bodyPr rtlCol="0" anchor="ctr"/>
+          <a:lstStyle/>
+          <a:p>
+            <a:pPr algn="ctr"/>
+            <a:endParaRPr lang="en-JP"/>
+          </a:p>
+        </p:txBody>
+      </p:sp>
+      <p:sp>
+        <p:nvSpPr>
+          <p:cNvPr id="28" name="Triangle 27">
+            <a:extLst>
+              <a:ext uri="{FF2B5EF4-FFF2-40B4-BE49-F238E27FC236}">
+                <a16:creationId xmlns:a16="http://schemas.microsoft.com/office/drawing/2014/main" id="{EAE1F0FD-8C7D-5EB2-192B-A8C5A79911D5}"/>
+              </a:ext>
+            </a:extLst>
+          </p:cNvPr>
+          <p:cNvSpPr/>
+          <p:nvPr/>
+        </p:nvSpPr>
+        <p:spPr>
+          <a:xfrm flipV="1">
+            <a:off x="5979008" y="7286462"/>
+            <a:ext cx="144000" cy="144000"/>
+          </a:xfrm>
+          <a:prstGeom prst="triangle">
+            <a:avLst/>
+          </a:prstGeom>
+          <a:solidFill>
+            <a:srgbClr val="9C6B4E"/>
+          </a:solidFill>
+          <a:ln>
+            <a:noFill/>
+          </a:ln>
+        </p:spPr>
+        <p:style>
+          <a:lnRef idx="2">
+            <a:schemeClr val="accent1">
+              <a:shade val="15000"/>
+            </a:schemeClr>
+          </a:lnRef>
+          <a:fillRef idx="1">
+            <a:schemeClr val="accent1"/>
+          </a:fillRef>
+          <a:effectRef idx="0">
+            <a:schemeClr val="accent1"/>
+          </a:effectRef>
+          <a:fontRef idx="minor">
+            <a:schemeClr val="lt1"/>
+          </a:fontRef>
+        </p:style>
+        <p:txBody>
+          <a:bodyPr rtlCol="0" anchor="ctr"/>
+          <a:lstStyle/>
+          <a:p>
+            <a:pPr algn="ctr"/>
+            <a:endParaRPr lang="en-JP"/>
+          </a:p>
+        </p:txBody>
+      </p:sp>
+      <p:sp>
+        <p:nvSpPr>
+          <p:cNvPr id="30" name="Triangle 29">
+            <a:extLst>
+              <a:ext uri="{FF2B5EF4-FFF2-40B4-BE49-F238E27FC236}">
+                <a16:creationId xmlns:a16="http://schemas.microsoft.com/office/drawing/2014/main" id="{3556BECB-EC4F-5419-128A-DBCCE1DD8083}"/>
+              </a:ext>
+            </a:extLst>
+          </p:cNvPr>
+          <p:cNvSpPr/>
+          <p:nvPr/>
+        </p:nvSpPr>
+        <p:spPr>
+          <a:xfrm flipV="1">
+            <a:off x="6472208" y="7286462"/>
+            <a:ext cx="144000" cy="144000"/>
+          </a:xfrm>
+          <a:prstGeom prst="triangle">
+            <a:avLst/>
+          </a:prstGeom>
+          <a:solidFill>
+            <a:srgbClr val="9C6B4E"/>
+          </a:solidFill>
+          <a:ln>
+            <a:noFill/>
+          </a:ln>
+        </p:spPr>
+        <p:style>
+          <a:lnRef idx="2">
+            <a:schemeClr val="accent1">
+              <a:shade val="15000"/>
+            </a:schemeClr>
+          </a:lnRef>
+          <a:fillRef idx="1">
+            <a:schemeClr val="accent1"/>
+          </a:fillRef>
+          <a:effectRef idx="0">
+            <a:schemeClr val="accent1"/>
+          </a:effectRef>
+          <a:fontRef idx="minor">
+            <a:schemeClr val="lt1"/>
+          </a:fontRef>
+        </p:style>
+        <p:txBody>
+          <a:bodyPr rtlCol="0" anchor="ctr"/>
+          <a:lstStyle/>
+          <a:p>
+            <a:pPr algn="ctr"/>
+            <a:endParaRPr lang="en-JP"/>
+          </a:p>
+        </p:txBody>
+      </p:sp>
+      <p:sp>
+        <p:nvSpPr>
+          <p:cNvPr id="31" name="Triangle 30">
+            <a:extLst>
+              <a:ext uri="{FF2B5EF4-FFF2-40B4-BE49-F238E27FC236}">
+                <a16:creationId xmlns:a16="http://schemas.microsoft.com/office/drawing/2014/main" id="{08332578-EDBA-121D-5547-B5E9117CA527}"/>
+              </a:ext>
+            </a:extLst>
+          </p:cNvPr>
+          <p:cNvSpPr/>
+          <p:nvPr/>
+        </p:nvSpPr>
+        <p:spPr>
+          <a:xfrm flipV="1">
+            <a:off x="6720608" y="7286462"/>
+            <a:ext cx="144000" cy="144000"/>
+          </a:xfrm>
+          <a:prstGeom prst="triangle">
+            <a:avLst/>
+          </a:prstGeom>
+          <a:solidFill>
+            <a:srgbClr val="9C6B4E"/>
+          </a:solidFill>
+          <a:ln>
+            <a:noFill/>
+          </a:ln>
+        </p:spPr>
+        <p:style>
+          <a:lnRef idx="2">
+            <a:schemeClr val="accent1">
+              <a:shade val="15000"/>
+            </a:schemeClr>
+          </a:lnRef>
+          <a:fillRef idx="1">
+            <a:schemeClr val="accent1"/>
+          </a:fillRef>
+          <a:effectRef idx="0">
+            <a:schemeClr val="accent1"/>
+          </a:effectRef>
+          <a:fontRef idx="minor">
+            <a:schemeClr val="lt1"/>
+          </a:fontRef>
+        </p:style>
+        <p:txBody>
+          <a:bodyPr rtlCol="0" anchor="ctr"/>
+          <a:lstStyle/>
+          <a:p>
+            <a:pPr algn="ctr"/>
+            <a:endParaRPr lang="en-JP"/>
+          </a:p>
+        </p:txBody>
+      </p:sp>
+      <p:sp>
+        <p:nvSpPr>
+          <p:cNvPr id="57" name="Triangle 56">
+            <a:extLst>
+              <a:ext uri="{FF2B5EF4-FFF2-40B4-BE49-F238E27FC236}">
+                <a16:creationId xmlns:a16="http://schemas.microsoft.com/office/drawing/2014/main" id="{093D111D-51F1-1399-6B13-30EA7ACE5892}"/>
+              </a:ext>
+            </a:extLst>
+          </p:cNvPr>
+          <p:cNvSpPr/>
+          <p:nvPr/>
+        </p:nvSpPr>
+        <p:spPr>
+          <a:xfrm flipV="1">
+            <a:off x="6227408" y="7286462"/>
+            <a:ext cx="144000" cy="144000"/>
+          </a:xfrm>
+          <a:prstGeom prst="triangle">
+            <a:avLst/>
+          </a:prstGeom>
+          <a:solidFill>
+            <a:srgbClr val="9C6B4E"/>
+          </a:solidFill>
+          <a:ln>
+            <a:noFill/>
+          </a:ln>
+        </p:spPr>
+        <p:style>
+          <a:lnRef idx="2">
+            <a:schemeClr val="accent1">
+              <a:shade val="15000"/>
+            </a:schemeClr>
+          </a:lnRef>
+          <a:fillRef idx="1">
+            <a:schemeClr val="accent1"/>
+          </a:fillRef>
+          <a:effectRef idx="0">
+            <a:schemeClr val="accent1"/>
+          </a:effectRef>
+          <a:fontRef idx="minor">
+            <a:schemeClr val="lt1"/>
+          </a:fontRef>
+        </p:style>
+        <p:txBody>
+          <a:bodyPr rtlCol="0" anchor="ctr"/>
+          <a:lstStyle/>
+          <a:p>
+            <a:pPr algn="ctr"/>
+            <a:endParaRPr lang="en-JP"/>
+          </a:p>
+        </p:txBody>
+      </p:sp>
+      <p:sp>
+        <p:nvSpPr>
+          <p:cNvPr id="58" name="TextBox 57">
+            <a:extLst>
+              <a:ext uri="{FF2B5EF4-FFF2-40B4-BE49-F238E27FC236}">
+                <a16:creationId xmlns:a16="http://schemas.microsoft.com/office/drawing/2014/main" id="{69E544D8-478D-4541-4087-AD1A93B3CD6C}"/>
+              </a:ext>
+            </a:extLst>
+          </p:cNvPr>
+          <p:cNvSpPr txBox="1"/>
+          <p:nvPr/>
+        </p:nvSpPr>
+        <p:spPr>
+          <a:xfrm>
+            <a:off x="8584286" y="7178477"/>
+            <a:ext cx="2206053" cy="338554"/>
+          </a:xfrm>
+          <a:prstGeom prst="rect">
+            <a:avLst/>
+          </a:prstGeom>
+          <a:noFill/>
+        </p:spPr>
+        <p:txBody>
+          <a:bodyPr wrap="none" rtlCol="0">
+            <a:spAutoFit/>
+          </a:bodyPr>
+          <a:lstStyle/>
+          <a:p>
+            <a:r>
+              <a:rPr lang="en-US" sz="1600" b="1" dirty="0">
+                <a:solidFill>
+                  <a:srgbClr val="9C6B4E"/>
+                </a:solidFill>
+                <a:latin typeface="Arial" panose="020B0604020202020204" pitchFamily="34" charset="0"/>
+                <a:cs typeface="Arial" panose="020B0604020202020204" pitchFamily="34" charset="0"/>
+              </a:rPr>
+              <a:t>sulbactam/ampicillin</a:t>
+            </a:r>
+            <a:endParaRPr lang="en-JP" sz="1600" b="1" dirty="0">
+              <a:solidFill>
+                <a:srgbClr val="9C6B4E"/>
+              </a:solidFill>
+              <a:latin typeface="Arial" panose="020B0604020202020204" pitchFamily="34" charset="0"/>
+              <a:cs typeface="Arial" panose="020B0604020202020204" pitchFamily="34" charset="0"/>
+            </a:endParaRPr>
+          </a:p>
+        </p:txBody>
+      </p:sp>
+      <p:pic>
+        <p:nvPicPr>
+          <p:cNvPr id="61" name="Picture 60" descr="A brown line drawing of a drip&#10;&#10;AI-generated content may be incorrect.">
+            <a:extLst>
+              <a:ext uri="{FF2B5EF4-FFF2-40B4-BE49-F238E27FC236}">
+                <a16:creationId xmlns:a16="http://schemas.microsoft.com/office/drawing/2014/main" id="{17FF7D94-8803-8221-5C9A-2CBF5F09B43B}"/>
+              </a:ext>
+            </a:extLst>
+          </p:cNvPr>
+          <p:cNvPicPr>
+            <a:picLocks noChangeAspect="1"/>
+          </p:cNvPicPr>
+          <p:nvPr/>
+        </p:nvPicPr>
+        <p:blipFill>
+          <a:blip r:embed="rId12"/>
+          <a:stretch>
+            <a:fillRect/>
+          </a:stretch>
+        </p:blipFill>
+        <p:spPr>
+          <a:xfrm>
+            <a:off x="8017339" y="7023965"/>
+            <a:ext cx="674719" cy="674719"/>
+          </a:xfrm>
+          <a:prstGeom prst="rect">
+            <a:avLst/>
+          </a:prstGeom>
+        </p:spPr>
+      </p:pic>
+      <p:sp>
+        <p:nvSpPr>
+          <p:cNvPr id="62" name="Triangle 61">
+            <a:extLst>
+              <a:ext uri="{FF2B5EF4-FFF2-40B4-BE49-F238E27FC236}">
+                <a16:creationId xmlns:a16="http://schemas.microsoft.com/office/drawing/2014/main" id="{B3CDE3FD-E0DF-85E8-BC9E-BD3973EE3133}"/>
+              </a:ext>
+            </a:extLst>
+          </p:cNvPr>
+          <p:cNvSpPr/>
+          <p:nvPr/>
+        </p:nvSpPr>
+        <p:spPr>
+          <a:xfrm flipV="1">
+            <a:off x="6969008" y="7286462"/>
+            <a:ext cx="144000" cy="144000"/>
+          </a:xfrm>
+          <a:prstGeom prst="triangle">
+            <a:avLst/>
+          </a:prstGeom>
+          <a:solidFill>
+            <a:srgbClr val="9C6B4E"/>
+          </a:solidFill>
+          <a:ln>
+            <a:noFill/>
+          </a:ln>
+        </p:spPr>
+        <p:style>
+          <a:lnRef idx="2">
+            <a:schemeClr val="accent1">
+              <a:shade val="15000"/>
+            </a:schemeClr>
+          </a:lnRef>
+          <a:fillRef idx="1">
+            <a:schemeClr val="accent1"/>
+          </a:fillRef>
+          <a:effectRef idx="0">
+            <a:schemeClr val="accent1"/>
+          </a:effectRef>
+          <a:fontRef idx="minor">
+            <a:schemeClr val="lt1"/>
+          </a:fontRef>
+        </p:style>
+        <p:txBody>
+          <a:bodyPr rtlCol="0" anchor="ctr"/>
+          <a:lstStyle/>
+          <a:p>
+            <a:pPr algn="ctr"/>
+            <a:endParaRPr lang="en-JP"/>
+          </a:p>
+        </p:txBody>
+      </p:sp>
+      <p:sp>
+        <p:nvSpPr>
+          <p:cNvPr id="64" name="Triangle 63">
+            <a:extLst>
+              <a:ext uri="{FF2B5EF4-FFF2-40B4-BE49-F238E27FC236}">
+                <a16:creationId xmlns:a16="http://schemas.microsoft.com/office/drawing/2014/main" id="{C5989272-EBBD-8862-EA82-0DB41B26C0FC}"/>
+              </a:ext>
+            </a:extLst>
+          </p:cNvPr>
+          <p:cNvSpPr/>
+          <p:nvPr/>
+        </p:nvSpPr>
+        <p:spPr>
+          <a:xfrm flipV="1">
+            <a:off x="7181408" y="7286462"/>
+            <a:ext cx="144000" cy="144000"/>
+          </a:xfrm>
+          <a:prstGeom prst="triangle">
+            <a:avLst/>
+          </a:prstGeom>
+          <a:solidFill>
+            <a:srgbClr val="9C6B4E"/>
+          </a:solidFill>
+          <a:ln>
+            <a:noFill/>
+          </a:ln>
+        </p:spPr>
+        <p:style>
+          <a:lnRef idx="2">
+            <a:schemeClr val="accent1">
+              <a:shade val="15000"/>
+            </a:schemeClr>
+          </a:lnRef>
+          <a:fillRef idx="1">
+            <a:schemeClr val="accent1"/>
+          </a:fillRef>
+          <a:effectRef idx="0">
+            <a:schemeClr val="accent1"/>
+          </a:effectRef>
+          <a:fontRef idx="minor">
+            <a:schemeClr val="lt1"/>
+          </a:fontRef>
+        </p:style>
+        <p:txBody>
+          <a:bodyPr rtlCol="0" anchor="ctr"/>
+          <a:lstStyle/>
+          <a:p>
+            <a:pPr algn="ctr"/>
+            <a:endParaRPr lang="en-JP"/>
+          </a:p>
+        </p:txBody>
+      </p:sp>
+      <p:sp>
+        <p:nvSpPr>
+          <p:cNvPr id="66" name="Triangle 65">
+            <a:extLst>
+              <a:ext uri="{FF2B5EF4-FFF2-40B4-BE49-F238E27FC236}">
+                <a16:creationId xmlns:a16="http://schemas.microsoft.com/office/drawing/2014/main" id="{E19AE542-0B11-4E76-80F3-7822F1D810AE}"/>
+              </a:ext>
+            </a:extLst>
+          </p:cNvPr>
+          <p:cNvSpPr/>
+          <p:nvPr/>
+        </p:nvSpPr>
+        <p:spPr>
+          <a:xfrm flipV="1">
+            <a:off x="7674608" y="7286462"/>
+            <a:ext cx="144000" cy="144000"/>
+          </a:xfrm>
+          <a:prstGeom prst="triangle">
+            <a:avLst/>
+          </a:prstGeom>
+          <a:solidFill>
+            <a:srgbClr val="9C6B4E"/>
+          </a:solidFill>
+          <a:ln>
+            <a:noFill/>
+          </a:ln>
+        </p:spPr>
+        <p:style>
+          <a:lnRef idx="2">
+            <a:schemeClr val="accent1">
+              <a:shade val="15000"/>
+            </a:schemeClr>
+          </a:lnRef>
+          <a:fillRef idx="1">
+            <a:schemeClr val="accent1"/>
+          </a:fillRef>
+          <a:effectRef idx="0">
+            <a:schemeClr val="accent1"/>
+          </a:effectRef>
+          <a:fontRef idx="minor">
+            <a:schemeClr val="lt1"/>
+          </a:fontRef>
+        </p:style>
+        <p:txBody>
+          <a:bodyPr rtlCol="0" anchor="ctr"/>
+          <a:lstStyle/>
+          <a:p>
+            <a:pPr algn="ctr"/>
+            <a:endParaRPr lang="en-JP"/>
+          </a:p>
+        </p:txBody>
+      </p:sp>
+      <p:sp>
+        <p:nvSpPr>
+          <p:cNvPr id="67" name="Triangle 66">
+            <a:extLst>
+              <a:ext uri="{FF2B5EF4-FFF2-40B4-BE49-F238E27FC236}">
+                <a16:creationId xmlns:a16="http://schemas.microsoft.com/office/drawing/2014/main" id="{4935CEFD-D2BB-D386-2630-4D59F9892240}"/>
+              </a:ext>
+            </a:extLst>
+          </p:cNvPr>
+          <p:cNvSpPr/>
+          <p:nvPr/>
+        </p:nvSpPr>
+        <p:spPr>
+          <a:xfrm flipV="1">
+            <a:off x="7923008" y="7286462"/>
+            <a:ext cx="144000" cy="144000"/>
+          </a:xfrm>
+          <a:prstGeom prst="triangle">
+            <a:avLst/>
+          </a:prstGeom>
+          <a:solidFill>
+            <a:srgbClr val="9C6B4E"/>
+          </a:solidFill>
+          <a:ln>
+            <a:noFill/>
+          </a:ln>
+        </p:spPr>
+        <p:style>
+          <a:lnRef idx="2">
+            <a:schemeClr val="accent1">
+              <a:shade val="15000"/>
+            </a:schemeClr>
+          </a:lnRef>
+          <a:fillRef idx="1">
+            <a:schemeClr val="accent1"/>
+          </a:fillRef>
+          <a:effectRef idx="0">
+            <a:schemeClr val="accent1"/>
+          </a:effectRef>
+          <a:fontRef idx="minor">
+            <a:schemeClr val="lt1"/>
+          </a:fontRef>
+        </p:style>
+        <p:txBody>
+          <a:bodyPr rtlCol="0" anchor="ctr"/>
+          <a:lstStyle/>
+          <a:p>
+            <a:pPr algn="ctr"/>
+            <a:endParaRPr lang="en-JP"/>
+          </a:p>
+        </p:txBody>
+      </p:sp>
+      <p:sp>
+        <p:nvSpPr>
+          <p:cNvPr id="68" name="Triangle 67">
+            <a:extLst>
+              <a:ext uri="{FF2B5EF4-FFF2-40B4-BE49-F238E27FC236}">
+                <a16:creationId xmlns:a16="http://schemas.microsoft.com/office/drawing/2014/main" id="{32FF5E1E-6BDF-1081-E869-ED9F1AFA7E1F}"/>
+              </a:ext>
+            </a:extLst>
+          </p:cNvPr>
+          <p:cNvSpPr/>
+          <p:nvPr/>
+        </p:nvSpPr>
+        <p:spPr>
+          <a:xfrm flipV="1">
+            <a:off x="7429808" y="7286462"/>
+            <a:ext cx="144000" cy="144000"/>
+          </a:xfrm>
+          <a:prstGeom prst="triangle">
+            <a:avLst/>
+          </a:prstGeom>
+          <a:solidFill>
+            <a:srgbClr val="9C6B4E"/>
           </a:solidFill>
           <a:ln>
             <a:noFill/>

</xml_diff>

<commit_message>
Takahiro updated figures using ppt
</commit_message>
<xml_diff>
--- a/output/fig_sofa_dic.pptx
+++ b/output/fig_sofa_dic.pptx
@@ -2,7 +2,7 @@
 <file path=ppt/presentation.xml><?xml version="1.0" encoding="utf-8"?>
 <p:presentation xmlns:a="http://schemas.openxmlformats.org/drawingml/2006/main" xmlns:r="http://schemas.openxmlformats.org/officeDocument/2006/relationships" xmlns:p="http://schemas.openxmlformats.org/presentationml/2006/main" saveSubsetFonts="1" autoCompressPictures="0">
   <p:sldMasterIdLst>
-    <p:sldMasterId id="2147483720" r:id="rId1"/>
+    <p:sldMasterId id="2147483768" r:id="rId1"/>
   </p:sldMasterIdLst>
   <p:notesMasterIdLst>
     <p:notesMasterId r:id="rId3"/>
@@ -10,7 +10,7 @@
   <p:sldIdLst>
     <p:sldId id="256" r:id="rId2"/>
   </p:sldIdLst>
-  <p:sldSz cx="10799763" cy="17640300"/>
+  <p:sldSz cx="10799763" cy="12239625"/>
   <p:notesSz cx="6858000" cy="9144000"/>
   <p:defaultTextStyle>
     <a:defPPr>
@@ -197,7 +197,7 @@
           <a:p>
             <a:fld id="{63A1BE33-F31D-F74A-815B-F4DD24413D48}" type="datetimeFigureOut">
               <a:rPr lang="en-JP" smtClean="0"/>
-              <a:t>2025/02/02</a:t>
+              <a:t>2025/02/09</a:t>
             </a:fld>
             <a:endParaRPr lang="en-JP"/>
           </a:p>
@@ -215,8 +215,8 @@
         </p:nvSpPr>
         <p:spPr>
           <a:xfrm>
-            <a:off x="2484438" y="1143000"/>
-            <a:ext cx="1889125" cy="3086100"/>
+            <a:off x="2068513" y="1143000"/>
+            <a:ext cx="2720975" cy="3086100"/>
           </a:xfrm>
           <a:prstGeom prst="rect">
             <a:avLst/>
@@ -494,8 +494,8 @@
         </p:nvSpPr>
         <p:spPr>
           <a:xfrm>
-            <a:off x="2484438" y="1143000"/>
-            <a:ext cx="1889125" cy="3086100"/>
+            <a:off x="2068513" y="1143000"/>
+            <a:ext cx="2720975" cy="3086100"/>
           </a:xfrm>
         </p:spPr>
       </p:sp>
@@ -583,8 +583,8 @@
         </p:nvSpPr>
         <p:spPr>
           <a:xfrm>
-            <a:off x="809982" y="2886967"/>
-            <a:ext cx="9179799" cy="6141438"/>
+            <a:off x="809982" y="2003106"/>
+            <a:ext cx="9179799" cy="4261203"/>
           </a:xfrm>
         </p:spPr>
         <p:txBody>
@@ -615,8 +615,8 @@
         </p:nvSpPr>
         <p:spPr>
           <a:xfrm>
-            <a:off x="1349971" y="9265242"/>
-            <a:ext cx="8099822" cy="4258988"/>
+            <a:off x="1349971" y="6428637"/>
+            <a:ext cx="8099822" cy="2955075"/>
           </a:xfrm>
         </p:spPr>
         <p:txBody>
@@ -685,7 +685,7 @@
           <a:p>
             <a:fld id="{CEC5EF0D-89A3-B84A-9E4B-188B0CDB794D}" type="datetimeFigureOut">
               <a:rPr lang="en-JP" smtClean="0"/>
-              <a:t>2025/02/02</a:t>
+              <a:t>2025/02/09</a:t>
             </a:fld>
             <a:endParaRPr lang="en-JP"/>
           </a:p>
@@ -736,7 +736,7 @@
     </p:spTree>
     <p:extLst>
       <p:ext uri="{BB962C8B-B14F-4D97-AF65-F5344CB8AC3E}">
-        <p14:creationId xmlns:p14="http://schemas.microsoft.com/office/powerpoint/2010/main" val="1199100480"/>
+        <p14:creationId xmlns:p14="http://schemas.microsoft.com/office/powerpoint/2010/main" val="2888076517"/>
       </p:ext>
     </p:extLst>
   </p:cSld>
@@ -855,7 +855,7 @@
           <a:p>
             <a:fld id="{CEC5EF0D-89A3-B84A-9E4B-188B0CDB794D}" type="datetimeFigureOut">
               <a:rPr lang="en-JP" smtClean="0"/>
-              <a:t>2025/02/02</a:t>
+              <a:t>2025/02/09</a:t>
             </a:fld>
             <a:endParaRPr lang="en-JP"/>
           </a:p>
@@ -906,7 +906,7 @@
     </p:spTree>
     <p:extLst>
       <p:ext uri="{BB962C8B-B14F-4D97-AF65-F5344CB8AC3E}">
-        <p14:creationId xmlns:p14="http://schemas.microsoft.com/office/powerpoint/2010/main" val="103569714"/>
+        <p14:creationId xmlns:p14="http://schemas.microsoft.com/office/powerpoint/2010/main" val="4053880127"/>
       </p:ext>
     </p:extLst>
   </p:cSld>
@@ -945,8 +945,8 @@
         </p:nvSpPr>
         <p:spPr>
           <a:xfrm>
-            <a:off x="7728581" y="939183"/>
-            <a:ext cx="2328699" cy="14949339"/>
+            <a:off x="7728581" y="651647"/>
+            <a:ext cx="2328699" cy="10372516"/>
           </a:xfrm>
         </p:spPr>
         <p:txBody>
@@ -973,8 +973,8 @@
         </p:nvSpPr>
         <p:spPr>
           <a:xfrm>
-            <a:off x="742484" y="939183"/>
-            <a:ext cx="6851100" cy="14949339"/>
+            <a:off x="742484" y="651647"/>
+            <a:ext cx="6851100" cy="10372516"/>
           </a:xfrm>
         </p:spPr>
         <p:txBody>
@@ -1035,7 +1035,7 @@
           <a:p>
             <a:fld id="{CEC5EF0D-89A3-B84A-9E4B-188B0CDB794D}" type="datetimeFigureOut">
               <a:rPr lang="en-JP" smtClean="0"/>
-              <a:t>2025/02/02</a:t>
+              <a:t>2025/02/09</a:t>
             </a:fld>
             <a:endParaRPr lang="en-JP"/>
           </a:p>
@@ -1086,7 +1086,7 @@
     </p:spTree>
     <p:extLst>
       <p:ext uri="{BB962C8B-B14F-4D97-AF65-F5344CB8AC3E}">
-        <p14:creationId xmlns:p14="http://schemas.microsoft.com/office/powerpoint/2010/main" val="1681496707"/>
+        <p14:creationId xmlns:p14="http://schemas.microsoft.com/office/powerpoint/2010/main" val="1935941873"/>
       </p:ext>
     </p:extLst>
   </p:cSld>
@@ -1205,7 +1205,7 @@
           <a:p>
             <a:fld id="{CEC5EF0D-89A3-B84A-9E4B-188B0CDB794D}" type="datetimeFigureOut">
               <a:rPr lang="en-JP" smtClean="0"/>
-              <a:t>2025/02/02</a:t>
+              <a:t>2025/02/09</a:t>
             </a:fld>
             <a:endParaRPr lang="en-JP"/>
           </a:p>
@@ -1256,7 +1256,7 @@
     </p:spTree>
     <p:extLst>
       <p:ext uri="{BB962C8B-B14F-4D97-AF65-F5344CB8AC3E}">
-        <p14:creationId xmlns:p14="http://schemas.microsoft.com/office/powerpoint/2010/main" val="37870691"/>
+        <p14:creationId xmlns:p14="http://schemas.microsoft.com/office/powerpoint/2010/main" val="1993873109"/>
       </p:ext>
     </p:extLst>
   </p:cSld>
@@ -1295,8 +1295,8 @@
         </p:nvSpPr>
         <p:spPr>
           <a:xfrm>
-            <a:off x="736859" y="4397830"/>
-            <a:ext cx="9314796" cy="7337874"/>
+            <a:off x="736859" y="3051410"/>
+            <a:ext cx="9314796" cy="5091343"/>
           </a:xfrm>
         </p:spPr>
         <p:txBody>
@@ -1327,8 +1327,8 @@
         </p:nvSpPr>
         <p:spPr>
           <a:xfrm>
-            <a:off x="736859" y="11805123"/>
-            <a:ext cx="9314796" cy="3858814"/>
+            <a:off x="736859" y="8190919"/>
+            <a:ext cx="9314796" cy="2677417"/>
           </a:xfrm>
         </p:spPr>
         <p:txBody>
@@ -1451,7 +1451,7 @@
           <a:p>
             <a:fld id="{CEC5EF0D-89A3-B84A-9E4B-188B0CDB794D}" type="datetimeFigureOut">
               <a:rPr lang="en-JP" smtClean="0"/>
-              <a:t>2025/02/02</a:t>
+              <a:t>2025/02/09</a:t>
             </a:fld>
             <a:endParaRPr lang="en-JP"/>
           </a:p>
@@ -1502,7 +1502,7 @@
     </p:spTree>
     <p:extLst>
       <p:ext uri="{BB962C8B-B14F-4D97-AF65-F5344CB8AC3E}">
-        <p14:creationId xmlns:p14="http://schemas.microsoft.com/office/powerpoint/2010/main" val="3885966"/>
+        <p14:creationId xmlns:p14="http://schemas.microsoft.com/office/powerpoint/2010/main" val="2913963966"/>
       </p:ext>
     </p:extLst>
   </p:cSld>
@@ -1564,8 +1564,8 @@
         </p:nvSpPr>
         <p:spPr>
           <a:xfrm>
-            <a:off x="742484" y="4695913"/>
-            <a:ext cx="4589899" cy="11192608"/>
+            <a:off x="742484" y="3258233"/>
+            <a:ext cx="4589899" cy="7765930"/>
           </a:xfrm>
         </p:spPr>
         <p:txBody>
@@ -1621,8 +1621,8 @@
         </p:nvSpPr>
         <p:spPr>
           <a:xfrm>
-            <a:off x="5467380" y="4695913"/>
-            <a:ext cx="4589899" cy="11192608"/>
+            <a:off x="5467380" y="3258233"/>
+            <a:ext cx="4589899" cy="7765930"/>
           </a:xfrm>
         </p:spPr>
         <p:txBody>
@@ -1683,7 +1683,7 @@
           <a:p>
             <a:fld id="{CEC5EF0D-89A3-B84A-9E4B-188B0CDB794D}" type="datetimeFigureOut">
               <a:rPr lang="en-JP" smtClean="0"/>
-              <a:t>2025/02/02</a:t>
+              <a:t>2025/02/09</a:t>
             </a:fld>
             <a:endParaRPr lang="en-JP"/>
           </a:p>
@@ -1734,7 +1734,7 @@
     </p:spTree>
     <p:extLst>
       <p:ext uri="{BB962C8B-B14F-4D97-AF65-F5344CB8AC3E}">
-        <p14:creationId xmlns:p14="http://schemas.microsoft.com/office/powerpoint/2010/main" val="4062682151"/>
+        <p14:creationId xmlns:p14="http://schemas.microsoft.com/office/powerpoint/2010/main" val="4201883215"/>
       </p:ext>
     </p:extLst>
   </p:cSld>
@@ -1773,8 +1773,8 @@
         </p:nvSpPr>
         <p:spPr>
           <a:xfrm>
-            <a:off x="743890" y="939186"/>
-            <a:ext cx="9314796" cy="3409643"/>
+            <a:off x="743890" y="651649"/>
+            <a:ext cx="9314796" cy="2365762"/>
           </a:xfrm>
         </p:spPr>
         <p:txBody>
@@ -1801,8 +1801,8 @@
         </p:nvSpPr>
         <p:spPr>
           <a:xfrm>
-            <a:off x="743892" y="4324325"/>
-            <a:ext cx="4568805" cy="2119285"/>
+            <a:off x="743892" y="3000409"/>
+            <a:ext cx="4568805" cy="1470454"/>
           </a:xfrm>
         </p:spPr>
         <p:txBody>
@@ -1866,8 +1866,8 @@
         </p:nvSpPr>
         <p:spPr>
           <a:xfrm>
-            <a:off x="743892" y="6443610"/>
-            <a:ext cx="4568805" cy="9477579"/>
+            <a:off x="743892" y="4470863"/>
+            <a:ext cx="4568805" cy="6575966"/>
           </a:xfrm>
         </p:spPr>
         <p:txBody>
@@ -1923,8 +1923,8 @@
         </p:nvSpPr>
         <p:spPr>
           <a:xfrm>
-            <a:off x="5467381" y="4324325"/>
-            <a:ext cx="4591306" cy="2119285"/>
+            <a:off x="5467381" y="3000409"/>
+            <a:ext cx="4591306" cy="1470454"/>
           </a:xfrm>
         </p:spPr>
         <p:txBody>
@@ -1988,8 +1988,8 @@
         </p:nvSpPr>
         <p:spPr>
           <a:xfrm>
-            <a:off x="5467381" y="6443610"/>
-            <a:ext cx="4591306" cy="9477579"/>
+            <a:off x="5467381" y="4470863"/>
+            <a:ext cx="4591306" cy="6575966"/>
           </a:xfrm>
         </p:spPr>
         <p:txBody>
@@ -2050,7 +2050,7 @@
           <a:p>
             <a:fld id="{CEC5EF0D-89A3-B84A-9E4B-188B0CDB794D}" type="datetimeFigureOut">
               <a:rPr lang="en-JP" smtClean="0"/>
-              <a:t>2025/02/02</a:t>
+              <a:t>2025/02/09</a:t>
             </a:fld>
             <a:endParaRPr lang="en-JP"/>
           </a:p>
@@ -2101,7 +2101,7 @@
     </p:spTree>
     <p:extLst>
       <p:ext uri="{BB962C8B-B14F-4D97-AF65-F5344CB8AC3E}">
-        <p14:creationId xmlns:p14="http://schemas.microsoft.com/office/powerpoint/2010/main" val="3813124288"/>
+        <p14:creationId xmlns:p14="http://schemas.microsoft.com/office/powerpoint/2010/main" val="2155326512"/>
       </p:ext>
     </p:extLst>
   </p:cSld>
@@ -2168,7 +2168,7 @@
           <a:p>
             <a:fld id="{CEC5EF0D-89A3-B84A-9E4B-188B0CDB794D}" type="datetimeFigureOut">
               <a:rPr lang="en-JP" smtClean="0"/>
-              <a:t>2025/02/02</a:t>
+              <a:t>2025/02/09</a:t>
             </a:fld>
             <a:endParaRPr lang="en-JP"/>
           </a:p>
@@ -2219,7 +2219,7 @@
     </p:spTree>
     <p:extLst>
       <p:ext uri="{BB962C8B-B14F-4D97-AF65-F5344CB8AC3E}">
-        <p14:creationId xmlns:p14="http://schemas.microsoft.com/office/powerpoint/2010/main" val="4087619180"/>
+        <p14:creationId xmlns:p14="http://schemas.microsoft.com/office/powerpoint/2010/main" val="3032306485"/>
       </p:ext>
     </p:extLst>
   </p:cSld>
@@ -2263,7 +2263,7 @@
           <a:p>
             <a:fld id="{CEC5EF0D-89A3-B84A-9E4B-188B0CDB794D}" type="datetimeFigureOut">
               <a:rPr lang="en-JP" smtClean="0"/>
-              <a:t>2025/02/02</a:t>
+              <a:t>2025/02/09</a:t>
             </a:fld>
             <a:endParaRPr lang="en-JP"/>
           </a:p>
@@ -2314,7 +2314,7 @@
     </p:spTree>
     <p:extLst>
       <p:ext uri="{BB962C8B-B14F-4D97-AF65-F5344CB8AC3E}">
-        <p14:creationId xmlns:p14="http://schemas.microsoft.com/office/powerpoint/2010/main" val="3780952423"/>
+        <p14:creationId xmlns:p14="http://schemas.microsoft.com/office/powerpoint/2010/main" val="3584150021"/>
       </p:ext>
     </p:extLst>
   </p:cSld>
@@ -2353,8 +2353,8 @@
         </p:nvSpPr>
         <p:spPr>
           <a:xfrm>
-            <a:off x="743890" y="1176020"/>
-            <a:ext cx="3483205" cy="4116070"/>
+            <a:off x="743890" y="815975"/>
+            <a:ext cx="3483205" cy="2855913"/>
           </a:xfrm>
         </p:spPr>
         <p:txBody>
@@ -2385,8 +2385,8 @@
         </p:nvSpPr>
         <p:spPr>
           <a:xfrm>
-            <a:off x="4591306" y="2539880"/>
-            <a:ext cx="5467380" cy="12536047"/>
+            <a:off x="4591306" y="1762282"/>
+            <a:ext cx="5467380" cy="8698067"/>
           </a:xfrm>
         </p:spPr>
         <p:txBody>
@@ -2470,8 +2470,8 @@
         </p:nvSpPr>
         <p:spPr>
           <a:xfrm>
-            <a:off x="743890" y="5292090"/>
-            <a:ext cx="3483205" cy="9804251"/>
+            <a:off x="743890" y="3671887"/>
+            <a:ext cx="3483205" cy="6802626"/>
           </a:xfrm>
         </p:spPr>
         <p:txBody>
@@ -2540,7 +2540,7 @@
           <a:p>
             <a:fld id="{CEC5EF0D-89A3-B84A-9E4B-188B0CDB794D}" type="datetimeFigureOut">
               <a:rPr lang="en-JP" smtClean="0"/>
-              <a:t>2025/02/02</a:t>
+              <a:t>2025/02/09</a:t>
             </a:fld>
             <a:endParaRPr lang="en-JP"/>
           </a:p>
@@ -2591,7 +2591,7 @@
     </p:spTree>
     <p:extLst>
       <p:ext uri="{BB962C8B-B14F-4D97-AF65-F5344CB8AC3E}">
-        <p14:creationId xmlns:p14="http://schemas.microsoft.com/office/powerpoint/2010/main" val="760925154"/>
+        <p14:creationId xmlns:p14="http://schemas.microsoft.com/office/powerpoint/2010/main" val="4255672926"/>
       </p:ext>
     </p:extLst>
   </p:cSld>
@@ -2630,8 +2630,8 @@
         </p:nvSpPr>
         <p:spPr>
           <a:xfrm>
-            <a:off x="743890" y="1176020"/>
-            <a:ext cx="3483205" cy="4116070"/>
+            <a:off x="743890" y="815975"/>
+            <a:ext cx="3483205" cy="2855913"/>
           </a:xfrm>
         </p:spPr>
         <p:txBody>
@@ -2662,8 +2662,8 @@
         </p:nvSpPr>
         <p:spPr>
           <a:xfrm>
-            <a:off x="4591306" y="2539880"/>
-            <a:ext cx="5467380" cy="12536047"/>
+            <a:off x="4591306" y="1762282"/>
+            <a:ext cx="5467380" cy="8698067"/>
           </a:xfrm>
         </p:spPr>
         <p:txBody>
@@ -2727,8 +2727,8 @@
         </p:nvSpPr>
         <p:spPr>
           <a:xfrm>
-            <a:off x="743890" y="5292090"/>
-            <a:ext cx="3483205" cy="9804251"/>
+            <a:off x="743890" y="3671887"/>
+            <a:ext cx="3483205" cy="6802626"/>
           </a:xfrm>
         </p:spPr>
         <p:txBody>
@@ -2797,7 +2797,7 @@
           <a:p>
             <a:fld id="{CEC5EF0D-89A3-B84A-9E4B-188B0CDB794D}" type="datetimeFigureOut">
               <a:rPr lang="en-JP" smtClean="0"/>
-              <a:t>2025/02/02</a:t>
+              <a:t>2025/02/09</a:t>
             </a:fld>
             <a:endParaRPr lang="en-JP"/>
           </a:p>
@@ -2848,7 +2848,7 @@
     </p:spTree>
     <p:extLst>
       <p:ext uri="{BB962C8B-B14F-4D97-AF65-F5344CB8AC3E}">
-        <p14:creationId xmlns:p14="http://schemas.microsoft.com/office/powerpoint/2010/main" val="467415564"/>
+        <p14:creationId xmlns:p14="http://schemas.microsoft.com/office/powerpoint/2010/main" val="26816339"/>
       </p:ext>
     </p:extLst>
   </p:cSld>
@@ -2892,8 +2892,8 @@
         </p:nvSpPr>
         <p:spPr>
           <a:xfrm>
-            <a:off x="742484" y="939186"/>
-            <a:ext cx="9314796" cy="3409643"/>
+            <a:off x="742484" y="651649"/>
+            <a:ext cx="9314796" cy="2365762"/>
           </a:xfrm>
           <a:prstGeom prst="rect">
             <a:avLst/>
@@ -2925,8 +2925,8 @@
         </p:nvSpPr>
         <p:spPr>
           <a:xfrm>
-            <a:off x="742484" y="4695913"/>
-            <a:ext cx="9314796" cy="11192608"/>
+            <a:off x="742484" y="3258233"/>
+            <a:ext cx="9314796" cy="7765930"/>
           </a:xfrm>
           <a:prstGeom prst="rect">
             <a:avLst/>
@@ -2987,8 +2987,8 @@
         </p:nvSpPr>
         <p:spPr>
           <a:xfrm>
-            <a:off x="742484" y="16349948"/>
-            <a:ext cx="2429947" cy="939183"/>
+            <a:off x="742484" y="11344322"/>
+            <a:ext cx="2429947" cy="651647"/>
           </a:xfrm>
           <a:prstGeom prst="rect">
             <a:avLst/>
@@ -3010,7 +3010,7 @@
           <a:p>
             <a:fld id="{CEC5EF0D-89A3-B84A-9E4B-188B0CDB794D}" type="datetimeFigureOut">
               <a:rPr lang="en-JP" smtClean="0"/>
-              <a:t>2025/02/02</a:t>
+              <a:t>2025/02/09</a:t>
             </a:fld>
             <a:endParaRPr lang="en-JP"/>
           </a:p>
@@ -3028,8 +3028,8 @@
         </p:nvSpPr>
         <p:spPr>
           <a:xfrm>
-            <a:off x="3577422" y="16349948"/>
-            <a:ext cx="3644920" cy="939183"/>
+            <a:off x="3577422" y="11344322"/>
+            <a:ext cx="3644920" cy="651647"/>
           </a:xfrm>
           <a:prstGeom prst="rect">
             <a:avLst/>
@@ -3065,8 +3065,8 @@
         </p:nvSpPr>
         <p:spPr>
           <a:xfrm>
-            <a:off x="7627332" y="16349948"/>
-            <a:ext cx="2429947" cy="939183"/>
+            <a:off x="7627332" y="11344322"/>
+            <a:ext cx="2429947" cy="651647"/>
           </a:xfrm>
           <a:prstGeom prst="rect">
             <a:avLst/>
@@ -3097,23 +3097,23 @@
     </p:spTree>
     <p:extLst>
       <p:ext uri="{BB962C8B-B14F-4D97-AF65-F5344CB8AC3E}">
-        <p14:creationId xmlns:p14="http://schemas.microsoft.com/office/powerpoint/2010/main" val="2916680702"/>
+        <p14:creationId xmlns:p14="http://schemas.microsoft.com/office/powerpoint/2010/main" val="1963058365"/>
       </p:ext>
     </p:extLst>
   </p:cSld>
   <p:clrMap bg1="lt1" tx1="dk1" bg2="lt2" tx2="dk2" accent1="accent1" accent2="accent2" accent3="accent3" accent4="accent4" accent5="accent5" accent6="accent6" hlink="hlink" folHlink="folHlink"/>
   <p:sldLayoutIdLst>
-    <p:sldLayoutId id="2147483721" r:id="rId1"/>
-    <p:sldLayoutId id="2147483722" r:id="rId2"/>
-    <p:sldLayoutId id="2147483723" r:id="rId3"/>
-    <p:sldLayoutId id="2147483724" r:id="rId4"/>
-    <p:sldLayoutId id="2147483725" r:id="rId5"/>
-    <p:sldLayoutId id="2147483726" r:id="rId6"/>
-    <p:sldLayoutId id="2147483727" r:id="rId7"/>
-    <p:sldLayoutId id="2147483728" r:id="rId8"/>
-    <p:sldLayoutId id="2147483729" r:id="rId9"/>
-    <p:sldLayoutId id="2147483730" r:id="rId10"/>
-    <p:sldLayoutId id="2147483731" r:id="rId11"/>
+    <p:sldLayoutId id="2147483769" r:id="rId1"/>
+    <p:sldLayoutId id="2147483770" r:id="rId2"/>
+    <p:sldLayoutId id="2147483771" r:id="rId3"/>
+    <p:sldLayoutId id="2147483772" r:id="rId4"/>
+    <p:sldLayoutId id="2147483773" r:id="rId5"/>
+    <p:sldLayoutId id="2147483774" r:id="rId6"/>
+    <p:sldLayoutId id="2147483775" r:id="rId7"/>
+    <p:sldLayoutId id="2147483776" r:id="rId8"/>
+    <p:sldLayoutId id="2147483777" r:id="rId9"/>
+    <p:sldLayoutId id="2147483778" r:id="rId10"/>
+    <p:sldLayoutId id="2147483779" r:id="rId11"/>
   </p:sldLayoutIdLst>
   <p:txStyles>
     <p:titleStyle>
@@ -3415,94 +3415,6 @@
           <a:chExt cx="0" cy="0"/>
         </a:xfrm>
       </p:grpSpPr>
-      <p:pic>
-        <p:nvPicPr>
-          <p:cNvPr id="89" name="Picture 88" descr="A graph of a line&#10;&#10;AI-generated content may be incorrect.">
-            <a:extLst>
-              <a:ext uri="{FF2B5EF4-FFF2-40B4-BE49-F238E27FC236}">
-                <a16:creationId xmlns:a16="http://schemas.microsoft.com/office/drawing/2014/main" id="{113B78D5-59B3-300A-4CAC-403394946F89}"/>
-              </a:ext>
-            </a:extLst>
-          </p:cNvPr>
-          <p:cNvPicPr>
-            <a:picLocks noChangeAspect="1"/>
-          </p:cNvPicPr>
-          <p:nvPr/>
-        </p:nvPicPr>
-        <p:blipFill>
-          <a:blip r:embed="rId3"/>
-          <a:srcRect r="20792"/>
-          <a:stretch/>
-        </p:blipFill>
-        <p:spPr>
-          <a:xfrm>
-            <a:off x="30225" y="12964168"/>
-            <a:ext cx="8635422" cy="4672375"/>
-          </a:xfrm>
-          <a:prstGeom prst="rect">
-            <a:avLst/>
-          </a:prstGeom>
-        </p:spPr>
-      </p:pic>
-      <p:pic>
-        <p:nvPicPr>
-          <p:cNvPr id="81" name="Picture 80" descr="A graph of a number of people&#10;&#10;AI-generated content may be incorrect.">
-            <a:extLst>
-              <a:ext uri="{FF2B5EF4-FFF2-40B4-BE49-F238E27FC236}">
-                <a16:creationId xmlns:a16="http://schemas.microsoft.com/office/drawing/2014/main" id="{F30DC8A2-925F-13F2-0C68-F97CE3E54052}"/>
-              </a:ext>
-            </a:extLst>
-          </p:cNvPr>
-          <p:cNvPicPr>
-            <a:picLocks noChangeAspect="1"/>
-          </p:cNvPicPr>
-          <p:nvPr/>
-        </p:nvPicPr>
-        <p:blipFill>
-          <a:blip r:embed="rId4"/>
-          <a:srcRect t="9315"/>
-          <a:stretch/>
-        </p:blipFill>
-        <p:spPr>
-          <a:xfrm>
-            <a:off x="25191" y="7301685"/>
-            <a:ext cx="10412610" cy="5395792"/>
-          </a:xfrm>
-          <a:prstGeom prst="rect">
-            <a:avLst/>
-          </a:prstGeom>
-        </p:spPr>
-      </p:pic>
-      <p:pic>
-        <p:nvPicPr>
-          <p:cNvPr id="65" name="Picture 64" descr="A graph of different colored lines&#10;&#10;AI-generated content may be incorrect.">
-            <a:extLst>
-              <a:ext uri="{FF2B5EF4-FFF2-40B4-BE49-F238E27FC236}">
-                <a16:creationId xmlns:a16="http://schemas.microsoft.com/office/drawing/2014/main" id="{171AE279-777D-B97C-A61C-683B86C1058E}"/>
-              </a:ext>
-            </a:extLst>
-          </p:cNvPr>
-          <p:cNvPicPr>
-            <a:picLocks noChangeAspect="1"/>
-          </p:cNvPicPr>
-          <p:nvPr/>
-        </p:nvPicPr>
-        <p:blipFill>
-          <a:blip r:embed="rId5"/>
-          <a:stretch>
-            <a:fillRect/>
-          </a:stretch>
-        </p:blipFill>
-        <p:spPr>
-          <a:xfrm>
-            <a:off x="25191" y="23177"/>
-            <a:ext cx="10412610" cy="5950063"/>
-          </a:xfrm>
-          <a:prstGeom prst="rect">
-            <a:avLst/>
-          </a:prstGeom>
-        </p:spPr>
-      </p:pic>
       <p:sp>
         <p:nvSpPr>
           <p:cNvPr id="9" name="Rectangle 8">
@@ -3517,7 +3429,7 @@
         </p:nvSpPr>
         <p:spPr>
           <a:xfrm>
-            <a:off x="1173008" y="10911425"/>
+            <a:off x="1173008" y="5522319"/>
             <a:ext cx="4269600" cy="193412"/>
           </a:xfrm>
           <a:prstGeom prst="rect">
@@ -3569,7 +3481,7 @@
         </p:nvSpPr>
         <p:spPr>
           <a:xfrm>
-            <a:off x="1900209" y="11187196"/>
+            <a:off x="1900217" y="5772690"/>
             <a:ext cx="723599" cy="201600"/>
           </a:xfrm>
           <a:prstGeom prst="rect">
@@ -3621,7 +3533,7 @@
         </p:nvSpPr>
         <p:spPr>
           <a:xfrm>
-            <a:off x="6106560" y="10832947"/>
+            <a:off x="6106560" y="5443841"/>
             <a:ext cx="2387192" cy="338554"/>
           </a:xfrm>
           <a:prstGeom prst="rect">
@@ -3662,7 +3574,7 @@
         </p:nvSpPr>
         <p:spPr>
           <a:xfrm>
-            <a:off x="4284318" y="11114625"/>
+            <a:off x="4284318" y="5700119"/>
             <a:ext cx="1380506" cy="338554"/>
           </a:xfrm>
           <a:prstGeom prst="rect">
@@ -3703,7 +3615,7 @@
         </p:nvSpPr>
         <p:spPr>
           <a:xfrm>
-            <a:off x="6665998" y="11385502"/>
+            <a:off x="6665998" y="5949730"/>
             <a:ext cx="1540806" cy="338554"/>
           </a:xfrm>
           <a:prstGeom prst="rect">
@@ -3744,7 +3656,7 @@
         </p:nvSpPr>
         <p:spPr>
           <a:xfrm>
-            <a:off x="3242593" y="6220431"/>
+            <a:off x="3242593" y="3716040"/>
             <a:ext cx="2408032" cy="338554"/>
           </a:xfrm>
           <a:prstGeom prst="rect">
@@ -3795,7 +3707,7 @@
         </p:nvSpPr>
         <p:spPr>
           <a:xfrm>
-            <a:off x="7151920" y="7732008"/>
+            <a:off x="7151920" y="4999017"/>
             <a:ext cx="1290738" cy="338554"/>
           </a:xfrm>
           <a:prstGeom prst="rect">
@@ -3843,7 +3755,7 @@
         </p:nvSpPr>
         <p:spPr>
           <a:xfrm flipV="1">
-            <a:off x="1426914" y="6333218"/>
+            <a:off x="1426914" y="3828827"/>
             <a:ext cx="144000" cy="144000"/>
           </a:xfrm>
           <a:prstGeom prst="triangle">
@@ -3895,7 +3807,7 @@
         </p:nvSpPr>
         <p:spPr>
           <a:xfrm flipV="1">
-            <a:off x="1037836" y="6774670"/>
+            <a:off x="1037836" y="4194079"/>
             <a:ext cx="144000" cy="144000"/>
           </a:xfrm>
           <a:prstGeom prst="triangle">
@@ -3947,7 +3859,7 @@
         </p:nvSpPr>
         <p:spPr>
           <a:xfrm flipV="1">
-            <a:off x="1284098" y="6774670"/>
+            <a:off x="1284098" y="4194079"/>
             <a:ext cx="144000" cy="144000"/>
           </a:xfrm>
           <a:prstGeom prst="triangle">
@@ -3999,7 +3911,7 @@
         </p:nvSpPr>
         <p:spPr>
           <a:xfrm flipV="1">
-            <a:off x="1530360" y="6774670"/>
+            <a:off x="1530360" y="4194079"/>
             <a:ext cx="144000" cy="144000"/>
           </a:xfrm>
           <a:prstGeom prst="triangle">
@@ -4051,7 +3963,7 @@
         </p:nvSpPr>
         <p:spPr>
           <a:xfrm flipV="1">
-            <a:off x="1776622" y="6774670"/>
+            <a:off x="1776622" y="4194079"/>
             <a:ext cx="144000" cy="144000"/>
           </a:xfrm>
           <a:prstGeom prst="triangle">
@@ -4103,7 +4015,7 @@
         </p:nvSpPr>
         <p:spPr>
           <a:xfrm flipV="1">
-            <a:off x="2022884" y="6774670"/>
+            <a:off x="2022884" y="4194079"/>
             <a:ext cx="144000" cy="144000"/>
           </a:xfrm>
           <a:prstGeom prst="triangle">
@@ -4155,7 +4067,7 @@
         </p:nvSpPr>
         <p:spPr>
           <a:xfrm flipV="1">
-            <a:off x="2269146" y="6774670"/>
+            <a:off x="2269146" y="4194079"/>
             <a:ext cx="144000" cy="144000"/>
           </a:xfrm>
           <a:prstGeom prst="triangle">
@@ -4207,7 +4119,7 @@
         </p:nvSpPr>
         <p:spPr>
           <a:xfrm flipV="1">
-            <a:off x="2515408" y="6774670"/>
+            <a:off x="2515408" y="4194079"/>
             <a:ext cx="144000" cy="144000"/>
           </a:xfrm>
           <a:prstGeom prst="triangle">
@@ -4259,7 +4171,7 @@
         </p:nvSpPr>
         <p:spPr>
           <a:xfrm flipV="1">
-            <a:off x="2761670" y="6774670"/>
+            <a:off x="2761670" y="4194079"/>
             <a:ext cx="144000" cy="144000"/>
           </a:xfrm>
           <a:prstGeom prst="triangle">
@@ -4311,7 +4223,7 @@
         </p:nvSpPr>
         <p:spPr>
           <a:xfrm flipV="1">
-            <a:off x="3007932" y="6774670"/>
+            <a:off x="3007932" y="4194079"/>
             <a:ext cx="144000" cy="144000"/>
           </a:xfrm>
           <a:prstGeom prst="triangle">
@@ -4363,7 +4275,7 @@
         </p:nvSpPr>
         <p:spPr>
           <a:xfrm flipV="1">
-            <a:off x="3254194" y="6774670"/>
+            <a:off x="3254194" y="4194079"/>
             <a:ext cx="144000" cy="144000"/>
           </a:xfrm>
           <a:prstGeom prst="triangle">
@@ -4415,7 +4327,7 @@
         </p:nvSpPr>
         <p:spPr>
           <a:xfrm flipV="1">
-            <a:off x="3500456" y="6774670"/>
+            <a:off x="3500456" y="4194079"/>
             <a:ext cx="144000" cy="144000"/>
           </a:xfrm>
           <a:prstGeom prst="triangle">
@@ -4467,7 +4379,7 @@
         </p:nvSpPr>
         <p:spPr>
           <a:xfrm flipV="1">
-            <a:off x="4485504" y="6774670"/>
+            <a:off x="4485504" y="4194079"/>
             <a:ext cx="144000" cy="144000"/>
           </a:xfrm>
           <a:prstGeom prst="triangle">
@@ -4519,7 +4431,7 @@
         </p:nvSpPr>
         <p:spPr>
           <a:xfrm flipV="1">
-            <a:off x="4731766" y="6774670"/>
+            <a:off x="4731766" y="4194079"/>
             <a:ext cx="144000" cy="144000"/>
           </a:xfrm>
           <a:prstGeom prst="triangle">
@@ -4571,7 +4483,7 @@
         </p:nvSpPr>
         <p:spPr>
           <a:xfrm flipV="1">
-            <a:off x="5224290" y="6774670"/>
+            <a:off x="5224290" y="4194079"/>
             <a:ext cx="144000" cy="144000"/>
           </a:xfrm>
           <a:prstGeom prst="triangle">
@@ -4623,7 +4535,7 @@
         </p:nvSpPr>
         <p:spPr>
           <a:xfrm flipV="1">
-            <a:off x="5470557" y="6774670"/>
+            <a:off x="5470557" y="4194079"/>
             <a:ext cx="144000" cy="144000"/>
           </a:xfrm>
           <a:prstGeom prst="triangle">
@@ -4675,7 +4587,7 @@
         </p:nvSpPr>
         <p:spPr>
           <a:xfrm flipV="1">
-            <a:off x="4978028" y="6774670"/>
+            <a:off x="4978028" y="4194079"/>
             <a:ext cx="144000" cy="144000"/>
           </a:xfrm>
           <a:prstGeom prst="triangle">
@@ -4727,7 +4639,7 @@
         </p:nvSpPr>
         <p:spPr>
           <a:xfrm flipV="1">
-            <a:off x="4239242" y="6774670"/>
+            <a:off x="4239242" y="4194079"/>
             <a:ext cx="144000" cy="144000"/>
           </a:xfrm>
           <a:prstGeom prst="triangle">
@@ -4779,7 +4691,7 @@
         </p:nvSpPr>
         <p:spPr>
           <a:xfrm flipV="1">
-            <a:off x="3992980" y="6774670"/>
+            <a:off x="3992980" y="4194079"/>
             <a:ext cx="144000" cy="144000"/>
           </a:xfrm>
           <a:prstGeom prst="triangle">
@@ -4831,7 +4743,7 @@
         </p:nvSpPr>
         <p:spPr>
           <a:xfrm flipV="1">
-            <a:off x="3746718" y="6774670"/>
+            <a:off x="3746718" y="4194079"/>
             <a:ext cx="144000" cy="144000"/>
           </a:xfrm>
           <a:prstGeom prst="triangle">
@@ -4883,7 +4795,7 @@
         </p:nvSpPr>
         <p:spPr>
           <a:xfrm flipV="1">
-            <a:off x="2395392" y="6333218"/>
+            <a:off x="2395392" y="3828827"/>
             <a:ext cx="144000" cy="144000"/>
           </a:xfrm>
           <a:prstGeom prst="triangle">
@@ -4935,7 +4847,7 @@
         </p:nvSpPr>
         <p:spPr>
           <a:xfrm>
-            <a:off x="6299037" y="6666685"/>
+            <a:off x="6299037" y="4086094"/>
             <a:ext cx="2456122" cy="338554"/>
           </a:xfrm>
           <a:prstGeom prst="rect">
@@ -4983,7 +4895,7 @@
         </p:nvSpPr>
         <p:spPr>
           <a:xfrm flipV="1">
-            <a:off x="6372000" y="7857039"/>
+            <a:off x="6372000" y="5124048"/>
             <a:ext cx="144000" cy="144000"/>
           </a:xfrm>
           <a:prstGeom prst="triangle">
@@ -5036,14 +4948,14 @@
           <p:nvPr/>
         </p:nvPicPr>
         <p:blipFill>
-          <a:blip r:embed="rId6"/>
+          <a:blip r:embed="rId3"/>
           <a:stretch>
             <a:fillRect/>
           </a:stretch>
         </p:blipFill>
         <p:spPr>
           <a:xfrm>
-            <a:off x="5542557" y="10711540"/>
+            <a:off x="5542557" y="5322434"/>
             <a:ext cx="581368" cy="581368"/>
           </a:xfrm>
           <a:prstGeom prst="rect">
@@ -5066,14 +4978,14 @@
           <p:nvPr/>
         </p:nvPicPr>
         <p:blipFill>
-          <a:blip r:embed="rId7"/>
+          <a:blip r:embed="rId4"/>
           <a:stretch>
             <a:fillRect/>
           </a:stretch>
         </p:blipFill>
         <p:spPr>
           <a:xfrm>
-            <a:off x="5641146" y="6509311"/>
+            <a:off x="5641154" y="3928728"/>
             <a:ext cx="674719" cy="674719"/>
           </a:xfrm>
           <a:prstGeom prst="rect">
@@ -5096,14 +5008,14 @@
           <p:nvPr/>
         </p:nvPicPr>
         <p:blipFill>
-          <a:blip r:embed="rId8"/>
+          <a:blip r:embed="rId5"/>
           <a:stretch>
             <a:fillRect/>
           </a:stretch>
         </p:blipFill>
         <p:spPr>
           <a:xfrm>
-            <a:off x="2593881" y="6061219"/>
+            <a:off x="2593889" y="3556836"/>
             <a:ext cx="674719" cy="674719"/>
           </a:xfrm>
           <a:prstGeom prst="rect">
@@ -5126,14 +5038,14 @@
           <p:nvPr/>
         </p:nvPicPr>
         <p:blipFill>
-          <a:blip r:embed="rId9"/>
+          <a:blip r:embed="rId6"/>
           <a:stretch>
             <a:fillRect/>
           </a:stretch>
         </p:blipFill>
         <p:spPr>
           <a:xfrm rot="13618514">
-            <a:off x="3647303" y="11003737"/>
+            <a:off x="3647311" y="5614639"/>
             <a:ext cx="530133" cy="530133"/>
           </a:xfrm>
           <a:prstGeom prst="rect">
@@ -5156,14 +5068,14 @@
           <p:nvPr/>
         </p:nvPicPr>
         <p:blipFill>
-          <a:blip r:embed="rId10"/>
+          <a:blip r:embed="rId7"/>
           <a:stretch>
             <a:fillRect/>
           </a:stretch>
         </p:blipFill>
         <p:spPr>
           <a:xfrm rot="10800000">
-            <a:off x="6547788" y="7637979"/>
+            <a:off x="6547796" y="4904996"/>
             <a:ext cx="579419" cy="579419"/>
           </a:xfrm>
           <a:prstGeom prst="rect">
@@ -5186,44 +5098,15 @@
           <p:nvPr/>
         </p:nvPicPr>
         <p:blipFill>
-          <a:blip r:embed="rId11"/>
+          <a:blip r:embed="rId8"/>
           <a:stretch>
             <a:fillRect/>
           </a:stretch>
         </p:blipFill>
         <p:spPr>
           <a:xfrm rot="13575374">
-            <a:off x="6074720" y="11290179"/>
+            <a:off x="6074720" y="5854407"/>
             <a:ext cx="529200" cy="529200"/>
-          </a:xfrm>
-          <a:prstGeom prst="rect">
-            <a:avLst/>
-          </a:prstGeom>
-        </p:spPr>
-      </p:pic>
-      <p:pic>
-        <p:nvPicPr>
-          <p:cNvPr id="24" name="Picture 23" descr="A graph of a line&#10;&#10;AI-generated content may be incorrect.">
-            <a:extLst>
-              <a:ext uri="{FF2B5EF4-FFF2-40B4-BE49-F238E27FC236}">
-                <a16:creationId xmlns:a16="http://schemas.microsoft.com/office/drawing/2014/main" id="{69AB76E4-7765-4A4E-0121-2D2129275C13}"/>
-              </a:ext>
-            </a:extLst>
-          </p:cNvPr>
-          <p:cNvPicPr>
-            <a:picLocks noChangeAspect="1"/>
-          </p:cNvPicPr>
-          <p:nvPr/>
-        </p:nvPicPr>
-        <p:blipFill>
-          <a:blip r:embed="rId3"/>
-          <a:srcRect l="82057" r="1564"/>
-          <a:stretch/>
-        </p:blipFill>
-        <p:spPr>
-          <a:xfrm>
-            <a:off x="8768535" y="12964168"/>
-            <a:ext cx="1785722" cy="4672375"/>
           </a:xfrm>
           <a:prstGeom prst="rect">
             <a:avLst/>
@@ -5244,7 +5127,7 @@
         </p:nvSpPr>
         <p:spPr>
           <a:xfrm>
-            <a:off x="1093808" y="11562181"/>
+            <a:off x="1093808" y="6126409"/>
             <a:ext cx="39600" cy="100800"/>
           </a:xfrm>
           <a:prstGeom prst="rect">
@@ -5296,7 +5179,7 @@
         </p:nvSpPr>
         <p:spPr>
           <a:xfrm>
-            <a:off x="1133408" y="11511781"/>
+            <a:off x="1133408" y="6076009"/>
             <a:ext cx="241200" cy="151200"/>
           </a:xfrm>
           <a:prstGeom prst="rect">
@@ -5348,7 +5231,7 @@
         </p:nvSpPr>
         <p:spPr>
           <a:xfrm>
-            <a:off x="1374608" y="11486581"/>
+            <a:off x="1374608" y="6050809"/>
             <a:ext cx="241200" cy="176400"/>
           </a:xfrm>
           <a:prstGeom prst="rect">
@@ -5400,7 +5283,7 @@
         </p:nvSpPr>
         <p:spPr>
           <a:xfrm>
-            <a:off x="1615808" y="11461381"/>
+            <a:off x="1615808" y="6025609"/>
             <a:ext cx="442800" cy="201600"/>
           </a:xfrm>
           <a:prstGeom prst="rect">
@@ -5452,7 +5335,7 @@
         </p:nvSpPr>
         <p:spPr>
           <a:xfrm>
-            <a:off x="2058608" y="11486581"/>
+            <a:off x="2058608" y="6050809"/>
             <a:ext cx="482400" cy="176400"/>
           </a:xfrm>
           <a:prstGeom prst="rect">
@@ -5504,7 +5387,7 @@
         </p:nvSpPr>
         <p:spPr>
           <a:xfrm>
-            <a:off x="2541008" y="11526181"/>
+            <a:off x="2541008" y="6090409"/>
             <a:ext cx="201600" cy="136800"/>
           </a:xfrm>
           <a:prstGeom prst="rect">
@@ -5556,7 +5439,7 @@
         </p:nvSpPr>
         <p:spPr>
           <a:xfrm>
-            <a:off x="2742608" y="11562181"/>
+            <a:off x="2742608" y="6126409"/>
             <a:ext cx="925200" cy="100800"/>
           </a:xfrm>
           <a:prstGeom prst="rect">
@@ -5608,7 +5491,7 @@
         </p:nvSpPr>
         <p:spPr>
           <a:xfrm>
-            <a:off x="3667808" y="11587381"/>
+            <a:off x="3667808" y="6151609"/>
             <a:ext cx="802800" cy="75600"/>
           </a:xfrm>
           <a:prstGeom prst="rect">
@@ -5660,7 +5543,7 @@
         </p:nvSpPr>
         <p:spPr>
           <a:xfrm>
-            <a:off x="4470608" y="11612581"/>
+            <a:off x="4470608" y="6176809"/>
             <a:ext cx="482400" cy="50400"/>
           </a:xfrm>
           <a:prstGeom prst="rect">
@@ -5712,7 +5595,7 @@
         </p:nvSpPr>
         <p:spPr>
           <a:xfrm>
-            <a:off x="4953008" y="11637781"/>
+            <a:off x="4953008" y="6202009"/>
             <a:ext cx="482400" cy="25200"/>
           </a:xfrm>
           <a:prstGeom prst="rect">
@@ -5764,7 +5647,7 @@
         </p:nvSpPr>
         <p:spPr>
           <a:xfrm>
-            <a:off x="5435408" y="11648581"/>
+            <a:off x="5435408" y="6212809"/>
             <a:ext cx="324000" cy="14400"/>
           </a:xfrm>
           <a:prstGeom prst="rect">
@@ -5802,44 +5685,6 @@
           </a:p>
         </p:txBody>
       </p:sp>
-      <p:cxnSp>
-        <p:nvCxnSpPr>
-          <p:cNvPr id="29" name="Straight Connector 28">
-            <a:extLst>
-              <a:ext uri="{FF2B5EF4-FFF2-40B4-BE49-F238E27FC236}">
-                <a16:creationId xmlns:a16="http://schemas.microsoft.com/office/drawing/2014/main" id="{6724142C-F2BA-5C2D-9713-20187E233495}"/>
-              </a:ext>
-            </a:extLst>
-          </p:cNvPr>
-          <p:cNvCxnSpPr>
-            <a:cxnSpLocks/>
-          </p:cNvCxnSpPr>
-          <p:nvPr/>
-        </p:nvCxnSpPr>
-        <p:spPr>
-          <a:xfrm>
-            <a:off x="1074954" y="11852448"/>
-            <a:ext cx="6048000" cy="0"/>
-          </a:xfrm>
-          <a:prstGeom prst="line">
-            <a:avLst/>
-          </a:prstGeom>
-        </p:spPr>
-        <p:style>
-          <a:lnRef idx="2">
-            <a:schemeClr val="accent1"/>
-          </a:lnRef>
-          <a:fillRef idx="0">
-            <a:schemeClr val="accent1"/>
-          </a:fillRef>
-          <a:effectRef idx="1">
-            <a:schemeClr val="accent1"/>
-          </a:effectRef>
-          <a:fontRef idx="minor">
-            <a:schemeClr val="tx1"/>
-          </a:fontRef>
-        </p:style>
-      </p:cxnSp>
       <p:sp>
         <p:nvSpPr>
           <p:cNvPr id="32" name="Rectangle 31">
@@ -5854,7 +5699,7 @@
         </p:nvSpPr>
         <p:spPr>
           <a:xfrm>
-            <a:off x="2623808" y="11238181"/>
+            <a:off x="2623808" y="5823675"/>
             <a:ext cx="442800" cy="151200"/>
           </a:xfrm>
           <a:prstGeom prst="rect">
@@ -5906,7 +5751,7 @@
         </p:nvSpPr>
         <p:spPr>
           <a:xfrm>
-            <a:off x="3066608" y="11288581"/>
+            <a:off x="3066608" y="5874075"/>
             <a:ext cx="162000" cy="100800"/>
           </a:xfrm>
           <a:prstGeom prst="rect">
@@ -5958,7 +5803,7 @@
         </p:nvSpPr>
         <p:spPr>
           <a:xfrm>
-            <a:off x="3228608" y="11338981"/>
+            <a:off x="3228608" y="5924475"/>
             <a:ext cx="280800" cy="50400"/>
           </a:xfrm>
           <a:prstGeom prst="rect">
@@ -6010,7 +5855,7 @@
         </p:nvSpPr>
         <p:spPr>
           <a:xfrm flipV="1">
-            <a:off x="5766608" y="7286462"/>
+            <a:off x="5766608" y="4629671"/>
             <a:ext cx="144000" cy="144000"/>
           </a:xfrm>
           <a:prstGeom prst="triangle">
@@ -6062,7 +5907,7 @@
         </p:nvSpPr>
         <p:spPr>
           <a:xfrm flipV="1">
-            <a:off x="5979008" y="7286462"/>
+            <a:off x="5979008" y="4629671"/>
             <a:ext cx="144000" cy="144000"/>
           </a:xfrm>
           <a:prstGeom prst="triangle">
@@ -6114,7 +5959,7 @@
         </p:nvSpPr>
         <p:spPr>
           <a:xfrm flipV="1">
-            <a:off x="6472208" y="7286462"/>
+            <a:off x="6472208" y="4629671"/>
             <a:ext cx="144000" cy="144000"/>
           </a:xfrm>
           <a:prstGeom prst="triangle">
@@ -6166,7 +6011,7 @@
         </p:nvSpPr>
         <p:spPr>
           <a:xfrm flipV="1">
-            <a:off x="6720608" y="7286462"/>
+            <a:off x="6720608" y="4629671"/>
             <a:ext cx="144000" cy="144000"/>
           </a:xfrm>
           <a:prstGeom prst="triangle">
@@ -6218,7 +6063,7 @@
         </p:nvSpPr>
         <p:spPr>
           <a:xfrm flipV="1">
-            <a:off x="6227408" y="7286462"/>
+            <a:off x="6227408" y="4629671"/>
             <a:ext cx="144000" cy="144000"/>
           </a:xfrm>
           <a:prstGeom prst="triangle">
@@ -6270,7 +6115,7 @@
         </p:nvSpPr>
         <p:spPr>
           <a:xfrm>
-            <a:off x="8584286" y="7178477"/>
+            <a:off x="8584294" y="4521686"/>
             <a:ext cx="2206053" cy="338554"/>
           </a:xfrm>
           <a:prstGeom prst="rect">
@@ -6319,14 +6164,14 @@
           <p:nvPr/>
         </p:nvPicPr>
         <p:blipFill>
-          <a:blip r:embed="rId12"/>
+          <a:blip r:embed="rId9"/>
           <a:stretch>
             <a:fillRect/>
           </a:stretch>
         </p:blipFill>
         <p:spPr>
           <a:xfrm>
-            <a:off x="8017339" y="7023965"/>
+            <a:off x="8017347" y="4367182"/>
             <a:ext cx="674719" cy="674719"/>
           </a:xfrm>
           <a:prstGeom prst="rect">
@@ -6348,7 +6193,7 @@
         </p:nvSpPr>
         <p:spPr>
           <a:xfrm flipV="1">
-            <a:off x="6969008" y="7286462"/>
+            <a:off x="6969008" y="4629671"/>
             <a:ext cx="144000" cy="144000"/>
           </a:xfrm>
           <a:prstGeom prst="triangle">
@@ -6400,7 +6245,7 @@
         </p:nvSpPr>
         <p:spPr>
           <a:xfrm flipV="1">
-            <a:off x="7181408" y="7286462"/>
+            <a:off x="7181408" y="4629671"/>
             <a:ext cx="144000" cy="144000"/>
           </a:xfrm>
           <a:prstGeom prst="triangle">
@@ -6452,7 +6297,7 @@
         </p:nvSpPr>
         <p:spPr>
           <a:xfrm flipV="1">
-            <a:off x="7674608" y="7286462"/>
+            <a:off x="7674608" y="4629671"/>
             <a:ext cx="144000" cy="144000"/>
           </a:xfrm>
           <a:prstGeom prst="triangle">
@@ -6504,7 +6349,7 @@
         </p:nvSpPr>
         <p:spPr>
           <a:xfrm flipV="1">
-            <a:off x="7923008" y="7286462"/>
+            <a:off x="7923008" y="4629671"/>
             <a:ext cx="144000" cy="144000"/>
           </a:xfrm>
           <a:prstGeom prst="triangle">
@@ -6556,7 +6401,7 @@
         </p:nvSpPr>
         <p:spPr>
           <a:xfrm flipV="1">
-            <a:off x="7429808" y="7286462"/>
+            <a:off x="7429808" y="4629671"/>
             <a:ext cx="144000" cy="144000"/>
           </a:xfrm>
           <a:prstGeom prst="triangle">
@@ -6594,6 +6439,123 @@
           </a:p>
         </p:txBody>
       </p:sp>
+      <p:pic>
+        <p:nvPicPr>
+          <p:cNvPr id="75" name="Picture 74" descr="A graph of a line graph&#10;&#10;AI-generated content may be incorrect.">
+            <a:extLst>
+              <a:ext uri="{FF2B5EF4-FFF2-40B4-BE49-F238E27FC236}">
+                <a16:creationId xmlns:a16="http://schemas.microsoft.com/office/drawing/2014/main" id="{52B54518-42EE-74F8-1F9B-1EC3A52713F1}"/>
+              </a:ext>
+            </a:extLst>
+          </p:cNvPr>
+          <p:cNvPicPr>
+            <a:picLocks noChangeAspect="1"/>
+          </p:cNvPicPr>
+          <p:nvPr/>
+        </p:nvPicPr>
+        <p:blipFill>
+          <a:blip r:embed="rId10"/>
+          <a:stretch>
+            <a:fillRect/>
+          </a:stretch>
+        </p:blipFill>
+        <p:spPr>
+          <a:xfrm>
+            <a:off x="25191" y="29031"/>
+            <a:ext cx="10412610" cy="3553510"/>
+          </a:xfrm>
+          <a:prstGeom prst="rect">
+            <a:avLst/>
+          </a:prstGeom>
+        </p:spPr>
+      </p:pic>
+      <p:pic>
+        <p:nvPicPr>
+          <p:cNvPr id="77" name="Picture 76" descr="A graph of a line graph&#10;&#10;AI-generated content may be incorrect.">
+            <a:extLst>
+              <a:ext uri="{FF2B5EF4-FFF2-40B4-BE49-F238E27FC236}">
+                <a16:creationId xmlns:a16="http://schemas.microsoft.com/office/drawing/2014/main" id="{BA238391-523A-25AC-282B-03B9BCBB0110}"/>
+              </a:ext>
+            </a:extLst>
+          </p:cNvPr>
+          <p:cNvPicPr>
+            <a:picLocks noChangeAspect="1"/>
+          </p:cNvPicPr>
+          <p:nvPr/>
+        </p:nvPicPr>
+        <p:blipFill>
+          <a:blip r:embed="rId11"/>
+          <a:srcRect t="18144"/>
+          <a:stretch/>
+        </p:blipFill>
+        <p:spPr>
+          <a:xfrm>
+            <a:off x="25191" y="6291377"/>
+            <a:ext cx="10412610" cy="2908740"/>
+          </a:xfrm>
+          <a:prstGeom prst="rect">
+            <a:avLst/>
+          </a:prstGeom>
+        </p:spPr>
+      </p:pic>
+      <p:pic>
+        <p:nvPicPr>
+          <p:cNvPr id="79" name="Picture 78" descr="A graph with purple and orange lines&#10;&#10;AI-generated content may be incorrect.">
+            <a:extLst>
+              <a:ext uri="{FF2B5EF4-FFF2-40B4-BE49-F238E27FC236}">
+                <a16:creationId xmlns:a16="http://schemas.microsoft.com/office/drawing/2014/main" id="{CE0A825A-7D28-A690-A23D-775311C98530}"/>
+              </a:ext>
+            </a:extLst>
+          </p:cNvPr>
+          <p:cNvPicPr>
+            <a:picLocks noChangeAspect="1"/>
+          </p:cNvPicPr>
+          <p:nvPr/>
+        </p:nvPicPr>
+        <p:blipFill>
+          <a:blip r:embed="rId12"/>
+          <a:srcRect r="20562" b="1852"/>
+          <a:stretch/>
+        </p:blipFill>
+        <p:spPr>
+          <a:xfrm>
+            <a:off x="89983" y="9151728"/>
+            <a:ext cx="8665176" cy="3058866"/>
+          </a:xfrm>
+          <a:prstGeom prst="rect">
+            <a:avLst/>
+          </a:prstGeom>
+        </p:spPr>
+      </p:pic>
+      <p:pic>
+        <p:nvPicPr>
+          <p:cNvPr id="80" name="Picture 79" descr="A graph with purple and orange lines&#10;&#10;AI-generated content may be incorrect.">
+            <a:extLst>
+              <a:ext uri="{FF2B5EF4-FFF2-40B4-BE49-F238E27FC236}">
+                <a16:creationId xmlns:a16="http://schemas.microsoft.com/office/drawing/2014/main" id="{41D4CAF4-78FA-4552-B82C-864B76CD7B68}"/>
+              </a:ext>
+            </a:extLst>
+          </p:cNvPr>
+          <p:cNvPicPr>
+            <a:picLocks noChangeAspect="1"/>
+          </p:cNvPicPr>
+          <p:nvPr/>
+        </p:nvPicPr>
+        <p:blipFill>
+          <a:blip r:embed="rId12"/>
+          <a:srcRect l="81606" t="20672" r="2023" b="27286"/>
+          <a:stretch/>
+        </p:blipFill>
+        <p:spPr>
+          <a:xfrm>
+            <a:off x="8794453" y="9795604"/>
+            <a:ext cx="1785722" cy="1621930"/>
+          </a:xfrm>
+          <a:prstGeom prst="rect">
+            <a:avLst/>
+          </a:prstGeom>
+        </p:spPr>
+      </p:pic>
     </p:spTree>
     <p:extLst>
       <p:ext uri="{BB962C8B-B14F-4D97-AF65-F5344CB8AC3E}">

</xml_diff>

<commit_message>
Takahiro updated OneICU queries
</commit_message>
<xml_diff>
--- a/output/fig_sofa_dic.pptx
+++ b/output/fig_sofa_dic.pptx
@@ -197,7 +197,7 @@
           <a:p>
             <a:fld id="{63A1BE33-F31D-F74A-815B-F4DD24413D48}" type="datetimeFigureOut">
               <a:rPr lang="en-JP" smtClean="0"/>
-              <a:t>2025/02/09</a:t>
+              <a:t>2025/06/30</a:t>
             </a:fld>
             <a:endParaRPr lang="en-JP"/>
           </a:p>
@@ -685,7 +685,7 @@
           <a:p>
             <a:fld id="{CEC5EF0D-89A3-B84A-9E4B-188B0CDB794D}" type="datetimeFigureOut">
               <a:rPr lang="en-JP" smtClean="0"/>
-              <a:t>2025/02/09</a:t>
+              <a:t>2025/06/30</a:t>
             </a:fld>
             <a:endParaRPr lang="en-JP"/>
           </a:p>
@@ -855,7 +855,7 @@
           <a:p>
             <a:fld id="{CEC5EF0D-89A3-B84A-9E4B-188B0CDB794D}" type="datetimeFigureOut">
               <a:rPr lang="en-JP" smtClean="0"/>
-              <a:t>2025/02/09</a:t>
+              <a:t>2025/06/30</a:t>
             </a:fld>
             <a:endParaRPr lang="en-JP"/>
           </a:p>
@@ -1035,7 +1035,7 @@
           <a:p>
             <a:fld id="{CEC5EF0D-89A3-B84A-9E4B-188B0CDB794D}" type="datetimeFigureOut">
               <a:rPr lang="en-JP" smtClean="0"/>
-              <a:t>2025/02/09</a:t>
+              <a:t>2025/06/30</a:t>
             </a:fld>
             <a:endParaRPr lang="en-JP"/>
           </a:p>
@@ -1205,7 +1205,7 @@
           <a:p>
             <a:fld id="{CEC5EF0D-89A3-B84A-9E4B-188B0CDB794D}" type="datetimeFigureOut">
               <a:rPr lang="en-JP" smtClean="0"/>
-              <a:t>2025/02/09</a:t>
+              <a:t>2025/06/30</a:t>
             </a:fld>
             <a:endParaRPr lang="en-JP"/>
           </a:p>
@@ -1451,7 +1451,7 @@
           <a:p>
             <a:fld id="{CEC5EF0D-89A3-B84A-9E4B-188B0CDB794D}" type="datetimeFigureOut">
               <a:rPr lang="en-JP" smtClean="0"/>
-              <a:t>2025/02/09</a:t>
+              <a:t>2025/06/30</a:t>
             </a:fld>
             <a:endParaRPr lang="en-JP"/>
           </a:p>
@@ -1683,7 +1683,7 @@
           <a:p>
             <a:fld id="{CEC5EF0D-89A3-B84A-9E4B-188B0CDB794D}" type="datetimeFigureOut">
               <a:rPr lang="en-JP" smtClean="0"/>
-              <a:t>2025/02/09</a:t>
+              <a:t>2025/06/30</a:t>
             </a:fld>
             <a:endParaRPr lang="en-JP"/>
           </a:p>
@@ -2050,7 +2050,7 @@
           <a:p>
             <a:fld id="{CEC5EF0D-89A3-B84A-9E4B-188B0CDB794D}" type="datetimeFigureOut">
               <a:rPr lang="en-JP" smtClean="0"/>
-              <a:t>2025/02/09</a:t>
+              <a:t>2025/06/30</a:t>
             </a:fld>
             <a:endParaRPr lang="en-JP"/>
           </a:p>
@@ -2168,7 +2168,7 @@
           <a:p>
             <a:fld id="{CEC5EF0D-89A3-B84A-9E4B-188B0CDB794D}" type="datetimeFigureOut">
               <a:rPr lang="en-JP" smtClean="0"/>
-              <a:t>2025/02/09</a:t>
+              <a:t>2025/06/30</a:t>
             </a:fld>
             <a:endParaRPr lang="en-JP"/>
           </a:p>
@@ -2263,7 +2263,7 @@
           <a:p>
             <a:fld id="{CEC5EF0D-89A3-B84A-9E4B-188B0CDB794D}" type="datetimeFigureOut">
               <a:rPr lang="en-JP" smtClean="0"/>
-              <a:t>2025/02/09</a:t>
+              <a:t>2025/06/30</a:t>
             </a:fld>
             <a:endParaRPr lang="en-JP"/>
           </a:p>
@@ -2540,7 +2540,7 @@
           <a:p>
             <a:fld id="{CEC5EF0D-89A3-B84A-9E4B-188B0CDB794D}" type="datetimeFigureOut">
               <a:rPr lang="en-JP" smtClean="0"/>
-              <a:t>2025/02/09</a:t>
+              <a:t>2025/06/30</a:t>
             </a:fld>
             <a:endParaRPr lang="en-JP"/>
           </a:p>
@@ -2797,7 +2797,7 @@
           <a:p>
             <a:fld id="{CEC5EF0D-89A3-B84A-9E4B-188B0CDB794D}" type="datetimeFigureOut">
               <a:rPr lang="en-JP" smtClean="0"/>
-              <a:t>2025/02/09</a:t>
+              <a:t>2025/06/30</a:t>
             </a:fld>
             <a:endParaRPr lang="en-JP"/>
           </a:p>
@@ -3010,7 +3010,7 @@
           <a:p>
             <a:fld id="{CEC5EF0D-89A3-B84A-9E4B-188B0CDB794D}" type="datetimeFigureOut">
               <a:rPr lang="en-JP" smtClean="0"/>
-              <a:t>2025/02/09</a:t>
+              <a:t>2025/06/30</a:t>
             </a:fld>
             <a:endParaRPr lang="en-JP"/>
           </a:p>
@@ -3616,7 +3616,7 @@
         <p:spPr>
           <a:xfrm>
             <a:off x="6665998" y="5949730"/>
-            <a:ext cx="1540806" cy="338554"/>
+            <a:ext cx="1677062" cy="338554"/>
           </a:xfrm>
           <a:prstGeom prst="rect">
             <a:avLst/>
@@ -3637,7 +3637,7 @@
                 <a:latin typeface="Arial" panose="020B0604020202020204" pitchFamily="34" charset="0"/>
                 <a:cs typeface="Arial" panose="020B0604020202020204" pitchFamily="34" charset="0"/>
               </a:rPr>
-              <a:t>noradrenaline</a:t>
+              <a:t>norepinephrine</a:t>
             </a:r>
           </a:p>
         </p:txBody>

</xml_diff>